<commit_message>
adding source code for load balancer
</commit_message>
<xml_diff>
--- a/LOAD BALANCING.pptx
+++ b/LOAD BALANCING.pptx
@@ -11,6 +11,8 @@
     <p:sldId id="260" r:id="rId5"/>
     <p:sldId id="259" r:id="rId6"/>
     <p:sldId id="277" r:id="rId7"/>
+    <p:sldId id="278" r:id="rId8"/>
+    <p:sldId id="279" r:id="rId9"/>
   </p:sldIdLst>
   <p:sldSz cx="12192000" cy="6858000"/>
   <p:notesSz cx="6858000" cy="9144000"/>
@@ -6586,6 +6588,491 @@
   <p:clrMapOvr>
     <a:masterClrMapping/>
   </p:clrMapOvr>
+  <p:timing>
+    <p:tnLst>
+      <p:par>
+        <p:cTn id="1" dur="indefinite" restart="never" nodeType="tmRoot">
+          <p:childTnLst>
+            <p:seq concurrent="1" nextAc="seek">
+              <p:cTn id="2" dur="indefinite" nodeType="mainSeq">
+                <p:childTnLst>
+                  <p:par>
+                    <p:cTn id="3" fill="hold">
+                      <p:stCondLst>
+                        <p:cond delay="indefinite"/>
+                      </p:stCondLst>
+                      <p:childTnLst>
+                        <p:par>
+                          <p:cTn id="4" fill="hold">
+                            <p:stCondLst>
+                              <p:cond delay="0"/>
+                            </p:stCondLst>
+                            <p:childTnLst>
+                              <p:par>
+                                <p:cTn id="5" presetID="42" presetClass="entr" presetSubtype="0" fill="hold" grpId="0" nodeType="clickEffect">
+                                  <p:stCondLst>
+                                    <p:cond delay="0"/>
+                                  </p:stCondLst>
+                                  <p:childTnLst>
+                                    <p:set>
+                                      <p:cBhvr>
+                                        <p:cTn id="6" dur="1" fill="hold">
+                                          <p:stCondLst>
+                                            <p:cond delay="0"/>
+                                          </p:stCondLst>
+                                        </p:cTn>
+                                        <p:tgtEl>
+                                          <p:spTgt spid="3">
+                                            <p:bg/>
+                                          </p:spTgt>
+                                        </p:tgtEl>
+                                        <p:attrNameLst>
+                                          <p:attrName>style.visibility</p:attrName>
+                                        </p:attrNameLst>
+                                      </p:cBhvr>
+                                      <p:to>
+                                        <p:strVal val="visible"/>
+                                      </p:to>
+                                    </p:set>
+                                    <p:animEffect transition="in" filter="fade">
+                                      <p:cBhvr>
+                                        <p:cTn id="7" dur="1000"/>
+                                        <p:tgtEl>
+                                          <p:spTgt spid="3">
+                                            <p:bg/>
+                                          </p:spTgt>
+                                        </p:tgtEl>
+                                      </p:cBhvr>
+                                    </p:animEffect>
+                                    <p:anim calcmode="lin" valueType="num">
+                                      <p:cBhvr>
+                                        <p:cTn id="8" dur="1000" fill="hold"/>
+                                        <p:tgtEl>
+                                          <p:spTgt spid="3">
+                                            <p:bg/>
+                                          </p:spTgt>
+                                        </p:tgtEl>
+                                        <p:attrNameLst>
+                                          <p:attrName>ppt_x</p:attrName>
+                                        </p:attrNameLst>
+                                      </p:cBhvr>
+                                      <p:tavLst>
+                                        <p:tav tm="0">
+                                          <p:val>
+                                            <p:strVal val="#ppt_x"/>
+                                          </p:val>
+                                        </p:tav>
+                                        <p:tav tm="100000">
+                                          <p:val>
+                                            <p:strVal val="#ppt_x"/>
+                                          </p:val>
+                                        </p:tav>
+                                      </p:tavLst>
+                                    </p:anim>
+                                    <p:anim calcmode="lin" valueType="num">
+                                      <p:cBhvr>
+                                        <p:cTn id="9" dur="1000" fill="hold"/>
+                                        <p:tgtEl>
+                                          <p:spTgt spid="3">
+                                            <p:bg/>
+                                          </p:spTgt>
+                                        </p:tgtEl>
+                                        <p:attrNameLst>
+                                          <p:attrName>ppt_y</p:attrName>
+                                        </p:attrNameLst>
+                                      </p:cBhvr>
+                                      <p:tavLst>
+                                        <p:tav tm="0">
+                                          <p:val>
+                                            <p:strVal val="#ppt_y+.1"/>
+                                          </p:val>
+                                        </p:tav>
+                                        <p:tav tm="100000">
+                                          <p:val>
+                                            <p:strVal val="#ppt_y"/>
+                                          </p:val>
+                                        </p:tav>
+                                      </p:tavLst>
+                                    </p:anim>
+                                  </p:childTnLst>
+                                </p:cTn>
+                              </p:par>
+                            </p:childTnLst>
+                          </p:cTn>
+                        </p:par>
+                      </p:childTnLst>
+                    </p:cTn>
+                  </p:par>
+                  <p:par>
+                    <p:cTn id="10" fill="hold">
+                      <p:stCondLst>
+                        <p:cond delay="indefinite"/>
+                      </p:stCondLst>
+                      <p:childTnLst>
+                        <p:par>
+                          <p:cTn id="11" fill="hold">
+                            <p:stCondLst>
+                              <p:cond delay="0"/>
+                            </p:stCondLst>
+                            <p:childTnLst>
+                              <p:par>
+                                <p:cTn id="12" presetID="42" presetClass="entr" presetSubtype="0" fill="hold" grpId="0" nodeType="clickEffect">
+                                  <p:stCondLst>
+                                    <p:cond delay="0"/>
+                                  </p:stCondLst>
+                                  <p:childTnLst>
+                                    <p:set>
+                                      <p:cBhvr>
+                                        <p:cTn id="13" dur="1" fill="hold">
+                                          <p:stCondLst>
+                                            <p:cond delay="0"/>
+                                          </p:stCondLst>
+                                        </p:cTn>
+                                        <p:tgtEl>
+                                          <p:spTgt spid="3">
+                                            <p:txEl>
+                                              <p:pRg st="0" end="0"/>
+                                            </p:txEl>
+                                          </p:spTgt>
+                                        </p:tgtEl>
+                                        <p:attrNameLst>
+                                          <p:attrName>style.visibility</p:attrName>
+                                        </p:attrNameLst>
+                                      </p:cBhvr>
+                                      <p:to>
+                                        <p:strVal val="visible"/>
+                                      </p:to>
+                                    </p:set>
+                                    <p:animEffect transition="in" filter="fade">
+                                      <p:cBhvr>
+                                        <p:cTn id="14" dur="1000"/>
+                                        <p:tgtEl>
+                                          <p:spTgt spid="3">
+                                            <p:txEl>
+                                              <p:pRg st="0" end="0"/>
+                                            </p:txEl>
+                                          </p:spTgt>
+                                        </p:tgtEl>
+                                      </p:cBhvr>
+                                    </p:animEffect>
+                                    <p:anim calcmode="lin" valueType="num">
+                                      <p:cBhvr>
+                                        <p:cTn id="15" dur="1000" fill="hold"/>
+                                        <p:tgtEl>
+                                          <p:spTgt spid="3">
+                                            <p:txEl>
+                                              <p:pRg st="0" end="0"/>
+                                            </p:txEl>
+                                          </p:spTgt>
+                                        </p:tgtEl>
+                                        <p:attrNameLst>
+                                          <p:attrName>ppt_x</p:attrName>
+                                        </p:attrNameLst>
+                                      </p:cBhvr>
+                                      <p:tavLst>
+                                        <p:tav tm="0">
+                                          <p:val>
+                                            <p:strVal val="#ppt_x"/>
+                                          </p:val>
+                                        </p:tav>
+                                        <p:tav tm="100000">
+                                          <p:val>
+                                            <p:strVal val="#ppt_x"/>
+                                          </p:val>
+                                        </p:tav>
+                                      </p:tavLst>
+                                    </p:anim>
+                                    <p:anim calcmode="lin" valueType="num">
+                                      <p:cBhvr>
+                                        <p:cTn id="16" dur="1000" fill="hold"/>
+                                        <p:tgtEl>
+                                          <p:spTgt spid="3">
+                                            <p:txEl>
+                                              <p:pRg st="0" end="0"/>
+                                            </p:txEl>
+                                          </p:spTgt>
+                                        </p:tgtEl>
+                                        <p:attrNameLst>
+                                          <p:attrName>ppt_y</p:attrName>
+                                        </p:attrNameLst>
+                                      </p:cBhvr>
+                                      <p:tavLst>
+                                        <p:tav tm="0">
+                                          <p:val>
+                                            <p:strVal val="#ppt_y+.1"/>
+                                          </p:val>
+                                        </p:tav>
+                                        <p:tav tm="100000">
+                                          <p:val>
+                                            <p:strVal val="#ppt_y"/>
+                                          </p:val>
+                                        </p:tav>
+                                      </p:tavLst>
+                                    </p:anim>
+                                  </p:childTnLst>
+                                </p:cTn>
+                              </p:par>
+                            </p:childTnLst>
+                          </p:cTn>
+                        </p:par>
+                      </p:childTnLst>
+                    </p:cTn>
+                  </p:par>
+                  <p:par>
+                    <p:cTn id="17" fill="hold">
+                      <p:stCondLst>
+                        <p:cond delay="indefinite"/>
+                      </p:stCondLst>
+                      <p:childTnLst>
+                        <p:par>
+                          <p:cTn id="18" fill="hold">
+                            <p:stCondLst>
+                              <p:cond delay="0"/>
+                            </p:stCondLst>
+                            <p:childTnLst>
+                              <p:par>
+                                <p:cTn id="19" presetID="42" presetClass="entr" presetSubtype="0" fill="hold" grpId="0" nodeType="clickEffect">
+                                  <p:stCondLst>
+                                    <p:cond delay="0"/>
+                                  </p:stCondLst>
+                                  <p:childTnLst>
+                                    <p:set>
+                                      <p:cBhvr>
+                                        <p:cTn id="20" dur="1" fill="hold">
+                                          <p:stCondLst>
+                                            <p:cond delay="0"/>
+                                          </p:stCondLst>
+                                        </p:cTn>
+                                        <p:tgtEl>
+                                          <p:spTgt spid="3">
+                                            <p:txEl>
+                                              <p:pRg st="1" end="1"/>
+                                            </p:txEl>
+                                          </p:spTgt>
+                                        </p:tgtEl>
+                                        <p:attrNameLst>
+                                          <p:attrName>style.visibility</p:attrName>
+                                        </p:attrNameLst>
+                                      </p:cBhvr>
+                                      <p:to>
+                                        <p:strVal val="visible"/>
+                                      </p:to>
+                                    </p:set>
+                                    <p:animEffect transition="in" filter="fade">
+                                      <p:cBhvr>
+                                        <p:cTn id="21" dur="1000"/>
+                                        <p:tgtEl>
+                                          <p:spTgt spid="3">
+                                            <p:txEl>
+                                              <p:pRg st="1" end="1"/>
+                                            </p:txEl>
+                                          </p:spTgt>
+                                        </p:tgtEl>
+                                      </p:cBhvr>
+                                    </p:animEffect>
+                                    <p:anim calcmode="lin" valueType="num">
+                                      <p:cBhvr>
+                                        <p:cTn id="22" dur="1000" fill="hold"/>
+                                        <p:tgtEl>
+                                          <p:spTgt spid="3">
+                                            <p:txEl>
+                                              <p:pRg st="1" end="1"/>
+                                            </p:txEl>
+                                          </p:spTgt>
+                                        </p:tgtEl>
+                                        <p:attrNameLst>
+                                          <p:attrName>ppt_x</p:attrName>
+                                        </p:attrNameLst>
+                                      </p:cBhvr>
+                                      <p:tavLst>
+                                        <p:tav tm="0">
+                                          <p:val>
+                                            <p:strVal val="#ppt_x"/>
+                                          </p:val>
+                                        </p:tav>
+                                        <p:tav tm="100000">
+                                          <p:val>
+                                            <p:strVal val="#ppt_x"/>
+                                          </p:val>
+                                        </p:tav>
+                                      </p:tavLst>
+                                    </p:anim>
+                                    <p:anim calcmode="lin" valueType="num">
+                                      <p:cBhvr>
+                                        <p:cTn id="23" dur="1000" fill="hold"/>
+                                        <p:tgtEl>
+                                          <p:spTgt spid="3">
+                                            <p:txEl>
+                                              <p:pRg st="1" end="1"/>
+                                            </p:txEl>
+                                          </p:spTgt>
+                                        </p:tgtEl>
+                                        <p:attrNameLst>
+                                          <p:attrName>ppt_y</p:attrName>
+                                        </p:attrNameLst>
+                                      </p:cBhvr>
+                                      <p:tavLst>
+                                        <p:tav tm="0">
+                                          <p:val>
+                                            <p:strVal val="#ppt_y+.1"/>
+                                          </p:val>
+                                        </p:tav>
+                                        <p:tav tm="100000">
+                                          <p:val>
+                                            <p:strVal val="#ppt_y"/>
+                                          </p:val>
+                                        </p:tav>
+                                      </p:tavLst>
+                                    </p:anim>
+                                  </p:childTnLst>
+                                </p:cTn>
+                              </p:par>
+                            </p:childTnLst>
+                          </p:cTn>
+                        </p:par>
+                      </p:childTnLst>
+                    </p:cTn>
+                  </p:par>
+                  <p:par>
+                    <p:cTn id="24" fill="hold">
+                      <p:stCondLst>
+                        <p:cond delay="indefinite"/>
+                      </p:stCondLst>
+                      <p:childTnLst>
+                        <p:par>
+                          <p:cTn id="25" fill="hold">
+                            <p:stCondLst>
+                              <p:cond delay="0"/>
+                            </p:stCondLst>
+                            <p:childTnLst>
+                              <p:par>
+                                <p:cTn id="26" presetID="42" presetClass="entr" presetSubtype="0" fill="hold" grpId="0" nodeType="clickEffect">
+                                  <p:stCondLst>
+                                    <p:cond delay="0"/>
+                                  </p:stCondLst>
+                                  <p:childTnLst>
+                                    <p:set>
+                                      <p:cBhvr>
+                                        <p:cTn id="27" dur="1" fill="hold">
+                                          <p:stCondLst>
+                                            <p:cond delay="0"/>
+                                          </p:stCondLst>
+                                        </p:cTn>
+                                        <p:tgtEl>
+                                          <p:spTgt spid="3">
+                                            <p:txEl>
+                                              <p:pRg st="2" end="2"/>
+                                            </p:txEl>
+                                          </p:spTgt>
+                                        </p:tgtEl>
+                                        <p:attrNameLst>
+                                          <p:attrName>style.visibility</p:attrName>
+                                        </p:attrNameLst>
+                                      </p:cBhvr>
+                                      <p:to>
+                                        <p:strVal val="visible"/>
+                                      </p:to>
+                                    </p:set>
+                                    <p:animEffect transition="in" filter="fade">
+                                      <p:cBhvr>
+                                        <p:cTn id="28" dur="1000"/>
+                                        <p:tgtEl>
+                                          <p:spTgt spid="3">
+                                            <p:txEl>
+                                              <p:pRg st="2" end="2"/>
+                                            </p:txEl>
+                                          </p:spTgt>
+                                        </p:tgtEl>
+                                      </p:cBhvr>
+                                    </p:animEffect>
+                                    <p:anim calcmode="lin" valueType="num">
+                                      <p:cBhvr>
+                                        <p:cTn id="29" dur="1000" fill="hold"/>
+                                        <p:tgtEl>
+                                          <p:spTgt spid="3">
+                                            <p:txEl>
+                                              <p:pRg st="2" end="2"/>
+                                            </p:txEl>
+                                          </p:spTgt>
+                                        </p:tgtEl>
+                                        <p:attrNameLst>
+                                          <p:attrName>ppt_x</p:attrName>
+                                        </p:attrNameLst>
+                                      </p:cBhvr>
+                                      <p:tavLst>
+                                        <p:tav tm="0">
+                                          <p:val>
+                                            <p:strVal val="#ppt_x"/>
+                                          </p:val>
+                                        </p:tav>
+                                        <p:tav tm="100000">
+                                          <p:val>
+                                            <p:strVal val="#ppt_x"/>
+                                          </p:val>
+                                        </p:tav>
+                                      </p:tavLst>
+                                    </p:anim>
+                                    <p:anim calcmode="lin" valueType="num">
+                                      <p:cBhvr>
+                                        <p:cTn id="30" dur="1000" fill="hold"/>
+                                        <p:tgtEl>
+                                          <p:spTgt spid="3">
+                                            <p:txEl>
+                                              <p:pRg st="2" end="2"/>
+                                            </p:txEl>
+                                          </p:spTgt>
+                                        </p:tgtEl>
+                                        <p:attrNameLst>
+                                          <p:attrName>ppt_y</p:attrName>
+                                        </p:attrNameLst>
+                                      </p:cBhvr>
+                                      <p:tavLst>
+                                        <p:tav tm="0">
+                                          <p:val>
+                                            <p:strVal val="#ppt_y+.1"/>
+                                          </p:val>
+                                        </p:tav>
+                                        <p:tav tm="100000">
+                                          <p:val>
+                                            <p:strVal val="#ppt_y"/>
+                                          </p:val>
+                                        </p:tav>
+                                      </p:tavLst>
+                                    </p:anim>
+                                  </p:childTnLst>
+                                </p:cTn>
+                              </p:par>
+                            </p:childTnLst>
+                          </p:cTn>
+                        </p:par>
+                      </p:childTnLst>
+                    </p:cTn>
+                  </p:par>
+                </p:childTnLst>
+              </p:cTn>
+              <p:prevCondLst>
+                <p:cond evt="onPrev" delay="0">
+                  <p:tgtEl>
+                    <p:sldTgt/>
+                  </p:tgtEl>
+                </p:cond>
+              </p:prevCondLst>
+              <p:nextCondLst>
+                <p:cond evt="onNext" delay="0">
+                  <p:tgtEl>
+                    <p:sldTgt/>
+                  </p:tgtEl>
+                </p:cond>
+              </p:nextCondLst>
+            </p:seq>
+          </p:childTnLst>
+        </p:cTn>
+      </p:par>
+    </p:tnLst>
+    <p:bldLst>
+      <p:bldP spid="3" grpId="0" build="p" animBg="1"/>
+    </p:bldLst>
+  </p:timing>
 </p:sld>
 </file>
 
@@ -6862,6 +7349,879 @@
   <p:clrMapOvr>
     <a:masterClrMapping/>
   </p:clrMapOvr>
+  <p:timing>
+    <p:tnLst>
+      <p:par>
+        <p:cTn id="1" dur="indefinite" restart="never" nodeType="tmRoot">
+          <p:childTnLst>
+            <p:seq concurrent="1" nextAc="seek">
+              <p:cTn id="2" dur="indefinite" nodeType="mainSeq">
+                <p:childTnLst>
+                  <p:par>
+                    <p:cTn id="3" fill="hold">
+                      <p:stCondLst>
+                        <p:cond delay="indefinite"/>
+                      </p:stCondLst>
+                      <p:childTnLst>
+                        <p:par>
+                          <p:cTn id="4" fill="hold">
+                            <p:stCondLst>
+                              <p:cond delay="0"/>
+                            </p:stCondLst>
+                            <p:childTnLst>
+                              <p:par>
+                                <p:cTn id="5" presetID="42" presetClass="entr" presetSubtype="0" fill="hold" grpId="0" nodeType="clickEffect">
+                                  <p:stCondLst>
+                                    <p:cond delay="0"/>
+                                  </p:stCondLst>
+                                  <p:childTnLst>
+                                    <p:set>
+                                      <p:cBhvr>
+                                        <p:cTn id="6" dur="1" fill="hold">
+                                          <p:stCondLst>
+                                            <p:cond delay="0"/>
+                                          </p:stCondLst>
+                                        </p:cTn>
+                                        <p:tgtEl>
+                                          <p:spTgt spid="3">
+                                            <p:bg/>
+                                          </p:spTgt>
+                                        </p:tgtEl>
+                                        <p:attrNameLst>
+                                          <p:attrName>style.visibility</p:attrName>
+                                        </p:attrNameLst>
+                                      </p:cBhvr>
+                                      <p:to>
+                                        <p:strVal val="visible"/>
+                                      </p:to>
+                                    </p:set>
+                                    <p:animEffect transition="in" filter="fade">
+                                      <p:cBhvr>
+                                        <p:cTn id="7" dur="1000"/>
+                                        <p:tgtEl>
+                                          <p:spTgt spid="3">
+                                            <p:bg/>
+                                          </p:spTgt>
+                                        </p:tgtEl>
+                                      </p:cBhvr>
+                                    </p:animEffect>
+                                    <p:anim calcmode="lin" valueType="num">
+                                      <p:cBhvr>
+                                        <p:cTn id="8" dur="1000" fill="hold"/>
+                                        <p:tgtEl>
+                                          <p:spTgt spid="3">
+                                            <p:bg/>
+                                          </p:spTgt>
+                                        </p:tgtEl>
+                                        <p:attrNameLst>
+                                          <p:attrName>ppt_x</p:attrName>
+                                        </p:attrNameLst>
+                                      </p:cBhvr>
+                                      <p:tavLst>
+                                        <p:tav tm="0">
+                                          <p:val>
+                                            <p:strVal val="#ppt_x"/>
+                                          </p:val>
+                                        </p:tav>
+                                        <p:tav tm="100000">
+                                          <p:val>
+                                            <p:strVal val="#ppt_x"/>
+                                          </p:val>
+                                        </p:tav>
+                                      </p:tavLst>
+                                    </p:anim>
+                                    <p:anim calcmode="lin" valueType="num">
+                                      <p:cBhvr>
+                                        <p:cTn id="9" dur="1000" fill="hold"/>
+                                        <p:tgtEl>
+                                          <p:spTgt spid="3">
+                                            <p:bg/>
+                                          </p:spTgt>
+                                        </p:tgtEl>
+                                        <p:attrNameLst>
+                                          <p:attrName>ppt_y</p:attrName>
+                                        </p:attrNameLst>
+                                      </p:cBhvr>
+                                      <p:tavLst>
+                                        <p:tav tm="0">
+                                          <p:val>
+                                            <p:strVal val="#ppt_y+.1"/>
+                                          </p:val>
+                                        </p:tav>
+                                        <p:tav tm="100000">
+                                          <p:val>
+                                            <p:strVal val="#ppt_y"/>
+                                          </p:val>
+                                        </p:tav>
+                                      </p:tavLst>
+                                    </p:anim>
+                                  </p:childTnLst>
+                                </p:cTn>
+                              </p:par>
+                            </p:childTnLst>
+                          </p:cTn>
+                        </p:par>
+                      </p:childTnLst>
+                    </p:cTn>
+                  </p:par>
+                  <p:par>
+                    <p:cTn id="10" fill="hold">
+                      <p:stCondLst>
+                        <p:cond delay="indefinite"/>
+                      </p:stCondLst>
+                      <p:childTnLst>
+                        <p:par>
+                          <p:cTn id="11" fill="hold">
+                            <p:stCondLst>
+                              <p:cond delay="0"/>
+                            </p:stCondLst>
+                            <p:childTnLst>
+                              <p:par>
+                                <p:cTn id="12" presetID="42" presetClass="entr" presetSubtype="0" fill="hold" grpId="0" nodeType="clickEffect">
+                                  <p:stCondLst>
+                                    <p:cond delay="0"/>
+                                  </p:stCondLst>
+                                  <p:childTnLst>
+                                    <p:set>
+                                      <p:cBhvr>
+                                        <p:cTn id="13" dur="1" fill="hold">
+                                          <p:stCondLst>
+                                            <p:cond delay="0"/>
+                                          </p:stCondLst>
+                                        </p:cTn>
+                                        <p:tgtEl>
+                                          <p:spTgt spid="3">
+                                            <p:txEl>
+                                              <p:pRg st="0" end="0"/>
+                                            </p:txEl>
+                                          </p:spTgt>
+                                        </p:tgtEl>
+                                        <p:attrNameLst>
+                                          <p:attrName>style.visibility</p:attrName>
+                                        </p:attrNameLst>
+                                      </p:cBhvr>
+                                      <p:to>
+                                        <p:strVal val="visible"/>
+                                      </p:to>
+                                    </p:set>
+                                    <p:animEffect transition="in" filter="fade">
+                                      <p:cBhvr>
+                                        <p:cTn id="14" dur="1000"/>
+                                        <p:tgtEl>
+                                          <p:spTgt spid="3">
+                                            <p:txEl>
+                                              <p:pRg st="0" end="0"/>
+                                            </p:txEl>
+                                          </p:spTgt>
+                                        </p:tgtEl>
+                                      </p:cBhvr>
+                                    </p:animEffect>
+                                    <p:anim calcmode="lin" valueType="num">
+                                      <p:cBhvr>
+                                        <p:cTn id="15" dur="1000" fill="hold"/>
+                                        <p:tgtEl>
+                                          <p:spTgt spid="3">
+                                            <p:txEl>
+                                              <p:pRg st="0" end="0"/>
+                                            </p:txEl>
+                                          </p:spTgt>
+                                        </p:tgtEl>
+                                        <p:attrNameLst>
+                                          <p:attrName>ppt_x</p:attrName>
+                                        </p:attrNameLst>
+                                      </p:cBhvr>
+                                      <p:tavLst>
+                                        <p:tav tm="0">
+                                          <p:val>
+                                            <p:strVal val="#ppt_x"/>
+                                          </p:val>
+                                        </p:tav>
+                                        <p:tav tm="100000">
+                                          <p:val>
+                                            <p:strVal val="#ppt_x"/>
+                                          </p:val>
+                                        </p:tav>
+                                      </p:tavLst>
+                                    </p:anim>
+                                    <p:anim calcmode="lin" valueType="num">
+                                      <p:cBhvr>
+                                        <p:cTn id="16" dur="1000" fill="hold"/>
+                                        <p:tgtEl>
+                                          <p:spTgt spid="3">
+                                            <p:txEl>
+                                              <p:pRg st="0" end="0"/>
+                                            </p:txEl>
+                                          </p:spTgt>
+                                        </p:tgtEl>
+                                        <p:attrNameLst>
+                                          <p:attrName>ppt_y</p:attrName>
+                                        </p:attrNameLst>
+                                      </p:cBhvr>
+                                      <p:tavLst>
+                                        <p:tav tm="0">
+                                          <p:val>
+                                            <p:strVal val="#ppt_y+.1"/>
+                                          </p:val>
+                                        </p:tav>
+                                        <p:tav tm="100000">
+                                          <p:val>
+                                            <p:strVal val="#ppt_y"/>
+                                          </p:val>
+                                        </p:tav>
+                                      </p:tavLst>
+                                    </p:anim>
+                                  </p:childTnLst>
+                                </p:cTn>
+                              </p:par>
+                            </p:childTnLst>
+                          </p:cTn>
+                        </p:par>
+                      </p:childTnLst>
+                    </p:cTn>
+                  </p:par>
+                  <p:par>
+                    <p:cTn id="17" fill="hold">
+                      <p:stCondLst>
+                        <p:cond delay="indefinite"/>
+                      </p:stCondLst>
+                      <p:childTnLst>
+                        <p:par>
+                          <p:cTn id="18" fill="hold">
+                            <p:stCondLst>
+                              <p:cond delay="0"/>
+                            </p:stCondLst>
+                            <p:childTnLst>
+                              <p:par>
+                                <p:cTn id="19" presetID="42" presetClass="entr" presetSubtype="0" fill="hold" grpId="0" nodeType="clickEffect">
+                                  <p:stCondLst>
+                                    <p:cond delay="0"/>
+                                  </p:stCondLst>
+                                  <p:childTnLst>
+                                    <p:set>
+                                      <p:cBhvr>
+                                        <p:cTn id="20" dur="1" fill="hold">
+                                          <p:stCondLst>
+                                            <p:cond delay="0"/>
+                                          </p:stCondLst>
+                                        </p:cTn>
+                                        <p:tgtEl>
+                                          <p:spTgt spid="3">
+                                            <p:txEl>
+                                              <p:pRg st="1" end="1"/>
+                                            </p:txEl>
+                                          </p:spTgt>
+                                        </p:tgtEl>
+                                        <p:attrNameLst>
+                                          <p:attrName>style.visibility</p:attrName>
+                                        </p:attrNameLst>
+                                      </p:cBhvr>
+                                      <p:to>
+                                        <p:strVal val="visible"/>
+                                      </p:to>
+                                    </p:set>
+                                    <p:animEffect transition="in" filter="fade">
+                                      <p:cBhvr>
+                                        <p:cTn id="21" dur="1000"/>
+                                        <p:tgtEl>
+                                          <p:spTgt spid="3">
+                                            <p:txEl>
+                                              <p:pRg st="1" end="1"/>
+                                            </p:txEl>
+                                          </p:spTgt>
+                                        </p:tgtEl>
+                                      </p:cBhvr>
+                                    </p:animEffect>
+                                    <p:anim calcmode="lin" valueType="num">
+                                      <p:cBhvr>
+                                        <p:cTn id="22" dur="1000" fill="hold"/>
+                                        <p:tgtEl>
+                                          <p:spTgt spid="3">
+                                            <p:txEl>
+                                              <p:pRg st="1" end="1"/>
+                                            </p:txEl>
+                                          </p:spTgt>
+                                        </p:tgtEl>
+                                        <p:attrNameLst>
+                                          <p:attrName>ppt_x</p:attrName>
+                                        </p:attrNameLst>
+                                      </p:cBhvr>
+                                      <p:tavLst>
+                                        <p:tav tm="0">
+                                          <p:val>
+                                            <p:strVal val="#ppt_x"/>
+                                          </p:val>
+                                        </p:tav>
+                                        <p:tav tm="100000">
+                                          <p:val>
+                                            <p:strVal val="#ppt_x"/>
+                                          </p:val>
+                                        </p:tav>
+                                      </p:tavLst>
+                                    </p:anim>
+                                    <p:anim calcmode="lin" valueType="num">
+                                      <p:cBhvr>
+                                        <p:cTn id="23" dur="1000" fill="hold"/>
+                                        <p:tgtEl>
+                                          <p:spTgt spid="3">
+                                            <p:txEl>
+                                              <p:pRg st="1" end="1"/>
+                                            </p:txEl>
+                                          </p:spTgt>
+                                        </p:tgtEl>
+                                        <p:attrNameLst>
+                                          <p:attrName>ppt_y</p:attrName>
+                                        </p:attrNameLst>
+                                      </p:cBhvr>
+                                      <p:tavLst>
+                                        <p:tav tm="0">
+                                          <p:val>
+                                            <p:strVal val="#ppt_y+.1"/>
+                                          </p:val>
+                                        </p:tav>
+                                        <p:tav tm="100000">
+                                          <p:val>
+                                            <p:strVal val="#ppt_y"/>
+                                          </p:val>
+                                        </p:tav>
+                                      </p:tavLst>
+                                    </p:anim>
+                                  </p:childTnLst>
+                                </p:cTn>
+                              </p:par>
+                            </p:childTnLst>
+                          </p:cTn>
+                        </p:par>
+                      </p:childTnLst>
+                    </p:cTn>
+                  </p:par>
+                  <p:par>
+                    <p:cTn id="24" fill="hold">
+                      <p:stCondLst>
+                        <p:cond delay="indefinite"/>
+                      </p:stCondLst>
+                      <p:childTnLst>
+                        <p:par>
+                          <p:cTn id="25" fill="hold">
+                            <p:stCondLst>
+                              <p:cond delay="0"/>
+                            </p:stCondLst>
+                            <p:childTnLst>
+                              <p:par>
+                                <p:cTn id="26" presetID="42" presetClass="entr" presetSubtype="0" fill="hold" grpId="0" nodeType="clickEffect">
+                                  <p:stCondLst>
+                                    <p:cond delay="0"/>
+                                  </p:stCondLst>
+                                  <p:childTnLst>
+                                    <p:set>
+                                      <p:cBhvr>
+                                        <p:cTn id="27" dur="1" fill="hold">
+                                          <p:stCondLst>
+                                            <p:cond delay="0"/>
+                                          </p:stCondLst>
+                                        </p:cTn>
+                                        <p:tgtEl>
+                                          <p:spTgt spid="3">
+                                            <p:txEl>
+                                              <p:pRg st="2" end="2"/>
+                                            </p:txEl>
+                                          </p:spTgt>
+                                        </p:tgtEl>
+                                        <p:attrNameLst>
+                                          <p:attrName>style.visibility</p:attrName>
+                                        </p:attrNameLst>
+                                      </p:cBhvr>
+                                      <p:to>
+                                        <p:strVal val="visible"/>
+                                      </p:to>
+                                    </p:set>
+                                    <p:animEffect transition="in" filter="fade">
+                                      <p:cBhvr>
+                                        <p:cTn id="28" dur="1000"/>
+                                        <p:tgtEl>
+                                          <p:spTgt spid="3">
+                                            <p:txEl>
+                                              <p:pRg st="2" end="2"/>
+                                            </p:txEl>
+                                          </p:spTgt>
+                                        </p:tgtEl>
+                                      </p:cBhvr>
+                                    </p:animEffect>
+                                    <p:anim calcmode="lin" valueType="num">
+                                      <p:cBhvr>
+                                        <p:cTn id="29" dur="1000" fill="hold"/>
+                                        <p:tgtEl>
+                                          <p:spTgt spid="3">
+                                            <p:txEl>
+                                              <p:pRg st="2" end="2"/>
+                                            </p:txEl>
+                                          </p:spTgt>
+                                        </p:tgtEl>
+                                        <p:attrNameLst>
+                                          <p:attrName>ppt_x</p:attrName>
+                                        </p:attrNameLst>
+                                      </p:cBhvr>
+                                      <p:tavLst>
+                                        <p:tav tm="0">
+                                          <p:val>
+                                            <p:strVal val="#ppt_x"/>
+                                          </p:val>
+                                        </p:tav>
+                                        <p:tav tm="100000">
+                                          <p:val>
+                                            <p:strVal val="#ppt_x"/>
+                                          </p:val>
+                                        </p:tav>
+                                      </p:tavLst>
+                                    </p:anim>
+                                    <p:anim calcmode="lin" valueType="num">
+                                      <p:cBhvr>
+                                        <p:cTn id="30" dur="1000" fill="hold"/>
+                                        <p:tgtEl>
+                                          <p:spTgt spid="3">
+                                            <p:txEl>
+                                              <p:pRg st="2" end="2"/>
+                                            </p:txEl>
+                                          </p:spTgt>
+                                        </p:tgtEl>
+                                        <p:attrNameLst>
+                                          <p:attrName>ppt_y</p:attrName>
+                                        </p:attrNameLst>
+                                      </p:cBhvr>
+                                      <p:tavLst>
+                                        <p:tav tm="0">
+                                          <p:val>
+                                            <p:strVal val="#ppt_y+.1"/>
+                                          </p:val>
+                                        </p:tav>
+                                        <p:tav tm="100000">
+                                          <p:val>
+                                            <p:strVal val="#ppt_y"/>
+                                          </p:val>
+                                        </p:tav>
+                                      </p:tavLst>
+                                    </p:anim>
+                                  </p:childTnLst>
+                                </p:cTn>
+                              </p:par>
+                              <p:par>
+                                <p:cTn id="31" presetID="42" presetClass="entr" presetSubtype="0" fill="hold" grpId="0" nodeType="withEffect">
+                                  <p:stCondLst>
+                                    <p:cond delay="0"/>
+                                  </p:stCondLst>
+                                  <p:childTnLst>
+                                    <p:set>
+                                      <p:cBhvr>
+                                        <p:cTn id="32" dur="1" fill="hold">
+                                          <p:stCondLst>
+                                            <p:cond delay="0"/>
+                                          </p:stCondLst>
+                                        </p:cTn>
+                                        <p:tgtEl>
+                                          <p:spTgt spid="3">
+                                            <p:txEl>
+                                              <p:pRg st="3" end="3"/>
+                                            </p:txEl>
+                                          </p:spTgt>
+                                        </p:tgtEl>
+                                        <p:attrNameLst>
+                                          <p:attrName>style.visibility</p:attrName>
+                                        </p:attrNameLst>
+                                      </p:cBhvr>
+                                      <p:to>
+                                        <p:strVal val="visible"/>
+                                      </p:to>
+                                    </p:set>
+                                    <p:animEffect transition="in" filter="fade">
+                                      <p:cBhvr>
+                                        <p:cTn id="33" dur="1000"/>
+                                        <p:tgtEl>
+                                          <p:spTgt spid="3">
+                                            <p:txEl>
+                                              <p:pRg st="3" end="3"/>
+                                            </p:txEl>
+                                          </p:spTgt>
+                                        </p:tgtEl>
+                                      </p:cBhvr>
+                                    </p:animEffect>
+                                    <p:anim calcmode="lin" valueType="num">
+                                      <p:cBhvr>
+                                        <p:cTn id="34" dur="1000" fill="hold"/>
+                                        <p:tgtEl>
+                                          <p:spTgt spid="3">
+                                            <p:txEl>
+                                              <p:pRg st="3" end="3"/>
+                                            </p:txEl>
+                                          </p:spTgt>
+                                        </p:tgtEl>
+                                        <p:attrNameLst>
+                                          <p:attrName>ppt_x</p:attrName>
+                                        </p:attrNameLst>
+                                      </p:cBhvr>
+                                      <p:tavLst>
+                                        <p:tav tm="0">
+                                          <p:val>
+                                            <p:strVal val="#ppt_x"/>
+                                          </p:val>
+                                        </p:tav>
+                                        <p:tav tm="100000">
+                                          <p:val>
+                                            <p:strVal val="#ppt_x"/>
+                                          </p:val>
+                                        </p:tav>
+                                      </p:tavLst>
+                                    </p:anim>
+                                    <p:anim calcmode="lin" valueType="num">
+                                      <p:cBhvr>
+                                        <p:cTn id="35" dur="1000" fill="hold"/>
+                                        <p:tgtEl>
+                                          <p:spTgt spid="3">
+                                            <p:txEl>
+                                              <p:pRg st="3" end="3"/>
+                                            </p:txEl>
+                                          </p:spTgt>
+                                        </p:tgtEl>
+                                        <p:attrNameLst>
+                                          <p:attrName>ppt_y</p:attrName>
+                                        </p:attrNameLst>
+                                      </p:cBhvr>
+                                      <p:tavLst>
+                                        <p:tav tm="0">
+                                          <p:val>
+                                            <p:strVal val="#ppt_y+.1"/>
+                                          </p:val>
+                                        </p:tav>
+                                        <p:tav tm="100000">
+                                          <p:val>
+                                            <p:strVal val="#ppt_y"/>
+                                          </p:val>
+                                        </p:tav>
+                                      </p:tavLst>
+                                    </p:anim>
+                                  </p:childTnLst>
+                                </p:cTn>
+                              </p:par>
+                              <p:par>
+                                <p:cTn id="36" presetID="42" presetClass="entr" presetSubtype="0" fill="hold" grpId="0" nodeType="withEffect">
+                                  <p:stCondLst>
+                                    <p:cond delay="0"/>
+                                  </p:stCondLst>
+                                  <p:childTnLst>
+                                    <p:set>
+                                      <p:cBhvr>
+                                        <p:cTn id="37" dur="1" fill="hold">
+                                          <p:stCondLst>
+                                            <p:cond delay="0"/>
+                                          </p:stCondLst>
+                                        </p:cTn>
+                                        <p:tgtEl>
+                                          <p:spTgt spid="3">
+                                            <p:txEl>
+                                              <p:pRg st="4" end="4"/>
+                                            </p:txEl>
+                                          </p:spTgt>
+                                        </p:tgtEl>
+                                        <p:attrNameLst>
+                                          <p:attrName>style.visibility</p:attrName>
+                                        </p:attrNameLst>
+                                      </p:cBhvr>
+                                      <p:to>
+                                        <p:strVal val="visible"/>
+                                      </p:to>
+                                    </p:set>
+                                    <p:animEffect transition="in" filter="fade">
+                                      <p:cBhvr>
+                                        <p:cTn id="38" dur="1000"/>
+                                        <p:tgtEl>
+                                          <p:spTgt spid="3">
+                                            <p:txEl>
+                                              <p:pRg st="4" end="4"/>
+                                            </p:txEl>
+                                          </p:spTgt>
+                                        </p:tgtEl>
+                                      </p:cBhvr>
+                                    </p:animEffect>
+                                    <p:anim calcmode="lin" valueType="num">
+                                      <p:cBhvr>
+                                        <p:cTn id="39" dur="1000" fill="hold"/>
+                                        <p:tgtEl>
+                                          <p:spTgt spid="3">
+                                            <p:txEl>
+                                              <p:pRg st="4" end="4"/>
+                                            </p:txEl>
+                                          </p:spTgt>
+                                        </p:tgtEl>
+                                        <p:attrNameLst>
+                                          <p:attrName>ppt_x</p:attrName>
+                                        </p:attrNameLst>
+                                      </p:cBhvr>
+                                      <p:tavLst>
+                                        <p:tav tm="0">
+                                          <p:val>
+                                            <p:strVal val="#ppt_x"/>
+                                          </p:val>
+                                        </p:tav>
+                                        <p:tav tm="100000">
+                                          <p:val>
+                                            <p:strVal val="#ppt_x"/>
+                                          </p:val>
+                                        </p:tav>
+                                      </p:tavLst>
+                                    </p:anim>
+                                    <p:anim calcmode="lin" valueType="num">
+                                      <p:cBhvr>
+                                        <p:cTn id="40" dur="1000" fill="hold"/>
+                                        <p:tgtEl>
+                                          <p:spTgt spid="3">
+                                            <p:txEl>
+                                              <p:pRg st="4" end="4"/>
+                                            </p:txEl>
+                                          </p:spTgt>
+                                        </p:tgtEl>
+                                        <p:attrNameLst>
+                                          <p:attrName>ppt_y</p:attrName>
+                                        </p:attrNameLst>
+                                      </p:cBhvr>
+                                      <p:tavLst>
+                                        <p:tav tm="0">
+                                          <p:val>
+                                            <p:strVal val="#ppt_y+.1"/>
+                                          </p:val>
+                                        </p:tav>
+                                        <p:tav tm="100000">
+                                          <p:val>
+                                            <p:strVal val="#ppt_y"/>
+                                          </p:val>
+                                        </p:tav>
+                                      </p:tavLst>
+                                    </p:anim>
+                                  </p:childTnLst>
+                                </p:cTn>
+                              </p:par>
+                              <p:par>
+                                <p:cTn id="41" presetID="42" presetClass="entr" presetSubtype="0" fill="hold" grpId="0" nodeType="withEffect">
+                                  <p:stCondLst>
+                                    <p:cond delay="0"/>
+                                  </p:stCondLst>
+                                  <p:childTnLst>
+                                    <p:set>
+                                      <p:cBhvr>
+                                        <p:cTn id="42" dur="1" fill="hold">
+                                          <p:stCondLst>
+                                            <p:cond delay="0"/>
+                                          </p:stCondLst>
+                                        </p:cTn>
+                                        <p:tgtEl>
+                                          <p:spTgt spid="3">
+                                            <p:txEl>
+                                              <p:pRg st="5" end="5"/>
+                                            </p:txEl>
+                                          </p:spTgt>
+                                        </p:tgtEl>
+                                        <p:attrNameLst>
+                                          <p:attrName>style.visibility</p:attrName>
+                                        </p:attrNameLst>
+                                      </p:cBhvr>
+                                      <p:to>
+                                        <p:strVal val="visible"/>
+                                      </p:to>
+                                    </p:set>
+                                    <p:animEffect transition="in" filter="fade">
+                                      <p:cBhvr>
+                                        <p:cTn id="43" dur="1000"/>
+                                        <p:tgtEl>
+                                          <p:spTgt spid="3">
+                                            <p:txEl>
+                                              <p:pRg st="5" end="5"/>
+                                            </p:txEl>
+                                          </p:spTgt>
+                                        </p:tgtEl>
+                                      </p:cBhvr>
+                                    </p:animEffect>
+                                    <p:anim calcmode="lin" valueType="num">
+                                      <p:cBhvr>
+                                        <p:cTn id="44" dur="1000" fill="hold"/>
+                                        <p:tgtEl>
+                                          <p:spTgt spid="3">
+                                            <p:txEl>
+                                              <p:pRg st="5" end="5"/>
+                                            </p:txEl>
+                                          </p:spTgt>
+                                        </p:tgtEl>
+                                        <p:attrNameLst>
+                                          <p:attrName>ppt_x</p:attrName>
+                                        </p:attrNameLst>
+                                      </p:cBhvr>
+                                      <p:tavLst>
+                                        <p:tav tm="0">
+                                          <p:val>
+                                            <p:strVal val="#ppt_x"/>
+                                          </p:val>
+                                        </p:tav>
+                                        <p:tav tm="100000">
+                                          <p:val>
+                                            <p:strVal val="#ppt_x"/>
+                                          </p:val>
+                                        </p:tav>
+                                      </p:tavLst>
+                                    </p:anim>
+                                    <p:anim calcmode="lin" valueType="num">
+                                      <p:cBhvr>
+                                        <p:cTn id="45" dur="1000" fill="hold"/>
+                                        <p:tgtEl>
+                                          <p:spTgt spid="3">
+                                            <p:txEl>
+                                              <p:pRg st="5" end="5"/>
+                                            </p:txEl>
+                                          </p:spTgt>
+                                        </p:tgtEl>
+                                        <p:attrNameLst>
+                                          <p:attrName>ppt_y</p:attrName>
+                                        </p:attrNameLst>
+                                      </p:cBhvr>
+                                      <p:tavLst>
+                                        <p:tav tm="0">
+                                          <p:val>
+                                            <p:strVal val="#ppt_y+.1"/>
+                                          </p:val>
+                                        </p:tav>
+                                        <p:tav tm="100000">
+                                          <p:val>
+                                            <p:strVal val="#ppt_y"/>
+                                          </p:val>
+                                        </p:tav>
+                                      </p:tavLst>
+                                    </p:anim>
+                                  </p:childTnLst>
+                                </p:cTn>
+                              </p:par>
+                              <p:par>
+                                <p:cTn id="46" presetID="42" presetClass="entr" presetSubtype="0" fill="hold" grpId="0" nodeType="withEffect">
+                                  <p:stCondLst>
+                                    <p:cond delay="0"/>
+                                  </p:stCondLst>
+                                  <p:childTnLst>
+                                    <p:set>
+                                      <p:cBhvr>
+                                        <p:cTn id="47" dur="1" fill="hold">
+                                          <p:stCondLst>
+                                            <p:cond delay="0"/>
+                                          </p:stCondLst>
+                                        </p:cTn>
+                                        <p:tgtEl>
+                                          <p:spTgt spid="3">
+                                            <p:txEl>
+                                              <p:pRg st="6" end="6"/>
+                                            </p:txEl>
+                                          </p:spTgt>
+                                        </p:tgtEl>
+                                        <p:attrNameLst>
+                                          <p:attrName>style.visibility</p:attrName>
+                                        </p:attrNameLst>
+                                      </p:cBhvr>
+                                      <p:to>
+                                        <p:strVal val="visible"/>
+                                      </p:to>
+                                    </p:set>
+                                    <p:animEffect transition="in" filter="fade">
+                                      <p:cBhvr>
+                                        <p:cTn id="48" dur="1000"/>
+                                        <p:tgtEl>
+                                          <p:spTgt spid="3">
+                                            <p:txEl>
+                                              <p:pRg st="6" end="6"/>
+                                            </p:txEl>
+                                          </p:spTgt>
+                                        </p:tgtEl>
+                                      </p:cBhvr>
+                                    </p:animEffect>
+                                    <p:anim calcmode="lin" valueType="num">
+                                      <p:cBhvr>
+                                        <p:cTn id="49" dur="1000" fill="hold"/>
+                                        <p:tgtEl>
+                                          <p:spTgt spid="3">
+                                            <p:txEl>
+                                              <p:pRg st="6" end="6"/>
+                                            </p:txEl>
+                                          </p:spTgt>
+                                        </p:tgtEl>
+                                        <p:attrNameLst>
+                                          <p:attrName>ppt_x</p:attrName>
+                                        </p:attrNameLst>
+                                      </p:cBhvr>
+                                      <p:tavLst>
+                                        <p:tav tm="0">
+                                          <p:val>
+                                            <p:strVal val="#ppt_x"/>
+                                          </p:val>
+                                        </p:tav>
+                                        <p:tav tm="100000">
+                                          <p:val>
+                                            <p:strVal val="#ppt_x"/>
+                                          </p:val>
+                                        </p:tav>
+                                      </p:tavLst>
+                                    </p:anim>
+                                    <p:anim calcmode="lin" valueType="num">
+                                      <p:cBhvr>
+                                        <p:cTn id="50" dur="1000" fill="hold"/>
+                                        <p:tgtEl>
+                                          <p:spTgt spid="3">
+                                            <p:txEl>
+                                              <p:pRg st="6" end="6"/>
+                                            </p:txEl>
+                                          </p:spTgt>
+                                        </p:tgtEl>
+                                        <p:attrNameLst>
+                                          <p:attrName>ppt_y</p:attrName>
+                                        </p:attrNameLst>
+                                      </p:cBhvr>
+                                      <p:tavLst>
+                                        <p:tav tm="0">
+                                          <p:val>
+                                            <p:strVal val="#ppt_y+.1"/>
+                                          </p:val>
+                                        </p:tav>
+                                        <p:tav tm="100000">
+                                          <p:val>
+                                            <p:strVal val="#ppt_y"/>
+                                          </p:val>
+                                        </p:tav>
+                                      </p:tavLst>
+                                    </p:anim>
+                                  </p:childTnLst>
+                                </p:cTn>
+                              </p:par>
+                            </p:childTnLst>
+                          </p:cTn>
+                        </p:par>
+                      </p:childTnLst>
+                    </p:cTn>
+                  </p:par>
+                </p:childTnLst>
+              </p:cTn>
+              <p:prevCondLst>
+                <p:cond evt="onPrev" delay="0">
+                  <p:tgtEl>
+                    <p:sldTgt/>
+                  </p:tgtEl>
+                </p:cond>
+              </p:prevCondLst>
+              <p:nextCondLst>
+                <p:cond evt="onNext" delay="0">
+                  <p:tgtEl>
+                    <p:sldTgt/>
+                  </p:tgtEl>
+                </p:cond>
+              </p:nextCondLst>
+            </p:seq>
+          </p:childTnLst>
+        </p:cTn>
+      </p:par>
+    </p:tnLst>
+    <p:bldLst>
+      <p:bldP spid="3" grpId="0" build="p" animBg="1"/>
+    </p:bldLst>
+  </p:timing>
 </p:sld>
 </file>
 
@@ -7920,6 +9280,1072 @@
 </p:sld>
 </file>
 
+<file path=ppt/slides/slide7.xml><?xml version="1.0" encoding="utf-8"?>
+<p:sld xmlns:a="http://schemas.openxmlformats.org/drawingml/2006/main" xmlns:r="http://schemas.openxmlformats.org/officeDocument/2006/relationships" xmlns:p="http://schemas.openxmlformats.org/presentationml/2006/main">
+  <p:cSld>
+    <p:spTree>
+      <p:nvGrpSpPr>
+        <p:cNvPr id="1" name=""/>
+        <p:cNvGrpSpPr/>
+        <p:nvPr/>
+      </p:nvGrpSpPr>
+      <p:grpSpPr>
+        <a:xfrm>
+          <a:off x="0" y="0"/>
+          <a:ext cx="0" cy="0"/>
+          <a:chOff x="0" y="0"/>
+          <a:chExt cx="0" cy="0"/>
+        </a:xfrm>
+      </p:grpSpPr>
+      <p:pic>
+        <p:nvPicPr>
+          <p:cNvPr id="3" name="Picture 2">
+            <a:extLst>
+              <a:ext uri="{FF2B5EF4-FFF2-40B4-BE49-F238E27FC236}">
+                <a16:creationId xmlns:a16="http://schemas.microsoft.com/office/drawing/2014/main" id="{40E59EFF-EC3F-482B-8E8E-9DCAB878E6F1}"/>
+              </a:ext>
+            </a:extLst>
+          </p:cNvPr>
+          <p:cNvPicPr>
+            <a:picLocks noChangeAspect="1"/>
+          </p:cNvPicPr>
+          <p:nvPr/>
+        </p:nvPicPr>
+        <p:blipFill rotWithShape="1">
+          <a:blip r:embed="rId2"/>
+          <a:srcRect r="5200"/>
+          <a:stretch/>
+        </p:blipFill>
+        <p:spPr>
+          <a:xfrm>
+            <a:off x="3523488" y="10"/>
+            <a:ext cx="8668512" cy="6857990"/>
+          </a:xfrm>
+          <a:prstGeom prst="rect">
+            <a:avLst/>
+          </a:prstGeom>
+        </p:spPr>
+      </p:pic>
+      <p:sp>
+        <p:nvSpPr>
+          <p:cNvPr id="2" name="Title 1">
+            <a:extLst>
+              <a:ext uri="{FF2B5EF4-FFF2-40B4-BE49-F238E27FC236}">
+                <a16:creationId xmlns:a16="http://schemas.microsoft.com/office/drawing/2014/main" id="{B0DF3F48-E044-4616-A224-24E9E02D48D3}"/>
+              </a:ext>
+            </a:extLst>
+          </p:cNvPr>
+          <p:cNvSpPr>
+            <a:spLocks noGrp="1"/>
+          </p:cNvSpPr>
+          <p:nvPr>
+            <p:ph type="ctrTitle"/>
+          </p:nvPr>
+        </p:nvSpPr>
+        <p:spPr>
+          <a:xfrm>
+            <a:off x="477980" y="662260"/>
+            <a:ext cx="11616992" cy="3758103"/>
+          </a:xfrm>
+        </p:spPr>
+        <p:txBody>
+          <a:bodyPr anchor="b">
+            <a:normAutofit fontScale="90000"/>
+          </a:bodyPr>
+          <a:lstStyle/>
+          <a:p>
+            <a:pPr algn="ctr"/>
+            <a:r>
+              <a:rPr lang="en-IN" sz="6000" dirty="0">
+                <a:solidFill>
+                  <a:schemeClr val="accent1"/>
+                </a:solidFill>
+                <a:latin typeface="Algerian" panose="04020705040A02060702" pitchFamily="82" charset="0"/>
+              </a:rPr>
+              <a:t>LOAD BALANCING </a:t>
+            </a:r>
+            <a:br>
+              <a:rPr lang="en-IN" sz="6000" dirty="0">
+                <a:solidFill>
+                  <a:schemeClr val="accent1"/>
+                </a:solidFill>
+                <a:latin typeface="Algerian" panose="04020705040A02060702" pitchFamily="82" charset="0"/>
+              </a:rPr>
+            </a:br>
+            <a:r>
+              <a:rPr lang="en-IN" sz="6000" dirty="0">
+                <a:solidFill>
+                  <a:schemeClr val="accent1"/>
+                </a:solidFill>
+                <a:latin typeface="Algerian" panose="04020705040A02060702" pitchFamily="82" charset="0"/>
+              </a:rPr>
+              <a:t>IN</a:t>
+            </a:r>
+            <a:br>
+              <a:rPr lang="en-IN" sz="6000" dirty="0">
+                <a:solidFill>
+                  <a:schemeClr val="accent1"/>
+                </a:solidFill>
+                <a:latin typeface="Algerian" panose="04020705040A02060702" pitchFamily="82" charset="0"/>
+              </a:rPr>
+            </a:br>
+            <a:r>
+              <a:rPr lang="en-IN" sz="6000" dirty="0">
+                <a:solidFill>
+                  <a:schemeClr val="accent1"/>
+                </a:solidFill>
+                <a:latin typeface="Algerian" panose="04020705040A02060702" pitchFamily="82" charset="0"/>
+              </a:rPr>
+              <a:t>MICROSERVICES</a:t>
+            </a:r>
+            <a:br>
+              <a:rPr lang="en-IN" sz="6600" dirty="0">
+                <a:solidFill>
+                  <a:schemeClr val="accent1"/>
+                </a:solidFill>
+                <a:latin typeface="Algerian" panose="04020705040A02060702" pitchFamily="82" charset="0"/>
+              </a:rPr>
+            </a:br>
+            <a:r>
+              <a:rPr lang="en-IN" sz="6000" b="1" dirty="0">
+                <a:solidFill>
+                  <a:srgbClr val="FF0000"/>
+                </a:solidFill>
+                <a:latin typeface="Algerian" panose="04020705040A02060702" pitchFamily="82" charset="0"/>
+              </a:rPr>
+              <a:t>Demo – without service discovery</a:t>
+            </a:r>
+            <a:endParaRPr lang="en-IN" sz="6600" b="1" dirty="0">
+              <a:solidFill>
+                <a:srgbClr val="FF0000"/>
+              </a:solidFill>
+              <a:latin typeface="Algerian" panose="04020705040A02060702" pitchFamily="82" charset="0"/>
+            </a:endParaRPr>
+          </a:p>
+        </p:txBody>
+      </p:sp>
+      <p:pic>
+        <p:nvPicPr>
+          <p:cNvPr id="1026" name="Picture 2" descr="Image result for netflix ribbon">
+            <a:extLst>
+              <a:ext uri="{FF2B5EF4-FFF2-40B4-BE49-F238E27FC236}">
+                <a16:creationId xmlns:a16="http://schemas.microsoft.com/office/drawing/2014/main" id="{6A34D2C0-7C9E-49C2-91CF-3AD4500142E6}"/>
+              </a:ext>
+            </a:extLst>
+          </p:cNvPr>
+          <p:cNvPicPr>
+            <a:picLocks noChangeAspect="1" noChangeArrowheads="1"/>
+          </p:cNvPicPr>
+          <p:nvPr/>
+        </p:nvPicPr>
+        <p:blipFill>
+          <a:blip r:embed="rId3">
+            <a:extLst>
+              <a:ext uri="{28A0092B-C50C-407E-A947-70E740481C1C}">
+                <a14:useLocalDpi xmlns:a14="http://schemas.microsoft.com/office/drawing/2010/main" val="0"/>
+              </a:ext>
+            </a:extLst>
+          </a:blip>
+          <a:srcRect/>
+          <a:stretch>
+            <a:fillRect/>
+          </a:stretch>
+        </p:blipFill>
+        <p:spPr bwMode="auto">
+          <a:xfrm>
+            <a:off x="9768499" y="5082613"/>
+            <a:ext cx="2314575" cy="1703950"/>
+          </a:xfrm>
+          <a:prstGeom prst="rect">
+            <a:avLst/>
+          </a:prstGeom>
+          <a:ln>
+            <a:noFill/>
+          </a:ln>
+          <a:effectLst>
+            <a:outerShdw blurRad="292100" dist="139700" dir="2700000" algn="tl" rotWithShape="0">
+              <a:srgbClr val="333333">
+                <a:alpha val="65000"/>
+              </a:srgbClr>
+            </a:outerShdw>
+          </a:effectLst>
+          <a:extLst>
+            <a:ext uri="{909E8E84-426E-40DD-AFC4-6F175D3DCCD1}">
+              <a14:hiddenFill xmlns:a14="http://schemas.microsoft.com/office/drawing/2010/main">
+                <a:solidFill>
+                  <a:srgbClr val="FFFFFF"/>
+                </a:solidFill>
+              </a14:hiddenFill>
+            </a:ext>
+          </a:extLst>
+        </p:spPr>
+      </p:pic>
+      <p:pic>
+        <p:nvPicPr>
+          <p:cNvPr id="1028" name="Picture 4" descr="Image result for netflix ribbon">
+            <a:extLst>
+              <a:ext uri="{FF2B5EF4-FFF2-40B4-BE49-F238E27FC236}">
+                <a16:creationId xmlns:a16="http://schemas.microsoft.com/office/drawing/2014/main" id="{683EB1E0-7A2D-4BBE-9B64-F9410D61C78D}"/>
+              </a:ext>
+            </a:extLst>
+          </p:cNvPr>
+          <p:cNvPicPr>
+            <a:picLocks noChangeAspect="1" noChangeArrowheads="1"/>
+          </p:cNvPicPr>
+          <p:nvPr/>
+        </p:nvPicPr>
+        <p:blipFill>
+          <a:blip r:embed="rId4">
+            <a:extLst>
+              <a:ext uri="{28A0092B-C50C-407E-A947-70E740481C1C}">
+                <a14:useLocalDpi xmlns:a14="http://schemas.microsoft.com/office/drawing/2010/main" val="0"/>
+              </a:ext>
+            </a:extLst>
+          </a:blip>
+          <a:srcRect/>
+          <a:stretch>
+            <a:fillRect/>
+          </a:stretch>
+        </p:blipFill>
+        <p:spPr bwMode="auto">
+          <a:xfrm>
+            <a:off x="6643306" y="5082613"/>
+            <a:ext cx="2428875" cy="1703950"/>
+          </a:xfrm>
+          <a:prstGeom prst="rect">
+            <a:avLst/>
+          </a:prstGeom>
+          <a:noFill/>
+          <a:extLst>
+            <a:ext uri="{909E8E84-426E-40DD-AFC4-6F175D3DCCD1}">
+              <a14:hiddenFill xmlns:a14="http://schemas.microsoft.com/office/drawing/2010/main">
+                <a:solidFill>
+                  <a:srgbClr val="FFFFFF"/>
+                </a:solidFill>
+              </a14:hiddenFill>
+            </a:ext>
+          </a:extLst>
+        </p:spPr>
+      </p:pic>
+      <p:pic>
+        <p:nvPicPr>
+          <p:cNvPr id="1030" name="Picture 6" descr="Image result for spring boot">
+            <a:extLst>
+              <a:ext uri="{FF2B5EF4-FFF2-40B4-BE49-F238E27FC236}">
+                <a16:creationId xmlns:a16="http://schemas.microsoft.com/office/drawing/2014/main" id="{5E3CE5C6-425F-4D3A-9BA9-E27CA277FAD2}"/>
+              </a:ext>
+            </a:extLst>
+          </p:cNvPr>
+          <p:cNvPicPr>
+            <a:picLocks noChangeAspect="1" noChangeArrowheads="1"/>
+          </p:cNvPicPr>
+          <p:nvPr/>
+        </p:nvPicPr>
+        <p:blipFill>
+          <a:blip r:embed="rId5">
+            <a:extLst>
+              <a:ext uri="{28A0092B-C50C-407E-A947-70E740481C1C}">
+                <a14:useLocalDpi xmlns:a14="http://schemas.microsoft.com/office/drawing/2010/main" val="0"/>
+              </a:ext>
+            </a:extLst>
+          </a:blip>
+          <a:srcRect/>
+          <a:stretch>
+            <a:fillRect/>
+          </a:stretch>
+        </p:blipFill>
+        <p:spPr bwMode="auto">
+          <a:xfrm>
+            <a:off x="90845" y="5100901"/>
+            <a:ext cx="3095625" cy="1685662"/>
+          </a:xfrm>
+          <a:prstGeom prst="rect">
+            <a:avLst/>
+          </a:prstGeom>
+          <a:noFill/>
+          <a:extLst>
+            <a:ext uri="{909E8E84-426E-40DD-AFC4-6F175D3DCCD1}">
+              <a14:hiddenFill xmlns:a14="http://schemas.microsoft.com/office/drawing/2010/main">
+                <a:solidFill>
+                  <a:srgbClr val="FFFFFF"/>
+                </a:solidFill>
+              </a14:hiddenFill>
+            </a:ext>
+          </a:extLst>
+        </p:spPr>
+      </p:pic>
+      <p:pic>
+        <p:nvPicPr>
+          <p:cNvPr id="1032" name="Picture 8" descr="Image result for spring cloud">
+            <a:extLst>
+              <a:ext uri="{FF2B5EF4-FFF2-40B4-BE49-F238E27FC236}">
+                <a16:creationId xmlns:a16="http://schemas.microsoft.com/office/drawing/2014/main" id="{E69F9046-35F4-489B-8D0B-D72B1635878B}"/>
+              </a:ext>
+            </a:extLst>
+          </p:cNvPr>
+          <p:cNvPicPr>
+            <a:picLocks noChangeAspect="1" noChangeArrowheads="1"/>
+          </p:cNvPicPr>
+          <p:nvPr/>
+        </p:nvPicPr>
+        <p:blipFill>
+          <a:blip r:embed="rId6">
+            <a:extLst>
+              <a:ext uri="{28A0092B-C50C-407E-A947-70E740481C1C}">
+                <a14:useLocalDpi xmlns:a14="http://schemas.microsoft.com/office/drawing/2010/main" val="0"/>
+              </a:ext>
+            </a:extLst>
+          </a:blip>
+          <a:srcRect/>
+          <a:stretch>
+            <a:fillRect/>
+          </a:stretch>
+        </p:blipFill>
+        <p:spPr bwMode="auto">
+          <a:xfrm>
+            <a:off x="3648075" y="5135341"/>
+            <a:ext cx="2811481" cy="1541684"/>
+          </a:xfrm>
+          <a:prstGeom prst="rect">
+            <a:avLst/>
+          </a:prstGeom>
+          <a:noFill/>
+          <a:extLst>
+            <a:ext uri="{909E8E84-426E-40DD-AFC4-6F175D3DCCD1}">
+              <a14:hiddenFill xmlns:a14="http://schemas.microsoft.com/office/drawing/2010/main">
+                <a:solidFill>
+                  <a:srgbClr val="FFFFFF"/>
+                </a:solidFill>
+              </a14:hiddenFill>
+            </a:ext>
+          </a:extLst>
+        </p:spPr>
+      </p:pic>
+      <p:sp>
+        <p:nvSpPr>
+          <p:cNvPr id="4" name="Rectangle 3">
+            <a:extLst>
+              <a:ext uri="{FF2B5EF4-FFF2-40B4-BE49-F238E27FC236}">
+                <a16:creationId xmlns:a16="http://schemas.microsoft.com/office/drawing/2014/main" id="{3BBAF007-8316-46E5-BEC8-422C95D60DED}"/>
+              </a:ext>
+            </a:extLst>
+          </p:cNvPr>
+          <p:cNvSpPr/>
+          <p:nvPr/>
+        </p:nvSpPr>
+        <p:spPr>
+          <a:xfrm>
+            <a:off x="90845" y="859983"/>
+            <a:ext cx="1604605" cy="3705225"/>
+          </a:xfrm>
+          <a:prstGeom prst="rect">
+            <a:avLst/>
+          </a:prstGeom>
+        </p:spPr>
+        <p:style>
+          <a:lnRef idx="1">
+            <a:schemeClr val="accent6"/>
+          </a:lnRef>
+          <a:fillRef idx="2">
+            <a:schemeClr val="accent6"/>
+          </a:fillRef>
+          <a:effectRef idx="1">
+            <a:schemeClr val="accent6"/>
+          </a:effectRef>
+          <a:fontRef idx="minor">
+            <a:schemeClr val="dk1"/>
+          </a:fontRef>
+        </p:style>
+        <p:txBody>
+          <a:bodyPr rtlCol="0" anchor="ctr"/>
+          <a:lstStyle/>
+          <a:p>
+            <a:pPr algn="ctr"/>
+            <a:r>
+              <a:rPr lang="en-IN" sz="2800" dirty="0">
+                <a:latin typeface="Algerian" panose="04020705040A02060702" pitchFamily="82" charset="0"/>
+              </a:rPr>
+              <a:t>Netflix Ribbon </a:t>
+            </a:r>
+          </a:p>
+          <a:p>
+            <a:pPr algn="ctr"/>
+            <a:r>
+              <a:rPr lang="en-IN" sz="2800" dirty="0">
+                <a:latin typeface="Algerian" panose="04020705040A02060702" pitchFamily="82" charset="0"/>
+              </a:rPr>
+              <a:t>+</a:t>
+            </a:r>
+          </a:p>
+          <a:p>
+            <a:pPr algn="ctr"/>
+            <a:r>
+              <a:rPr lang="en-IN" sz="2800" dirty="0">
+                <a:latin typeface="Algerian" panose="04020705040A02060702" pitchFamily="82" charset="0"/>
+              </a:rPr>
+              <a:t>Spring Boot</a:t>
+            </a:r>
+          </a:p>
+        </p:txBody>
+      </p:sp>
+      <p:sp>
+        <p:nvSpPr>
+          <p:cNvPr id="13" name="Rectangle 12">
+            <a:extLst>
+              <a:ext uri="{FF2B5EF4-FFF2-40B4-BE49-F238E27FC236}">
+                <a16:creationId xmlns:a16="http://schemas.microsoft.com/office/drawing/2014/main" id="{11E39328-AF4E-4F58-A7FF-23D350CED64F}"/>
+              </a:ext>
+            </a:extLst>
+          </p:cNvPr>
+          <p:cNvSpPr/>
+          <p:nvPr/>
+        </p:nvSpPr>
+        <p:spPr>
+          <a:xfrm>
+            <a:off x="11515725" y="-9759"/>
+            <a:ext cx="676274" cy="428859"/>
+          </a:xfrm>
+          <a:prstGeom prst="rect">
+            <a:avLst/>
+          </a:prstGeom>
+          <a:solidFill>
+            <a:srgbClr val="92D050"/>
+          </a:solidFill>
+        </p:spPr>
+        <p:style>
+          <a:lnRef idx="1">
+            <a:schemeClr val="accent6"/>
+          </a:lnRef>
+          <a:fillRef idx="2">
+            <a:schemeClr val="accent6"/>
+          </a:fillRef>
+          <a:effectRef idx="1">
+            <a:schemeClr val="accent6"/>
+          </a:effectRef>
+          <a:fontRef idx="minor">
+            <a:schemeClr val="dk1"/>
+          </a:fontRef>
+        </p:style>
+        <p:txBody>
+          <a:bodyPr rtlCol="0" anchor="ctr"/>
+          <a:lstStyle/>
+          <a:p>
+            <a:pPr algn="ctr"/>
+            <a:r>
+              <a:rPr lang="en-IN" sz="3200" dirty="0">
+                <a:latin typeface="Algerian" panose="04020705040A02060702" pitchFamily="82" charset="0"/>
+              </a:rPr>
+              <a:t>#2</a:t>
+            </a:r>
+          </a:p>
+        </p:txBody>
+      </p:sp>
+      <p:sp>
+        <p:nvSpPr>
+          <p:cNvPr id="15" name="Rectangle 14">
+            <a:extLst>
+              <a:ext uri="{FF2B5EF4-FFF2-40B4-BE49-F238E27FC236}">
+                <a16:creationId xmlns:a16="http://schemas.microsoft.com/office/drawing/2014/main" id="{713E4C67-78C6-4DE6-9902-E547F39FFDD0}"/>
+              </a:ext>
+            </a:extLst>
+          </p:cNvPr>
+          <p:cNvSpPr/>
+          <p:nvPr/>
+        </p:nvSpPr>
+        <p:spPr>
+          <a:xfrm>
+            <a:off x="0" y="1"/>
+            <a:ext cx="1088089" cy="324290"/>
+          </a:xfrm>
+          <a:prstGeom prst="rect">
+            <a:avLst/>
+          </a:prstGeom>
+          <a:solidFill>
+            <a:srgbClr val="92D050"/>
+          </a:solidFill>
+        </p:spPr>
+        <p:style>
+          <a:lnRef idx="1">
+            <a:schemeClr val="accent6"/>
+          </a:lnRef>
+          <a:fillRef idx="2">
+            <a:schemeClr val="accent6"/>
+          </a:fillRef>
+          <a:effectRef idx="1">
+            <a:schemeClr val="accent6"/>
+          </a:effectRef>
+          <a:fontRef idx="minor">
+            <a:schemeClr val="dk1"/>
+          </a:fontRef>
+        </p:style>
+        <p:txBody>
+          <a:bodyPr rtlCol="0" anchor="ctr"/>
+          <a:lstStyle/>
+          <a:p>
+            <a:pPr algn="ctr"/>
+            <a:r>
+              <a:rPr lang="en-IN" sz="2000" dirty="0">
+                <a:latin typeface="Algerian" panose="04020705040A02060702" pitchFamily="82" charset="0"/>
+              </a:rPr>
+              <a:t>Arvind</a:t>
+            </a:r>
+          </a:p>
+        </p:txBody>
+      </p:sp>
+    </p:spTree>
+    <p:extLst>
+      <p:ext uri="{BB962C8B-B14F-4D97-AF65-F5344CB8AC3E}">
+        <p14:creationId xmlns:p14="http://schemas.microsoft.com/office/powerpoint/2010/main" val="3134502346"/>
+      </p:ext>
+    </p:extLst>
+  </p:cSld>
+  <p:clrMapOvr>
+    <a:masterClrMapping/>
+  </p:clrMapOvr>
+</p:sld>
+</file>
+
+<file path=ppt/slides/slide8.xml><?xml version="1.0" encoding="utf-8"?>
+<p:sld xmlns:a="http://schemas.openxmlformats.org/drawingml/2006/main" xmlns:r="http://schemas.openxmlformats.org/officeDocument/2006/relationships" xmlns:p="http://schemas.openxmlformats.org/presentationml/2006/main">
+  <p:cSld>
+    <p:spTree>
+      <p:nvGrpSpPr>
+        <p:cNvPr id="1" name=""/>
+        <p:cNvGrpSpPr/>
+        <p:nvPr/>
+      </p:nvGrpSpPr>
+      <p:grpSpPr>
+        <a:xfrm>
+          <a:off x="0" y="0"/>
+          <a:ext cx="0" cy="0"/>
+          <a:chOff x="0" y="0"/>
+          <a:chExt cx="0" cy="0"/>
+        </a:xfrm>
+      </p:grpSpPr>
+      <p:sp>
+        <p:nvSpPr>
+          <p:cNvPr id="2" name="Title 1">
+            <a:extLst>
+              <a:ext uri="{FF2B5EF4-FFF2-40B4-BE49-F238E27FC236}">
+                <a16:creationId xmlns:a16="http://schemas.microsoft.com/office/drawing/2014/main" id="{63693524-3940-440C-94DB-8F3808B23F5F}"/>
+              </a:ext>
+            </a:extLst>
+          </p:cNvPr>
+          <p:cNvSpPr>
+            <a:spLocks noGrp="1"/>
+          </p:cNvSpPr>
+          <p:nvPr>
+            <p:ph type="title"/>
+          </p:nvPr>
+        </p:nvSpPr>
+        <p:spPr>
+          <a:solidFill>
+            <a:schemeClr val="accent2">
+              <a:lumMod val="20000"/>
+              <a:lumOff val="80000"/>
+            </a:schemeClr>
+          </a:solidFill>
+        </p:spPr>
+        <p:txBody>
+          <a:bodyPr/>
+          <a:lstStyle/>
+          <a:p>
+            <a:r>
+              <a:rPr lang="en-IN" dirty="0">
+                <a:latin typeface="Algerian" panose="04020705040A02060702" pitchFamily="82" charset="0"/>
+              </a:rPr>
+              <a:t>Application </a:t>
+            </a:r>
+            <a:r>
+              <a:rPr lang="en-IN">
+                <a:latin typeface="Algerian" panose="04020705040A02060702" pitchFamily="82" charset="0"/>
+              </a:rPr>
+              <a:t>for demo</a:t>
+            </a:r>
+            <a:endParaRPr lang="en-IN" dirty="0">
+              <a:latin typeface="Algerian" panose="04020705040A02060702" pitchFamily="82" charset="0"/>
+            </a:endParaRPr>
+          </a:p>
+        </p:txBody>
+      </p:sp>
+      <p:sp>
+        <p:nvSpPr>
+          <p:cNvPr id="5" name="Rectangle 4">
+            <a:extLst>
+              <a:ext uri="{FF2B5EF4-FFF2-40B4-BE49-F238E27FC236}">
+                <a16:creationId xmlns:a16="http://schemas.microsoft.com/office/drawing/2014/main" id="{FB01FF6E-86BB-452A-BE55-298FC6856EBA}"/>
+              </a:ext>
+            </a:extLst>
+          </p:cNvPr>
+          <p:cNvSpPr/>
+          <p:nvPr/>
+        </p:nvSpPr>
+        <p:spPr>
+          <a:xfrm>
+            <a:off x="0" y="6419850"/>
+            <a:ext cx="12191999" cy="457200"/>
+          </a:xfrm>
+          <a:prstGeom prst="rect">
+            <a:avLst/>
+          </a:prstGeom>
+          <a:solidFill>
+            <a:srgbClr val="4D4D4D"/>
+          </a:solidFill>
+        </p:spPr>
+        <p:style>
+          <a:lnRef idx="2">
+            <a:schemeClr val="dk1">
+              <a:shade val="50000"/>
+            </a:schemeClr>
+          </a:lnRef>
+          <a:fillRef idx="1">
+            <a:schemeClr val="dk1"/>
+          </a:fillRef>
+          <a:effectRef idx="0">
+            <a:schemeClr val="dk1"/>
+          </a:effectRef>
+          <a:fontRef idx="minor">
+            <a:schemeClr val="lt1"/>
+          </a:fontRef>
+        </p:style>
+        <p:txBody>
+          <a:bodyPr rtlCol="0" anchor="ctr"/>
+          <a:lstStyle/>
+          <a:p>
+            <a:pPr algn="ctr"/>
+            <a:endParaRPr lang="en-IN"/>
+          </a:p>
+        </p:txBody>
+      </p:sp>
+      <p:sp>
+        <p:nvSpPr>
+          <p:cNvPr id="6" name="Rectangle 5">
+            <a:extLst>
+              <a:ext uri="{FF2B5EF4-FFF2-40B4-BE49-F238E27FC236}">
+                <a16:creationId xmlns:a16="http://schemas.microsoft.com/office/drawing/2014/main" id="{FD1C823C-6F81-435F-9B13-8F63C7B3B49C}"/>
+              </a:ext>
+            </a:extLst>
+          </p:cNvPr>
+          <p:cNvSpPr/>
+          <p:nvPr/>
+        </p:nvSpPr>
+        <p:spPr>
+          <a:xfrm>
+            <a:off x="1543050" y="3200763"/>
+            <a:ext cx="2662237" cy="1418010"/>
+          </a:xfrm>
+          <a:prstGeom prst="rect">
+            <a:avLst/>
+          </a:prstGeom>
+          <a:gradFill flip="none" rotWithShape="1">
+            <a:gsLst>
+              <a:gs pos="0">
+                <a:srgbClr val="92D050">
+                  <a:shade val="30000"/>
+                  <a:satMod val="115000"/>
+                </a:srgbClr>
+              </a:gs>
+              <a:gs pos="50000">
+                <a:srgbClr val="92D050">
+                  <a:shade val="67500"/>
+                  <a:satMod val="115000"/>
+                </a:srgbClr>
+              </a:gs>
+              <a:gs pos="100000">
+                <a:srgbClr val="92D050">
+                  <a:shade val="100000"/>
+                  <a:satMod val="115000"/>
+                </a:srgbClr>
+              </a:gs>
+            </a:gsLst>
+            <a:lin ang="8100000" scaled="1"/>
+            <a:tileRect/>
+          </a:gradFill>
+        </p:spPr>
+        <p:style>
+          <a:lnRef idx="2">
+            <a:schemeClr val="accent1">
+              <a:shade val="50000"/>
+            </a:schemeClr>
+          </a:lnRef>
+          <a:fillRef idx="1">
+            <a:schemeClr val="accent1"/>
+          </a:fillRef>
+          <a:effectRef idx="0">
+            <a:schemeClr val="accent1"/>
+          </a:effectRef>
+          <a:fontRef idx="minor">
+            <a:schemeClr val="lt1"/>
+          </a:fontRef>
+        </p:style>
+        <p:txBody>
+          <a:bodyPr rtlCol="0" anchor="ctr"/>
+          <a:lstStyle/>
+          <a:p>
+            <a:pPr algn="ctr"/>
+            <a:r>
+              <a:rPr lang="en-IN" sz="3200" dirty="0"/>
+              <a:t>Doctor Portal</a:t>
+            </a:r>
+          </a:p>
+        </p:txBody>
+      </p:sp>
+      <p:sp>
+        <p:nvSpPr>
+          <p:cNvPr id="7" name="Rectangle: Rounded Corners 6">
+            <a:extLst>
+              <a:ext uri="{FF2B5EF4-FFF2-40B4-BE49-F238E27FC236}">
+                <a16:creationId xmlns:a16="http://schemas.microsoft.com/office/drawing/2014/main" id="{815A1B0A-F345-4BF1-9766-DAA67D2E36A4}"/>
+              </a:ext>
+            </a:extLst>
+          </p:cNvPr>
+          <p:cNvSpPr/>
+          <p:nvPr/>
+        </p:nvSpPr>
+        <p:spPr>
+          <a:xfrm>
+            <a:off x="8515349" y="2126765"/>
+            <a:ext cx="1933575" cy="900113"/>
+          </a:xfrm>
+          <a:prstGeom prst="roundRect">
+            <a:avLst/>
+          </a:prstGeom>
+          <a:gradFill flip="none" rotWithShape="1">
+            <a:gsLst>
+              <a:gs pos="0">
+                <a:srgbClr val="92D050">
+                  <a:shade val="30000"/>
+                  <a:satMod val="115000"/>
+                </a:srgbClr>
+              </a:gs>
+              <a:gs pos="50000">
+                <a:srgbClr val="92D050">
+                  <a:shade val="67500"/>
+                  <a:satMod val="115000"/>
+                </a:srgbClr>
+              </a:gs>
+              <a:gs pos="100000">
+                <a:srgbClr val="92D050">
+                  <a:shade val="100000"/>
+                  <a:satMod val="115000"/>
+                </a:srgbClr>
+              </a:gs>
+            </a:gsLst>
+            <a:lin ang="8100000" scaled="1"/>
+            <a:tileRect/>
+          </a:gradFill>
+        </p:spPr>
+        <p:style>
+          <a:lnRef idx="2">
+            <a:schemeClr val="accent1">
+              <a:shade val="50000"/>
+            </a:schemeClr>
+          </a:lnRef>
+          <a:fillRef idx="1">
+            <a:schemeClr val="accent1"/>
+          </a:fillRef>
+          <a:effectRef idx="0">
+            <a:schemeClr val="accent1"/>
+          </a:effectRef>
+          <a:fontRef idx="minor">
+            <a:schemeClr val="lt1"/>
+          </a:fontRef>
+        </p:style>
+        <p:txBody>
+          <a:bodyPr rtlCol="0" anchor="ctr"/>
+          <a:lstStyle/>
+          <a:p>
+            <a:pPr algn="ctr"/>
+            <a:r>
+              <a:rPr lang="en-IN" dirty="0" err="1"/>
+              <a:t>DoctorService</a:t>
+            </a:r>
+            <a:endParaRPr lang="en-IN" dirty="0"/>
+          </a:p>
+        </p:txBody>
+      </p:sp>
+      <p:sp>
+        <p:nvSpPr>
+          <p:cNvPr id="8" name="Rectangle: Rounded Corners 7">
+            <a:extLst>
+              <a:ext uri="{FF2B5EF4-FFF2-40B4-BE49-F238E27FC236}">
+                <a16:creationId xmlns:a16="http://schemas.microsoft.com/office/drawing/2014/main" id="{24CA937F-905F-40AF-90AD-258FD530FA69}"/>
+              </a:ext>
+            </a:extLst>
+          </p:cNvPr>
+          <p:cNvSpPr/>
+          <p:nvPr/>
+        </p:nvSpPr>
+        <p:spPr>
+          <a:xfrm>
+            <a:off x="8515349" y="3474757"/>
+            <a:ext cx="1933575" cy="900113"/>
+          </a:xfrm>
+          <a:prstGeom prst="roundRect">
+            <a:avLst/>
+          </a:prstGeom>
+          <a:gradFill flip="none" rotWithShape="1">
+            <a:gsLst>
+              <a:gs pos="0">
+                <a:srgbClr val="92D050">
+                  <a:shade val="30000"/>
+                  <a:satMod val="115000"/>
+                </a:srgbClr>
+              </a:gs>
+              <a:gs pos="50000">
+                <a:srgbClr val="92D050">
+                  <a:shade val="67500"/>
+                  <a:satMod val="115000"/>
+                </a:srgbClr>
+              </a:gs>
+              <a:gs pos="100000">
+                <a:srgbClr val="92D050">
+                  <a:shade val="100000"/>
+                  <a:satMod val="115000"/>
+                </a:srgbClr>
+              </a:gs>
+            </a:gsLst>
+            <a:lin ang="8100000" scaled="1"/>
+            <a:tileRect/>
+          </a:gradFill>
+        </p:spPr>
+        <p:style>
+          <a:lnRef idx="2">
+            <a:schemeClr val="accent1">
+              <a:shade val="50000"/>
+            </a:schemeClr>
+          </a:lnRef>
+          <a:fillRef idx="1">
+            <a:schemeClr val="accent1"/>
+          </a:fillRef>
+          <a:effectRef idx="0">
+            <a:schemeClr val="accent1"/>
+          </a:effectRef>
+          <a:fontRef idx="minor">
+            <a:schemeClr val="lt1"/>
+          </a:fontRef>
+        </p:style>
+        <p:txBody>
+          <a:bodyPr rtlCol="0" anchor="ctr"/>
+          <a:lstStyle/>
+          <a:p>
+            <a:pPr algn="ctr"/>
+            <a:r>
+              <a:rPr lang="en-IN" dirty="0" err="1"/>
+              <a:t>PatientService</a:t>
+            </a:r>
+            <a:endParaRPr lang="en-IN" dirty="0"/>
+          </a:p>
+        </p:txBody>
+      </p:sp>
+      <p:sp>
+        <p:nvSpPr>
+          <p:cNvPr id="9" name="Rectangle: Rounded Corners 8">
+            <a:extLst>
+              <a:ext uri="{FF2B5EF4-FFF2-40B4-BE49-F238E27FC236}">
+                <a16:creationId xmlns:a16="http://schemas.microsoft.com/office/drawing/2014/main" id="{7514082C-68C3-4BBA-80B8-3AEE4333217D}"/>
+              </a:ext>
+            </a:extLst>
+          </p:cNvPr>
+          <p:cNvSpPr/>
+          <p:nvPr/>
+        </p:nvSpPr>
+        <p:spPr>
+          <a:xfrm>
+            <a:off x="8510236" y="4912341"/>
+            <a:ext cx="2016569" cy="900113"/>
+          </a:xfrm>
+          <a:prstGeom prst="roundRect">
+            <a:avLst/>
+          </a:prstGeom>
+          <a:gradFill flip="none" rotWithShape="1">
+            <a:gsLst>
+              <a:gs pos="0">
+                <a:srgbClr val="92D050">
+                  <a:shade val="30000"/>
+                  <a:satMod val="115000"/>
+                </a:srgbClr>
+              </a:gs>
+              <a:gs pos="50000">
+                <a:srgbClr val="92D050">
+                  <a:shade val="67500"/>
+                  <a:satMod val="115000"/>
+                </a:srgbClr>
+              </a:gs>
+              <a:gs pos="100000">
+                <a:srgbClr val="92D050">
+                  <a:shade val="100000"/>
+                  <a:satMod val="115000"/>
+                </a:srgbClr>
+              </a:gs>
+            </a:gsLst>
+            <a:lin ang="8100000" scaled="1"/>
+            <a:tileRect/>
+          </a:gradFill>
+        </p:spPr>
+        <p:style>
+          <a:lnRef idx="2">
+            <a:schemeClr val="accent1">
+              <a:shade val="50000"/>
+            </a:schemeClr>
+          </a:lnRef>
+          <a:fillRef idx="1">
+            <a:schemeClr val="accent1"/>
+          </a:fillRef>
+          <a:effectRef idx="0">
+            <a:schemeClr val="accent1"/>
+          </a:effectRef>
+          <a:fontRef idx="minor">
+            <a:schemeClr val="lt1"/>
+          </a:fontRef>
+        </p:style>
+        <p:txBody>
+          <a:bodyPr rtlCol="0" anchor="ctr"/>
+          <a:lstStyle/>
+          <a:p>
+            <a:pPr algn="ctr"/>
+            <a:r>
+              <a:rPr lang="en-IN" dirty="0" err="1"/>
+              <a:t>DiseaseService</a:t>
+            </a:r>
+            <a:endParaRPr lang="en-IN" dirty="0"/>
+          </a:p>
+        </p:txBody>
+      </p:sp>
+      <p:cxnSp>
+        <p:nvCxnSpPr>
+          <p:cNvPr id="10" name="Straight Arrow Connector 9">
+            <a:extLst>
+              <a:ext uri="{FF2B5EF4-FFF2-40B4-BE49-F238E27FC236}">
+                <a16:creationId xmlns:a16="http://schemas.microsoft.com/office/drawing/2014/main" id="{25A3D3A2-228F-47A4-9ADF-31AECD20EDA1}"/>
+              </a:ext>
+            </a:extLst>
+          </p:cNvPr>
+          <p:cNvCxnSpPr/>
+          <p:nvPr/>
+        </p:nvCxnSpPr>
+        <p:spPr>
+          <a:xfrm flipV="1">
+            <a:off x="4207668" y="2464690"/>
+            <a:ext cx="4305300" cy="1260000"/>
+          </a:xfrm>
+          <a:prstGeom prst="straightConnector1">
+            <a:avLst/>
+          </a:prstGeom>
+          <a:ln>
+            <a:tailEnd type="triangle"/>
+          </a:ln>
+        </p:spPr>
+        <p:style>
+          <a:lnRef idx="3">
+            <a:schemeClr val="accent6"/>
+          </a:lnRef>
+          <a:fillRef idx="0">
+            <a:schemeClr val="accent6"/>
+          </a:fillRef>
+          <a:effectRef idx="2">
+            <a:schemeClr val="accent6"/>
+          </a:effectRef>
+          <a:fontRef idx="minor">
+            <a:schemeClr val="tx1"/>
+          </a:fontRef>
+        </p:style>
+      </p:cxnSp>
+      <p:cxnSp>
+        <p:nvCxnSpPr>
+          <p:cNvPr id="11" name="Straight Arrow Connector 10">
+            <a:extLst>
+              <a:ext uri="{FF2B5EF4-FFF2-40B4-BE49-F238E27FC236}">
+                <a16:creationId xmlns:a16="http://schemas.microsoft.com/office/drawing/2014/main" id="{8B9730C1-7404-40CE-AB6A-D839CF4EAEE8}"/>
+              </a:ext>
+            </a:extLst>
+          </p:cNvPr>
+          <p:cNvCxnSpPr>
+            <a:cxnSpLocks/>
+          </p:cNvCxnSpPr>
+          <p:nvPr/>
+        </p:nvCxnSpPr>
+        <p:spPr>
+          <a:xfrm>
+            <a:off x="4205287" y="3934407"/>
+            <a:ext cx="4310061" cy="70406"/>
+          </a:xfrm>
+          <a:prstGeom prst="straightConnector1">
+            <a:avLst/>
+          </a:prstGeom>
+          <a:ln>
+            <a:tailEnd type="triangle"/>
+          </a:ln>
+        </p:spPr>
+        <p:style>
+          <a:lnRef idx="3">
+            <a:schemeClr val="accent6"/>
+          </a:lnRef>
+          <a:fillRef idx="0">
+            <a:schemeClr val="accent6"/>
+          </a:fillRef>
+          <a:effectRef idx="2">
+            <a:schemeClr val="accent6"/>
+          </a:effectRef>
+          <a:fontRef idx="minor">
+            <a:schemeClr val="tx1"/>
+          </a:fontRef>
+        </p:style>
+      </p:cxnSp>
+      <p:cxnSp>
+        <p:nvCxnSpPr>
+          <p:cNvPr id="12" name="Straight Arrow Connector 11">
+            <a:extLst>
+              <a:ext uri="{FF2B5EF4-FFF2-40B4-BE49-F238E27FC236}">
+                <a16:creationId xmlns:a16="http://schemas.microsoft.com/office/drawing/2014/main" id="{B6314858-F816-4369-BD26-3E4D660D8540}"/>
+              </a:ext>
+            </a:extLst>
+          </p:cNvPr>
+          <p:cNvCxnSpPr>
+            <a:cxnSpLocks/>
+          </p:cNvCxnSpPr>
+          <p:nvPr/>
+        </p:nvCxnSpPr>
+        <p:spPr>
+          <a:xfrm>
+            <a:off x="4202906" y="4172569"/>
+            <a:ext cx="4432205" cy="1275474"/>
+          </a:xfrm>
+          <a:prstGeom prst="straightConnector1">
+            <a:avLst/>
+          </a:prstGeom>
+          <a:ln>
+            <a:tailEnd type="triangle"/>
+          </a:ln>
+        </p:spPr>
+        <p:style>
+          <a:lnRef idx="3">
+            <a:schemeClr val="accent6"/>
+          </a:lnRef>
+          <a:fillRef idx="0">
+            <a:schemeClr val="accent6"/>
+          </a:fillRef>
+          <a:effectRef idx="2">
+            <a:schemeClr val="accent6"/>
+          </a:effectRef>
+          <a:fontRef idx="minor">
+            <a:schemeClr val="tx1"/>
+          </a:fontRef>
+        </p:style>
+      </p:cxnSp>
+    </p:spTree>
+    <p:extLst>
+      <p:ext uri="{BB962C8B-B14F-4D97-AF65-F5344CB8AC3E}">
+        <p14:creationId xmlns:p14="http://schemas.microsoft.com/office/powerpoint/2010/main" val="3665447396"/>
+      </p:ext>
+    </p:extLst>
+  </p:cSld>
+  <p:clrMapOvr>
+    <a:masterClrMapping/>
+  </p:clrMapOvr>
+</p:sld>
+</file>
+
 <file path=ppt/theme/theme1.xml><?xml version="1.0" encoding="utf-8"?>
 <a:theme xmlns:a="http://schemas.openxmlformats.org/drawingml/2006/main" name="AccentBoxVTI">
   <a:themeElements>

</xml_diff>

<commit_message>
load balancer with service discovery
</commit_message>
<xml_diff>
--- a/LOAD BALANCING.pptx
+++ b/LOAD BALANCING.pptx
@@ -12,7 +12,12 @@
     <p:sldId id="259" r:id="rId6"/>
     <p:sldId id="277" r:id="rId7"/>
     <p:sldId id="278" r:id="rId8"/>
-    <p:sldId id="279" r:id="rId9"/>
+    <p:sldId id="280" r:id="rId9"/>
+    <p:sldId id="281" r:id="rId10"/>
+    <p:sldId id="284" r:id="rId11"/>
+    <p:sldId id="282" r:id="rId12"/>
+    <p:sldId id="283" r:id="rId13"/>
+    <p:sldId id="279" r:id="rId14"/>
   </p:sldIdLst>
   <p:sldSz cx="12192000" cy="6858000"/>
   <p:notesSz cx="6858000" cy="9144000"/>
@@ -5898,6 +5903,2527 @@
     <p:extLst>
       <p:ext uri="{BB962C8B-B14F-4D97-AF65-F5344CB8AC3E}">
         <p14:creationId xmlns:p14="http://schemas.microsoft.com/office/powerpoint/2010/main" val="153659585"/>
+      </p:ext>
+    </p:extLst>
+  </p:cSld>
+  <p:clrMapOvr>
+    <a:masterClrMapping/>
+  </p:clrMapOvr>
+</p:sld>
+</file>
+
+<file path=ppt/slides/slide10.xml><?xml version="1.0" encoding="utf-8"?>
+<p:sld xmlns:a="http://schemas.openxmlformats.org/drawingml/2006/main" xmlns:r="http://schemas.openxmlformats.org/officeDocument/2006/relationships" xmlns:p="http://schemas.openxmlformats.org/presentationml/2006/main">
+  <p:cSld>
+    <p:spTree>
+      <p:nvGrpSpPr>
+        <p:cNvPr id="1" name=""/>
+        <p:cNvGrpSpPr/>
+        <p:nvPr/>
+      </p:nvGrpSpPr>
+      <p:grpSpPr>
+        <a:xfrm>
+          <a:off x="0" y="0"/>
+          <a:ext cx="0" cy="0"/>
+          <a:chOff x="0" y="0"/>
+          <a:chExt cx="0" cy="0"/>
+        </a:xfrm>
+      </p:grpSpPr>
+      <p:sp>
+        <p:nvSpPr>
+          <p:cNvPr id="2" name="Title 1">
+            <a:extLst>
+              <a:ext uri="{FF2B5EF4-FFF2-40B4-BE49-F238E27FC236}">
+                <a16:creationId xmlns:a16="http://schemas.microsoft.com/office/drawing/2014/main" id="{63693524-3940-440C-94DB-8F3808B23F5F}"/>
+              </a:ext>
+            </a:extLst>
+          </p:cNvPr>
+          <p:cNvSpPr>
+            <a:spLocks noGrp="1"/>
+          </p:cNvSpPr>
+          <p:nvPr>
+            <p:ph type="title"/>
+          </p:nvPr>
+        </p:nvSpPr>
+        <p:spPr>
+          <a:solidFill>
+            <a:schemeClr val="accent2">
+              <a:lumMod val="20000"/>
+              <a:lumOff val="80000"/>
+            </a:schemeClr>
+          </a:solidFill>
+        </p:spPr>
+        <p:txBody>
+          <a:bodyPr/>
+          <a:lstStyle/>
+          <a:p>
+            <a:r>
+              <a:rPr lang="en-IN" dirty="0">
+                <a:latin typeface="Algerian" panose="04020705040A02060702" pitchFamily="82" charset="0"/>
+              </a:rPr>
+              <a:t>Application for demo</a:t>
+            </a:r>
+          </a:p>
+        </p:txBody>
+      </p:sp>
+      <p:sp>
+        <p:nvSpPr>
+          <p:cNvPr id="5" name="Rectangle 4">
+            <a:extLst>
+              <a:ext uri="{FF2B5EF4-FFF2-40B4-BE49-F238E27FC236}">
+                <a16:creationId xmlns:a16="http://schemas.microsoft.com/office/drawing/2014/main" id="{FB01FF6E-86BB-452A-BE55-298FC6856EBA}"/>
+              </a:ext>
+            </a:extLst>
+          </p:cNvPr>
+          <p:cNvSpPr/>
+          <p:nvPr/>
+        </p:nvSpPr>
+        <p:spPr>
+          <a:xfrm>
+            <a:off x="0" y="6419850"/>
+            <a:ext cx="12191999" cy="457200"/>
+          </a:xfrm>
+          <a:prstGeom prst="rect">
+            <a:avLst/>
+          </a:prstGeom>
+          <a:solidFill>
+            <a:srgbClr val="4D4D4D"/>
+          </a:solidFill>
+        </p:spPr>
+        <p:style>
+          <a:lnRef idx="2">
+            <a:schemeClr val="dk1">
+              <a:shade val="50000"/>
+            </a:schemeClr>
+          </a:lnRef>
+          <a:fillRef idx="1">
+            <a:schemeClr val="dk1"/>
+          </a:fillRef>
+          <a:effectRef idx="0">
+            <a:schemeClr val="dk1"/>
+          </a:effectRef>
+          <a:fontRef idx="minor">
+            <a:schemeClr val="lt1"/>
+          </a:fontRef>
+        </p:style>
+        <p:txBody>
+          <a:bodyPr rtlCol="0" anchor="ctr"/>
+          <a:lstStyle/>
+          <a:p>
+            <a:pPr algn="ctr"/>
+            <a:endParaRPr lang="en-IN"/>
+          </a:p>
+        </p:txBody>
+      </p:sp>
+      <p:sp>
+        <p:nvSpPr>
+          <p:cNvPr id="6" name="Rectangle 5">
+            <a:extLst>
+              <a:ext uri="{FF2B5EF4-FFF2-40B4-BE49-F238E27FC236}">
+                <a16:creationId xmlns:a16="http://schemas.microsoft.com/office/drawing/2014/main" id="{FD1C823C-6F81-435F-9B13-8F63C7B3B49C}"/>
+              </a:ext>
+            </a:extLst>
+          </p:cNvPr>
+          <p:cNvSpPr/>
+          <p:nvPr/>
+        </p:nvSpPr>
+        <p:spPr>
+          <a:xfrm>
+            <a:off x="1543050" y="3200763"/>
+            <a:ext cx="2662237" cy="1418010"/>
+          </a:xfrm>
+          <a:prstGeom prst="rect">
+            <a:avLst/>
+          </a:prstGeom>
+          <a:gradFill flip="none" rotWithShape="1">
+            <a:gsLst>
+              <a:gs pos="0">
+                <a:srgbClr val="92D050">
+                  <a:shade val="30000"/>
+                  <a:satMod val="115000"/>
+                </a:srgbClr>
+              </a:gs>
+              <a:gs pos="50000">
+                <a:srgbClr val="92D050">
+                  <a:shade val="67500"/>
+                  <a:satMod val="115000"/>
+                </a:srgbClr>
+              </a:gs>
+              <a:gs pos="100000">
+                <a:srgbClr val="92D050">
+                  <a:shade val="100000"/>
+                  <a:satMod val="115000"/>
+                </a:srgbClr>
+              </a:gs>
+            </a:gsLst>
+            <a:lin ang="8100000" scaled="1"/>
+            <a:tileRect/>
+          </a:gradFill>
+        </p:spPr>
+        <p:style>
+          <a:lnRef idx="2">
+            <a:schemeClr val="accent1">
+              <a:shade val="50000"/>
+            </a:schemeClr>
+          </a:lnRef>
+          <a:fillRef idx="1">
+            <a:schemeClr val="accent1"/>
+          </a:fillRef>
+          <a:effectRef idx="0">
+            <a:schemeClr val="accent1"/>
+          </a:effectRef>
+          <a:fontRef idx="minor">
+            <a:schemeClr val="lt1"/>
+          </a:fontRef>
+        </p:style>
+        <p:txBody>
+          <a:bodyPr rtlCol="0" anchor="ctr"/>
+          <a:lstStyle/>
+          <a:p>
+            <a:pPr algn="ctr"/>
+            <a:r>
+              <a:rPr lang="en-IN" sz="3200" dirty="0"/>
+              <a:t>Doctor Portal</a:t>
+            </a:r>
+          </a:p>
+        </p:txBody>
+      </p:sp>
+      <p:sp>
+        <p:nvSpPr>
+          <p:cNvPr id="7" name="Rectangle: Rounded Corners 6">
+            <a:extLst>
+              <a:ext uri="{FF2B5EF4-FFF2-40B4-BE49-F238E27FC236}">
+                <a16:creationId xmlns:a16="http://schemas.microsoft.com/office/drawing/2014/main" id="{815A1B0A-F345-4BF1-9766-DAA67D2E36A4}"/>
+              </a:ext>
+            </a:extLst>
+          </p:cNvPr>
+          <p:cNvSpPr/>
+          <p:nvPr/>
+        </p:nvSpPr>
+        <p:spPr>
+          <a:xfrm>
+            <a:off x="8515349" y="2126765"/>
+            <a:ext cx="1933575" cy="900113"/>
+          </a:xfrm>
+          <a:prstGeom prst="roundRect">
+            <a:avLst/>
+          </a:prstGeom>
+          <a:gradFill flip="none" rotWithShape="1">
+            <a:gsLst>
+              <a:gs pos="0">
+                <a:srgbClr val="92D050">
+                  <a:shade val="30000"/>
+                  <a:satMod val="115000"/>
+                </a:srgbClr>
+              </a:gs>
+              <a:gs pos="50000">
+                <a:srgbClr val="92D050">
+                  <a:shade val="67500"/>
+                  <a:satMod val="115000"/>
+                </a:srgbClr>
+              </a:gs>
+              <a:gs pos="100000">
+                <a:srgbClr val="92D050">
+                  <a:shade val="100000"/>
+                  <a:satMod val="115000"/>
+                </a:srgbClr>
+              </a:gs>
+            </a:gsLst>
+            <a:lin ang="8100000" scaled="1"/>
+            <a:tileRect/>
+          </a:gradFill>
+        </p:spPr>
+        <p:style>
+          <a:lnRef idx="2">
+            <a:schemeClr val="accent1">
+              <a:shade val="50000"/>
+            </a:schemeClr>
+          </a:lnRef>
+          <a:fillRef idx="1">
+            <a:schemeClr val="accent1"/>
+          </a:fillRef>
+          <a:effectRef idx="0">
+            <a:schemeClr val="accent1"/>
+          </a:effectRef>
+          <a:fontRef idx="minor">
+            <a:schemeClr val="lt1"/>
+          </a:fontRef>
+        </p:style>
+        <p:txBody>
+          <a:bodyPr rtlCol="0" anchor="ctr"/>
+          <a:lstStyle/>
+          <a:p>
+            <a:pPr algn="ctr"/>
+            <a:r>
+              <a:rPr lang="en-IN" dirty="0" err="1"/>
+              <a:t>DoctorService</a:t>
+            </a:r>
+            <a:endParaRPr lang="en-IN" dirty="0"/>
+          </a:p>
+        </p:txBody>
+      </p:sp>
+      <p:sp>
+        <p:nvSpPr>
+          <p:cNvPr id="8" name="Rectangle: Rounded Corners 7">
+            <a:extLst>
+              <a:ext uri="{FF2B5EF4-FFF2-40B4-BE49-F238E27FC236}">
+                <a16:creationId xmlns:a16="http://schemas.microsoft.com/office/drawing/2014/main" id="{24CA937F-905F-40AF-90AD-258FD530FA69}"/>
+              </a:ext>
+            </a:extLst>
+          </p:cNvPr>
+          <p:cNvSpPr/>
+          <p:nvPr/>
+        </p:nvSpPr>
+        <p:spPr>
+          <a:xfrm>
+            <a:off x="8515349" y="3474757"/>
+            <a:ext cx="1933575" cy="900113"/>
+          </a:xfrm>
+          <a:prstGeom prst="roundRect">
+            <a:avLst/>
+          </a:prstGeom>
+          <a:gradFill flip="none" rotWithShape="1">
+            <a:gsLst>
+              <a:gs pos="0">
+                <a:srgbClr val="92D050">
+                  <a:shade val="30000"/>
+                  <a:satMod val="115000"/>
+                </a:srgbClr>
+              </a:gs>
+              <a:gs pos="50000">
+                <a:srgbClr val="92D050">
+                  <a:shade val="67500"/>
+                  <a:satMod val="115000"/>
+                </a:srgbClr>
+              </a:gs>
+              <a:gs pos="100000">
+                <a:srgbClr val="92D050">
+                  <a:shade val="100000"/>
+                  <a:satMod val="115000"/>
+                </a:srgbClr>
+              </a:gs>
+            </a:gsLst>
+            <a:lin ang="8100000" scaled="1"/>
+            <a:tileRect/>
+          </a:gradFill>
+        </p:spPr>
+        <p:style>
+          <a:lnRef idx="2">
+            <a:schemeClr val="accent1">
+              <a:shade val="50000"/>
+            </a:schemeClr>
+          </a:lnRef>
+          <a:fillRef idx="1">
+            <a:schemeClr val="accent1"/>
+          </a:fillRef>
+          <a:effectRef idx="0">
+            <a:schemeClr val="accent1"/>
+          </a:effectRef>
+          <a:fontRef idx="minor">
+            <a:schemeClr val="lt1"/>
+          </a:fontRef>
+        </p:style>
+        <p:txBody>
+          <a:bodyPr rtlCol="0" anchor="ctr"/>
+          <a:lstStyle/>
+          <a:p>
+            <a:pPr algn="ctr"/>
+            <a:r>
+              <a:rPr lang="en-IN" dirty="0" err="1"/>
+              <a:t>PatientService</a:t>
+            </a:r>
+            <a:endParaRPr lang="en-IN" dirty="0"/>
+          </a:p>
+        </p:txBody>
+      </p:sp>
+      <p:sp>
+        <p:nvSpPr>
+          <p:cNvPr id="9" name="Rectangle: Rounded Corners 8">
+            <a:extLst>
+              <a:ext uri="{FF2B5EF4-FFF2-40B4-BE49-F238E27FC236}">
+                <a16:creationId xmlns:a16="http://schemas.microsoft.com/office/drawing/2014/main" id="{7514082C-68C3-4BBA-80B8-3AEE4333217D}"/>
+              </a:ext>
+            </a:extLst>
+          </p:cNvPr>
+          <p:cNvSpPr/>
+          <p:nvPr/>
+        </p:nvSpPr>
+        <p:spPr>
+          <a:xfrm>
+            <a:off x="8510236" y="4912341"/>
+            <a:ext cx="2016569" cy="900113"/>
+          </a:xfrm>
+          <a:prstGeom prst="roundRect">
+            <a:avLst/>
+          </a:prstGeom>
+          <a:gradFill flip="none" rotWithShape="1">
+            <a:gsLst>
+              <a:gs pos="0">
+                <a:srgbClr val="92D050">
+                  <a:shade val="30000"/>
+                  <a:satMod val="115000"/>
+                </a:srgbClr>
+              </a:gs>
+              <a:gs pos="50000">
+                <a:srgbClr val="92D050">
+                  <a:shade val="67500"/>
+                  <a:satMod val="115000"/>
+                </a:srgbClr>
+              </a:gs>
+              <a:gs pos="100000">
+                <a:srgbClr val="92D050">
+                  <a:shade val="100000"/>
+                  <a:satMod val="115000"/>
+                </a:srgbClr>
+              </a:gs>
+            </a:gsLst>
+            <a:lin ang="8100000" scaled="1"/>
+            <a:tileRect/>
+          </a:gradFill>
+        </p:spPr>
+        <p:style>
+          <a:lnRef idx="2">
+            <a:schemeClr val="accent1">
+              <a:shade val="50000"/>
+            </a:schemeClr>
+          </a:lnRef>
+          <a:fillRef idx="1">
+            <a:schemeClr val="accent1"/>
+          </a:fillRef>
+          <a:effectRef idx="0">
+            <a:schemeClr val="accent1"/>
+          </a:effectRef>
+          <a:fontRef idx="minor">
+            <a:schemeClr val="lt1"/>
+          </a:fontRef>
+        </p:style>
+        <p:txBody>
+          <a:bodyPr rtlCol="0" anchor="ctr"/>
+          <a:lstStyle/>
+          <a:p>
+            <a:pPr algn="ctr"/>
+            <a:r>
+              <a:rPr lang="en-IN" dirty="0" err="1"/>
+              <a:t>DiseaseService</a:t>
+            </a:r>
+            <a:endParaRPr lang="en-IN" dirty="0"/>
+          </a:p>
+        </p:txBody>
+      </p:sp>
+      <p:cxnSp>
+        <p:nvCxnSpPr>
+          <p:cNvPr id="10" name="Straight Arrow Connector 9">
+            <a:extLst>
+              <a:ext uri="{FF2B5EF4-FFF2-40B4-BE49-F238E27FC236}">
+                <a16:creationId xmlns:a16="http://schemas.microsoft.com/office/drawing/2014/main" id="{25A3D3A2-228F-47A4-9ADF-31AECD20EDA1}"/>
+              </a:ext>
+            </a:extLst>
+          </p:cNvPr>
+          <p:cNvCxnSpPr/>
+          <p:nvPr/>
+        </p:nvCxnSpPr>
+        <p:spPr>
+          <a:xfrm flipV="1">
+            <a:off x="4207668" y="2464690"/>
+            <a:ext cx="4305300" cy="1260000"/>
+          </a:xfrm>
+          <a:prstGeom prst="straightConnector1">
+            <a:avLst/>
+          </a:prstGeom>
+          <a:ln>
+            <a:tailEnd type="triangle"/>
+          </a:ln>
+        </p:spPr>
+        <p:style>
+          <a:lnRef idx="3">
+            <a:schemeClr val="accent6"/>
+          </a:lnRef>
+          <a:fillRef idx="0">
+            <a:schemeClr val="accent6"/>
+          </a:fillRef>
+          <a:effectRef idx="2">
+            <a:schemeClr val="accent6"/>
+          </a:effectRef>
+          <a:fontRef idx="minor">
+            <a:schemeClr val="tx1"/>
+          </a:fontRef>
+        </p:style>
+      </p:cxnSp>
+      <p:cxnSp>
+        <p:nvCxnSpPr>
+          <p:cNvPr id="11" name="Straight Arrow Connector 10">
+            <a:extLst>
+              <a:ext uri="{FF2B5EF4-FFF2-40B4-BE49-F238E27FC236}">
+                <a16:creationId xmlns:a16="http://schemas.microsoft.com/office/drawing/2014/main" id="{8B9730C1-7404-40CE-AB6A-D839CF4EAEE8}"/>
+              </a:ext>
+            </a:extLst>
+          </p:cNvPr>
+          <p:cNvCxnSpPr>
+            <a:cxnSpLocks/>
+          </p:cNvCxnSpPr>
+          <p:nvPr/>
+        </p:nvCxnSpPr>
+        <p:spPr>
+          <a:xfrm>
+            <a:off x="4205287" y="3934407"/>
+            <a:ext cx="4310061" cy="70406"/>
+          </a:xfrm>
+          <a:prstGeom prst="straightConnector1">
+            <a:avLst/>
+          </a:prstGeom>
+          <a:ln>
+            <a:tailEnd type="triangle"/>
+          </a:ln>
+        </p:spPr>
+        <p:style>
+          <a:lnRef idx="3">
+            <a:schemeClr val="accent6"/>
+          </a:lnRef>
+          <a:fillRef idx="0">
+            <a:schemeClr val="accent6"/>
+          </a:fillRef>
+          <a:effectRef idx="2">
+            <a:schemeClr val="accent6"/>
+          </a:effectRef>
+          <a:fontRef idx="minor">
+            <a:schemeClr val="tx1"/>
+          </a:fontRef>
+        </p:style>
+      </p:cxnSp>
+      <p:cxnSp>
+        <p:nvCxnSpPr>
+          <p:cNvPr id="12" name="Straight Arrow Connector 11">
+            <a:extLst>
+              <a:ext uri="{FF2B5EF4-FFF2-40B4-BE49-F238E27FC236}">
+                <a16:creationId xmlns:a16="http://schemas.microsoft.com/office/drawing/2014/main" id="{B6314858-F816-4369-BD26-3E4D660D8540}"/>
+              </a:ext>
+            </a:extLst>
+          </p:cNvPr>
+          <p:cNvCxnSpPr>
+            <a:cxnSpLocks/>
+          </p:cNvCxnSpPr>
+          <p:nvPr/>
+        </p:nvCxnSpPr>
+        <p:spPr>
+          <a:xfrm>
+            <a:off x="4202906" y="4172569"/>
+            <a:ext cx="4432205" cy="1275474"/>
+          </a:xfrm>
+          <a:prstGeom prst="straightConnector1">
+            <a:avLst/>
+          </a:prstGeom>
+          <a:ln>
+            <a:tailEnd type="triangle"/>
+          </a:ln>
+        </p:spPr>
+        <p:style>
+          <a:lnRef idx="3">
+            <a:schemeClr val="accent6"/>
+          </a:lnRef>
+          <a:fillRef idx="0">
+            <a:schemeClr val="accent6"/>
+          </a:fillRef>
+          <a:effectRef idx="2">
+            <a:schemeClr val="accent6"/>
+          </a:effectRef>
+          <a:fontRef idx="minor">
+            <a:schemeClr val="tx1"/>
+          </a:fontRef>
+        </p:style>
+      </p:cxnSp>
+      <p:sp>
+        <p:nvSpPr>
+          <p:cNvPr id="3" name="Rectangle 2">
+            <a:extLst>
+              <a:ext uri="{FF2B5EF4-FFF2-40B4-BE49-F238E27FC236}">
+                <a16:creationId xmlns:a16="http://schemas.microsoft.com/office/drawing/2014/main" id="{C7D9278E-F62B-4E7B-8784-693E7AE0CD56}"/>
+              </a:ext>
+            </a:extLst>
+          </p:cNvPr>
+          <p:cNvSpPr/>
+          <p:nvPr/>
+        </p:nvSpPr>
+        <p:spPr>
+          <a:xfrm>
+            <a:off x="5999908" y="1540735"/>
+            <a:ext cx="838200" cy="4857750"/>
+          </a:xfrm>
+          <a:prstGeom prst="rect">
+            <a:avLst/>
+          </a:prstGeom>
+        </p:spPr>
+        <p:style>
+          <a:lnRef idx="2">
+            <a:schemeClr val="accent1">
+              <a:shade val="50000"/>
+            </a:schemeClr>
+          </a:lnRef>
+          <a:fillRef idx="1">
+            <a:schemeClr val="accent1"/>
+          </a:fillRef>
+          <a:effectRef idx="0">
+            <a:schemeClr val="accent1"/>
+          </a:effectRef>
+          <a:fontRef idx="minor">
+            <a:schemeClr val="lt1"/>
+          </a:fontRef>
+        </p:style>
+        <p:txBody>
+          <a:bodyPr rtlCol="0" anchor="ctr"/>
+          <a:lstStyle/>
+          <a:p>
+            <a:pPr algn="ctr"/>
+            <a:r>
+              <a:rPr lang="en-IN" dirty="0"/>
+              <a:t>S</a:t>
+            </a:r>
+          </a:p>
+          <a:p>
+            <a:pPr algn="ctr"/>
+            <a:r>
+              <a:rPr lang="en-IN" dirty="0"/>
+              <a:t>E</a:t>
+            </a:r>
+          </a:p>
+          <a:p>
+            <a:pPr algn="ctr"/>
+            <a:r>
+              <a:rPr lang="en-IN" dirty="0"/>
+              <a:t>R</a:t>
+            </a:r>
+          </a:p>
+          <a:p>
+            <a:pPr algn="ctr"/>
+            <a:r>
+              <a:rPr lang="en-IN" dirty="0"/>
+              <a:t>V</a:t>
+            </a:r>
+          </a:p>
+          <a:p>
+            <a:pPr algn="ctr"/>
+            <a:r>
+              <a:rPr lang="en-IN" dirty="0"/>
+              <a:t>I</a:t>
+            </a:r>
+          </a:p>
+          <a:p>
+            <a:pPr algn="ctr"/>
+            <a:r>
+              <a:rPr lang="en-IN" dirty="0"/>
+              <a:t>C</a:t>
+            </a:r>
+          </a:p>
+          <a:p>
+            <a:pPr algn="ctr"/>
+            <a:r>
+              <a:rPr lang="en-IN" dirty="0"/>
+              <a:t>E</a:t>
+            </a:r>
+          </a:p>
+          <a:p>
+            <a:pPr algn="ctr"/>
+            <a:r>
+              <a:rPr lang="en-IN" dirty="0"/>
+              <a:t>D</a:t>
+            </a:r>
+          </a:p>
+          <a:p>
+            <a:pPr algn="ctr"/>
+            <a:r>
+              <a:rPr lang="en-IN" dirty="0"/>
+              <a:t>I</a:t>
+            </a:r>
+          </a:p>
+          <a:p>
+            <a:pPr algn="ctr"/>
+            <a:r>
+              <a:rPr lang="en-IN" dirty="0"/>
+              <a:t>S</a:t>
+            </a:r>
+          </a:p>
+          <a:p>
+            <a:pPr algn="ctr"/>
+            <a:r>
+              <a:rPr lang="en-IN" dirty="0"/>
+              <a:t>C</a:t>
+            </a:r>
+          </a:p>
+          <a:p>
+            <a:pPr algn="ctr"/>
+            <a:r>
+              <a:rPr lang="en-IN" dirty="0"/>
+              <a:t>O</a:t>
+            </a:r>
+          </a:p>
+          <a:p>
+            <a:pPr algn="ctr"/>
+            <a:r>
+              <a:rPr lang="en-IN" dirty="0"/>
+              <a:t>V</a:t>
+            </a:r>
+          </a:p>
+          <a:p>
+            <a:pPr algn="ctr"/>
+            <a:r>
+              <a:rPr lang="en-IN" dirty="0"/>
+              <a:t>E</a:t>
+            </a:r>
+          </a:p>
+          <a:p>
+            <a:pPr algn="ctr"/>
+            <a:r>
+              <a:rPr lang="en-IN" dirty="0"/>
+              <a:t>R</a:t>
+            </a:r>
+          </a:p>
+          <a:p>
+            <a:pPr algn="ctr"/>
+            <a:r>
+              <a:rPr lang="en-IN" dirty="0"/>
+              <a:t>Y</a:t>
+            </a:r>
+          </a:p>
+          <a:p>
+            <a:pPr algn="ctr"/>
+            <a:endParaRPr lang="en-IN" dirty="0"/>
+          </a:p>
+        </p:txBody>
+      </p:sp>
+    </p:spTree>
+    <p:extLst>
+      <p:ext uri="{BB962C8B-B14F-4D97-AF65-F5344CB8AC3E}">
+        <p14:creationId xmlns:p14="http://schemas.microsoft.com/office/powerpoint/2010/main" val="2257500116"/>
+      </p:ext>
+    </p:extLst>
+  </p:cSld>
+  <p:clrMapOvr>
+    <a:masterClrMapping/>
+  </p:clrMapOvr>
+</p:sld>
+</file>
+
+<file path=ppt/slides/slide11.xml><?xml version="1.0" encoding="utf-8"?>
+<p:sld xmlns:a="http://schemas.openxmlformats.org/drawingml/2006/main" xmlns:r="http://schemas.openxmlformats.org/officeDocument/2006/relationships" xmlns:p="http://schemas.openxmlformats.org/presentationml/2006/main">
+  <p:cSld>
+    <p:spTree>
+      <p:nvGrpSpPr>
+        <p:cNvPr id="1" name=""/>
+        <p:cNvGrpSpPr/>
+        <p:nvPr/>
+      </p:nvGrpSpPr>
+      <p:grpSpPr>
+        <a:xfrm>
+          <a:off x="0" y="0"/>
+          <a:ext cx="0" cy="0"/>
+          <a:chOff x="0" y="0"/>
+          <a:chExt cx="0" cy="0"/>
+        </a:xfrm>
+      </p:grpSpPr>
+      <p:sp>
+        <p:nvSpPr>
+          <p:cNvPr id="2" name="Title 1">
+            <a:extLst>
+              <a:ext uri="{FF2B5EF4-FFF2-40B4-BE49-F238E27FC236}">
+                <a16:creationId xmlns:a16="http://schemas.microsoft.com/office/drawing/2014/main" id="{AC01EDD0-E6B6-4D9C-8293-7756067F924A}"/>
+              </a:ext>
+            </a:extLst>
+          </p:cNvPr>
+          <p:cNvSpPr>
+            <a:spLocks noGrp="1"/>
+          </p:cNvSpPr>
+          <p:nvPr>
+            <p:ph type="title"/>
+          </p:nvPr>
+        </p:nvSpPr>
+        <p:spPr>
+          <a:gradFill flip="none" rotWithShape="1">
+            <a:gsLst>
+              <a:gs pos="0">
+                <a:srgbClr val="92D050">
+                  <a:tint val="66000"/>
+                  <a:satMod val="160000"/>
+                </a:srgbClr>
+              </a:gs>
+              <a:gs pos="50000">
+                <a:srgbClr val="92D050">
+                  <a:tint val="44500"/>
+                  <a:satMod val="160000"/>
+                </a:srgbClr>
+              </a:gs>
+              <a:gs pos="100000">
+                <a:srgbClr val="92D050">
+                  <a:tint val="23500"/>
+                  <a:satMod val="160000"/>
+                </a:srgbClr>
+              </a:gs>
+            </a:gsLst>
+            <a:lin ang="8100000" scaled="1"/>
+            <a:tileRect/>
+          </a:gradFill>
+        </p:spPr>
+        <p:txBody>
+          <a:bodyPr/>
+          <a:lstStyle/>
+          <a:p>
+            <a:r>
+              <a:rPr lang="en-IN" dirty="0" err="1">
+                <a:latin typeface="Algerian" panose="04020705040A02060702" pitchFamily="82" charset="0"/>
+              </a:rPr>
+              <a:t>Iping</a:t>
+            </a:r>
+            <a:r>
+              <a:rPr lang="en-IN" dirty="0">
+                <a:latin typeface="Algerian" panose="04020705040A02060702" pitchFamily="82" charset="0"/>
+              </a:rPr>
+              <a:t> – health/liveliness check</a:t>
+            </a:r>
+          </a:p>
+        </p:txBody>
+      </p:sp>
+      <p:sp>
+        <p:nvSpPr>
+          <p:cNvPr id="3" name="Content Placeholder 2">
+            <a:extLst>
+              <a:ext uri="{FF2B5EF4-FFF2-40B4-BE49-F238E27FC236}">
+                <a16:creationId xmlns:a16="http://schemas.microsoft.com/office/drawing/2014/main" id="{A5300A80-B240-4DAE-BE5B-CF4BFF2B509C}"/>
+              </a:ext>
+            </a:extLst>
+          </p:cNvPr>
+          <p:cNvSpPr>
+            <a:spLocks noGrp="1"/>
+          </p:cNvSpPr>
+          <p:nvPr>
+            <p:ph idx="1"/>
+          </p:nvPr>
+        </p:nvSpPr>
+        <p:spPr>
+          <a:gradFill flip="none" rotWithShape="1">
+            <a:gsLst>
+              <a:gs pos="0">
+                <a:schemeClr val="accent1">
+                  <a:tint val="66000"/>
+                  <a:satMod val="160000"/>
+                </a:schemeClr>
+              </a:gs>
+              <a:gs pos="50000">
+                <a:schemeClr val="accent1">
+                  <a:tint val="44500"/>
+                  <a:satMod val="160000"/>
+                </a:schemeClr>
+              </a:gs>
+              <a:gs pos="100000">
+                <a:schemeClr val="accent1">
+                  <a:tint val="23500"/>
+                  <a:satMod val="160000"/>
+                </a:schemeClr>
+              </a:gs>
+            </a:gsLst>
+            <a:path path="circle">
+              <a:fillToRect l="50000" t="50000" r="50000" b="50000"/>
+            </a:path>
+            <a:tileRect/>
+          </a:gradFill>
+        </p:spPr>
+        <p:txBody>
+          <a:bodyPr/>
+          <a:lstStyle/>
+          <a:p>
+            <a:r>
+              <a:rPr lang="en-IN" dirty="0" err="1"/>
+              <a:t>DummyPing</a:t>
+            </a:r>
+            <a:endParaRPr lang="en-IN" dirty="0"/>
+          </a:p>
+          <a:p>
+            <a:r>
+              <a:rPr lang="en-IN" dirty="0" err="1"/>
+              <a:t>PingUrl</a:t>
+            </a:r>
+            <a:endParaRPr lang="en-IN" dirty="0"/>
+          </a:p>
+          <a:p>
+            <a:r>
+              <a:rPr lang="en-IN" dirty="0" err="1"/>
+              <a:t>NIWSDiscoveryPing</a:t>
+            </a:r>
+            <a:r>
+              <a:rPr lang="en-IN" dirty="0"/>
+              <a:t> </a:t>
+            </a:r>
+          </a:p>
+        </p:txBody>
+      </p:sp>
+    </p:spTree>
+    <p:extLst>
+      <p:ext uri="{BB962C8B-B14F-4D97-AF65-F5344CB8AC3E}">
+        <p14:creationId xmlns:p14="http://schemas.microsoft.com/office/powerpoint/2010/main" val="3023154569"/>
+      </p:ext>
+    </p:extLst>
+  </p:cSld>
+  <p:clrMapOvr>
+    <a:masterClrMapping/>
+  </p:clrMapOvr>
+  <p:timing>
+    <p:tnLst>
+      <p:par>
+        <p:cTn id="1" dur="indefinite" restart="never" nodeType="tmRoot">
+          <p:childTnLst>
+            <p:seq concurrent="1" nextAc="seek">
+              <p:cTn id="2" dur="indefinite" nodeType="mainSeq">
+                <p:childTnLst>
+                  <p:par>
+                    <p:cTn id="3" fill="hold">
+                      <p:stCondLst>
+                        <p:cond delay="indefinite"/>
+                      </p:stCondLst>
+                      <p:childTnLst>
+                        <p:par>
+                          <p:cTn id="4" fill="hold">
+                            <p:stCondLst>
+                              <p:cond delay="0"/>
+                            </p:stCondLst>
+                            <p:childTnLst>
+                              <p:par>
+                                <p:cTn id="5" presetID="42" presetClass="entr" presetSubtype="0" fill="hold" grpId="0" nodeType="clickEffect">
+                                  <p:stCondLst>
+                                    <p:cond delay="0"/>
+                                  </p:stCondLst>
+                                  <p:childTnLst>
+                                    <p:set>
+                                      <p:cBhvr>
+                                        <p:cTn id="6" dur="1" fill="hold">
+                                          <p:stCondLst>
+                                            <p:cond delay="0"/>
+                                          </p:stCondLst>
+                                        </p:cTn>
+                                        <p:tgtEl>
+                                          <p:spTgt spid="3">
+                                            <p:bg/>
+                                          </p:spTgt>
+                                        </p:tgtEl>
+                                        <p:attrNameLst>
+                                          <p:attrName>style.visibility</p:attrName>
+                                        </p:attrNameLst>
+                                      </p:cBhvr>
+                                      <p:to>
+                                        <p:strVal val="visible"/>
+                                      </p:to>
+                                    </p:set>
+                                    <p:animEffect transition="in" filter="fade">
+                                      <p:cBhvr>
+                                        <p:cTn id="7" dur="1000"/>
+                                        <p:tgtEl>
+                                          <p:spTgt spid="3">
+                                            <p:bg/>
+                                          </p:spTgt>
+                                        </p:tgtEl>
+                                      </p:cBhvr>
+                                    </p:animEffect>
+                                    <p:anim calcmode="lin" valueType="num">
+                                      <p:cBhvr>
+                                        <p:cTn id="8" dur="1000" fill="hold"/>
+                                        <p:tgtEl>
+                                          <p:spTgt spid="3">
+                                            <p:bg/>
+                                          </p:spTgt>
+                                        </p:tgtEl>
+                                        <p:attrNameLst>
+                                          <p:attrName>ppt_x</p:attrName>
+                                        </p:attrNameLst>
+                                      </p:cBhvr>
+                                      <p:tavLst>
+                                        <p:tav tm="0">
+                                          <p:val>
+                                            <p:strVal val="#ppt_x"/>
+                                          </p:val>
+                                        </p:tav>
+                                        <p:tav tm="100000">
+                                          <p:val>
+                                            <p:strVal val="#ppt_x"/>
+                                          </p:val>
+                                        </p:tav>
+                                      </p:tavLst>
+                                    </p:anim>
+                                    <p:anim calcmode="lin" valueType="num">
+                                      <p:cBhvr>
+                                        <p:cTn id="9" dur="1000" fill="hold"/>
+                                        <p:tgtEl>
+                                          <p:spTgt spid="3">
+                                            <p:bg/>
+                                          </p:spTgt>
+                                        </p:tgtEl>
+                                        <p:attrNameLst>
+                                          <p:attrName>ppt_y</p:attrName>
+                                        </p:attrNameLst>
+                                      </p:cBhvr>
+                                      <p:tavLst>
+                                        <p:tav tm="0">
+                                          <p:val>
+                                            <p:strVal val="#ppt_y+.1"/>
+                                          </p:val>
+                                        </p:tav>
+                                        <p:tav tm="100000">
+                                          <p:val>
+                                            <p:strVal val="#ppt_y"/>
+                                          </p:val>
+                                        </p:tav>
+                                      </p:tavLst>
+                                    </p:anim>
+                                  </p:childTnLst>
+                                </p:cTn>
+                              </p:par>
+                            </p:childTnLst>
+                          </p:cTn>
+                        </p:par>
+                      </p:childTnLst>
+                    </p:cTn>
+                  </p:par>
+                  <p:par>
+                    <p:cTn id="10" fill="hold">
+                      <p:stCondLst>
+                        <p:cond delay="indefinite"/>
+                      </p:stCondLst>
+                      <p:childTnLst>
+                        <p:par>
+                          <p:cTn id="11" fill="hold">
+                            <p:stCondLst>
+                              <p:cond delay="0"/>
+                            </p:stCondLst>
+                            <p:childTnLst>
+                              <p:par>
+                                <p:cTn id="12" presetID="42" presetClass="entr" presetSubtype="0" fill="hold" grpId="0" nodeType="clickEffect">
+                                  <p:stCondLst>
+                                    <p:cond delay="0"/>
+                                  </p:stCondLst>
+                                  <p:childTnLst>
+                                    <p:set>
+                                      <p:cBhvr>
+                                        <p:cTn id="13" dur="1" fill="hold">
+                                          <p:stCondLst>
+                                            <p:cond delay="0"/>
+                                          </p:stCondLst>
+                                        </p:cTn>
+                                        <p:tgtEl>
+                                          <p:spTgt spid="3">
+                                            <p:txEl>
+                                              <p:pRg st="0" end="0"/>
+                                            </p:txEl>
+                                          </p:spTgt>
+                                        </p:tgtEl>
+                                        <p:attrNameLst>
+                                          <p:attrName>style.visibility</p:attrName>
+                                        </p:attrNameLst>
+                                      </p:cBhvr>
+                                      <p:to>
+                                        <p:strVal val="visible"/>
+                                      </p:to>
+                                    </p:set>
+                                    <p:animEffect transition="in" filter="fade">
+                                      <p:cBhvr>
+                                        <p:cTn id="14" dur="1000"/>
+                                        <p:tgtEl>
+                                          <p:spTgt spid="3">
+                                            <p:txEl>
+                                              <p:pRg st="0" end="0"/>
+                                            </p:txEl>
+                                          </p:spTgt>
+                                        </p:tgtEl>
+                                      </p:cBhvr>
+                                    </p:animEffect>
+                                    <p:anim calcmode="lin" valueType="num">
+                                      <p:cBhvr>
+                                        <p:cTn id="15" dur="1000" fill="hold"/>
+                                        <p:tgtEl>
+                                          <p:spTgt spid="3">
+                                            <p:txEl>
+                                              <p:pRg st="0" end="0"/>
+                                            </p:txEl>
+                                          </p:spTgt>
+                                        </p:tgtEl>
+                                        <p:attrNameLst>
+                                          <p:attrName>ppt_x</p:attrName>
+                                        </p:attrNameLst>
+                                      </p:cBhvr>
+                                      <p:tavLst>
+                                        <p:tav tm="0">
+                                          <p:val>
+                                            <p:strVal val="#ppt_x"/>
+                                          </p:val>
+                                        </p:tav>
+                                        <p:tav tm="100000">
+                                          <p:val>
+                                            <p:strVal val="#ppt_x"/>
+                                          </p:val>
+                                        </p:tav>
+                                      </p:tavLst>
+                                    </p:anim>
+                                    <p:anim calcmode="lin" valueType="num">
+                                      <p:cBhvr>
+                                        <p:cTn id="16" dur="1000" fill="hold"/>
+                                        <p:tgtEl>
+                                          <p:spTgt spid="3">
+                                            <p:txEl>
+                                              <p:pRg st="0" end="0"/>
+                                            </p:txEl>
+                                          </p:spTgt>
+                                        </p:tgtEl>
+                                        <p:attrNameLst>
+                                          <p:attrName>ppt_y</p:attrName>
+                                        </p:attrNameLst>
+                                      </p:cBhvr>
+                                      <p:tavLst>
+                                        <p:tav tm="0">
+                                          <p:val>
+                                            <p:strVal val="#ppt_y+.1"/>
+                                          </p:val>
+                                        </p:tav>
+                                        <p:tav tm="100000">
+                                          <p:val>
+                                            <p:strVal val="#ppt_y"/>
+                                          </p:val>
+                                        </p:tav>
+                                      </p:tavLst>
+                                    </p:anim>
+                                  </p:childTnLst>
+                                </p:cTn>
+                              </p:par>
+                            </p:childTnLst>
+                          </p:cTn>
+                        </p:par>
+                      </p:childTnLst>
+                    </p:cTn>
+                  </p:par>
+                  <p:par>
+                    <p:cTn id="17" fill="hold">
+                      <p:stCondLst>
+                        <p:cond delay="indefinite"/>
+                      </p:stCondLst>
+                      <p:childTnLst>
+                        <p:par>
+                          <p:cTn id="18" fill="hold">
+                            <p:stCondLst>
+                              <p:cond delay="0"/>
+                            </p:stCondLst>
+                            <p:childTnLst>
+                              <p:par>
+                                <p:cTn id="19" presetID="42" presetClass="entr" presetSubtype="0" fill="hold" grpId="0" nodeType="clickEffect">
+                                  <p:stCondLst>
+                                    <p:cond delay="0"/>
+                                  </p:stCondLst>
+                                  <p:childTnLst>
+                                    <p:set>
+                                      <p:cBhvr>
+                                        <p:cTn id="20" dur="1" fill="hold">
+                                          <p:stCondLst>
+                                            <p:cond delay="0"/>
+                                          </p:stCondLst>
+                                        </p:cTn>
+                                        <p:tgtEl>
+                                          <p:spTgt spid="3">
+                                            <p:txEl>
+                                              <p:pRg st="1" end="1"/>
+                                            </p:txEl>
+                                          </p:spTgt>
+                                        </p:tgtEl>
+                                        <p:attrNameLst>
+                                          <p:attrName>style.visibility</p:attrName>
+                                        </p:attrNameLst>
+                                      </p:cBhvr>
+                                      <p:to>
+                                        <p:strVal val="visible"/>
+                                      </p:to>
+                                    </p:set>
+                                    <p:animEffect transition="in" filter="fade">
+                                      <p:cBhvr>
+                                        <p:cTn id="21" dur="1000"/>
+                                        <p:tgtEl>
+                                          <p:spTgt spid="3">
+                                            <p:txEl>
+                                              <p:pRg st="1" end="1"/>
+                                            </p:txEl>
+                                          </p:spTgt>
+                                        </p:tgtEl>
+                                      </p:cBhvr>
+                                    </p:animEffect>
+                                    <p:anim calcmode="lin" valueType="num">
+                                      <p:cBhvr>
+                                        <p:cTn id="22" dur="1000" fill="hold"/>
+                                        <p:tgtEl>
+                                          <p:spTgt spid="3">
+                                            <p:txEl>
+                                              <p:pRg st="1" end="1"/>
+                                            </p:txEl>
+                                          </p:spTgt>
+                                        </p:tgtEl>
+                                        <p:attrNameLst>
+                                          <p:attrName>ppt_x</p:attrName>
+                                        </p:attrNameLst>
+                                      </p:cBhvr>
+                                      <p:tavLst>
+                                        <p:tav tm="0">
+                                          <p:val>
+                                            <p:strVal val="#ppt_x"/>
+                                          </p:val>
+                                        </p:tav>
+                                        <p:tav tm="100000">
+                                          <p:val>
+                                            <p:strVal val="#ppt_x"/>
+                                          </p:val>
+                                        </p:tav>
+                                      </p:tavLst>
+                                    </p:anim>
+                                    <p:anim calcmode="lin" valueType="num">
+                                      <p:cBhvr>
+                                        <p:cTn id="23" dur="1000" fill="hold"/>
+                                        <p:tgtEl>
+                                          <p:spTgt spid="3">
+                                            <p:txEl>
+                                              <p:pRg st="1" end="1"/>
+                                            </p:txEl>
+                                          </p:spTgt>
+                                        </p:tgtEl>
+                                        <p:attrNameLst>
+                                          <p:attrName>ppt_y</p:attrName>
+                                        </p:attrNameLst>
+                                      </p:cBhvr>
+                                      <p:tavLst>
+                                        <p:tav tm="0">
+                                          <p:val>
+                                            <p:strVal val="#ppt_y+.1"/>
+                                          </p:val>
+                                        </p:tav>
+                                        <p:tav tm="100000">
+                                          <p:val>
+                                            <p:strVal val="#ppt_y"/>
+                                          </p:val>
+                                        </p:tav>
+                                      </p:tavLst>
+                                    </p:anim>
+                                  </p:childTnLst>
+                                </p:cTn>
+                              </p:par>
+                            </p:childTnLst>
+                          </p:cTn>
+                        </p:par>
+                      </p:childTnLst>
+                    </p:cTn>
+                  </p:par>
+                  <p:par>
+                    <p:cTn id="24" fill="hold">
+                      <p:stCondLst>
+                        <p:cond delay="indefinite"/>
+                      </p:stCondLst>
+                      <p:childTnLst>
+                        <p:par>
+                          <p:cTn id="25" fill="hold">
+                            <p:stCondLst>
+                              <p:cond delay="0"/>
+                            </p:stCondLst>
+                            <p:childTnLst>
+                              <p:par>
+                                <p:cTn id="26" presetID="42" presetClass="entr" presetSubtype="0" fill="hold" grpId="0" nodeType="clickEffect">
+                                  <p:stCondLst>
+                                    <p:cond delay="0"/>
+                                  </p:stCondLst>
+                                  <p:childTnLst>
+                                    <p:set>
+                                      <p:cBhvr>
+                                        <p:cTn id="27" dur="1" fill="hold">
+                                          <p:stCondLst>
+                                            <p:cond delay="0"/>
+                                          </p:stCondLst>
+                                        </p:cTn>
+                                        <p:tgtEl>
+                                          <p:spTgt spid="3">
+                                            <p:txEl>
+                                              <p:pRg st="2" end="2"/>
+                                            </p:txEl>
+                                          </p:spTgt>
+                                        </p:tgtEl>
+                                        <p:attrNameLst>
+                                          <p:attrName>style.visibility</p:attrName>
+                                        </p:attrNameLst>
+                                      </p:cBhvr>
+                                      <p:to>
+                                        <p:strVal val="visible"/>
+                                      </p:to>
+                                    </p:set>
+                                    <p:animEffect transition="in" filter="fade">
+                                      <p:cBhvr>
+                                        <p:cTn id="28" dur="1000"/>
+                                        <p:tgtEl>
+                                          <p:spTgt spid="3">
+                                            <p:txEl>
+                                              <p:pRg st="2" end="2"/>
+                                            </p:txEl>
+                                          </p:spTgt>
+                                        </p:tgtEl>
+                                      </p:cBhvr>
+                                    </p:animEffect>
+                                    <p:anim calcmode="lin" valueType="num">
+                                      <p:cBhvr>
+                                        <p:cTn id="29" dur="1000" fill="hold"/>
+                                        <p:tgtEl>
+                                          <p:spTgt spid="3">
+                                            <p:txEl>
+                                              <p:pRg st="2" end="2"/>
+                                            </p:txEl>
+                                          </p:spTgt>
+                                        </p:tgtEl>
+                                        <p:attrNameLst>
+                                          <p:attrName>ppt_x</p:attrName>
+                                        </p:attrNameLst>
+                                      </p:cBhvr>
+                                      <p:tavLst>
+                                        <p:tav tm="0">
+                                          <p:val>
+                                            <p:strVal val="#ppt_x"/>
+                                          </p:val>
+                                        </p:tav>
+                                        <p:tav tm="100000">
+                                          <p:val>
+                                            <p:strVal val="#ppt_x"/>
+                                          </p:val>
+                                        </p:tav>
+                                      </p:tavLst>
+                                    </p:anim>
+                                    <p:anim calcmode="lin" valueType="num">
+                                      <p:cBhvr>
+                                        <p:cTn id="30" dur="1000" fill="hold"/>
+                                        <p:tgtEl>
+                                          <p:spTgt spid="3">
+                                            <p:txEl>
+                                              <p:pRg st="2" end="2"/>
+                                            </p:txEl>
+                                          </p:spTgt>
+                                        </p:tgtEl>
+                                        <p:attrNameLst>
+                                          <p:attrName>ppt_y</p:attrName>
+                                        </p:attrNameLst>
+                                      </p:cBhvr>
+                                      <p:tavLst>
+                                        <p:tav tm="0">
+                                          <p:val>
+                                            <p:strVal val="#ppt_y+.1"/>
+                                          </p:val>
+                                        </p:tav>
+                                        <p:tav tm="100000">
+                                          <p:val>
+                                            <p:strVal val="#ppt_y"/>
+                                          </p:val>
+                                        </p:tav>
+                                      </p:tavLst>
+                                    </p:anim>
+                                  </p:childTnLst>
+                                </p:cTn>
+                              </p:par>
+                            </p:childTnLst>
+                          </p:cTn>
+                        </p:par>
+                      </p:childTnLst>
+                    </p:cTn>
+                  </p:par>
+                </p:childTnLst>
+              </p:cTn>
+              <p:prevCondLst>
+                <p:cond evt="onPrev" delay="0">
+                  <p:tgtEl>
+                    <p:sldTgt/>
+                  </p:tgtEl>
+                </p:cond>
+              </p:prevCondLst>
+              <p:nextCondLst>
+                <p:cond evt="onNext" delay="0">
+                  <p:tgtEl>
+                    <p:sldTgt/>
+                  </p:tgtEl>
+                </p:cond>
+              </p:nextCondLst>
+            </p:seq>
+          </p:childTnLst>
+        </p:cTn>
+      </p:par>
+    </p:tnLst>
+    <p:bldLst>
+      <p:bldP spid="3" grpId="0" build="p" animBg="1"/>
+    </p:bldLst>
+  </p:timing>
+</p:sld>
+</file>
+
+<file path=ppt/slides/slide12.xml><?xml version="1.0" encoding="utf-8"?>
+<p:sld xmlns:a="http://schemas.openxmlformats.org/drawingml/2006/main" xmlns:r="http://schemas.openxmlformats.org/officeDocument/2006/relationships" xmlns:p="http://schemas.openxmlformats.org/presentationml/2006/main">
+  <p:cSld>
+    <p:spTree>
+      <p:nvGrpSpPr>
+        <p:cNvPr id="1" name=""/>
+        <p:cNvGrpSpPr/>
+        <p:nvPr/>
+      </p:nvGrpSpPr>
+      <p:grpSpPr>
+        <a:xfrm>
+          <a:off x="0" y="0"/>
+          <a:ext cx="0" cy="0"/>
+          <a:chOff x="0" y="0"/>
+          <a:chExt cx="0" cy="0"/>
+        </a:xfrm>
+      </p:grpSpPr>
+      <p:sp>
+        <p:nvSpPr>
+          <p:cNvPr id="2" name="Title 1">
+            <a:extLst>
+              <a:ext uri="{FF2B5EF4-FFF2-40B4-BE49-F238E27FC236}">
+                <a16:creationId xmlns:a16="http://schemas.microsoft.com/office/drawing/2014/main" id="{AC01EDD0-E6B6-4D9C-8293-7756067F924A}"/>
+              </a:ext>
+            </a:extLst>
+          </p:cNvPr>
+          <p:cNvSpPr>
+            <a:spLocks noGrp="1"/>
+          </p:cNvSpPr>
+          <p:nvPr>
+            <p:ph type="title"/>
+          </p:nvPr>
+        </p:nvSpPr>
+        <p:spPr>
+          <a:xfrm>
+            <a:off x="1115568" y="539115"/>
+            <a:ext cx="10168128" cy="1179576"/>
+          </a:xfrm>
+          <a:gradFill flip="none" rotWithShape="1">
+            <a:gsLst>
+              <a:gs pos="0">
+                <a:srgbClr val="92D050">
+                  <a:tint val="66000"/>
+                  <a:satMod val="160000"/>
+                </a:srgbClr>
+              </a:gs>
+              <a:gs pos="50000">
+                <a:srgbClr val="92D050">
+                  <a:tint val="44500"/>
+                  <a:satMod val="160000"/>
+                </a:srgbClr>
+              </a:gs>
+              <a:gs pos="100000">
+                <a:srgbClr val="92D050">
+                  <a:tint val="23500"/>
+                  <a:satMod val="160000"/>
+                </a:srgbClr>
+              </a:gs>
+            </a:gsLst>
+            <a:lin ang="8100000" scaled="1"/>
+            <a:tileRect/>
+          </a:gradFill>
+        </p:spPr>
+        <p:txBody>
+          <a:bodyPr/>
+          <a:lstStyle/>
+          <a:p>
+            <a:r>
+              <a:rPr lang="en-IN" dirty="0" err="1">
+                <a:latin typeface="Algerian" panose="04020705040A02060702" pitchFamily="82" charset="0"/>
+              </a:rPr>
+              <a:t>Irule</a:t>
+            </a:r>
+            <a:r>
+              <a:rPr lang="en-IN" dirty="0">
+                <a:latin typeface="Algerian" panose="04020705040A02060702" pitchFamily="82" charset="0"/>
+              </a:rPr>
+              <a:t> – request distribution</a:t>
+            </a:r>
+          </a:p>
+        </p:txBody>
+      </p:sp>
+      <p:sp>
+        <p:nvSpPr>
+          <p:cNvPr id="3" name="Content Placeholder 2">
+            <a:extLst>
+              <a:ext uri="{FF2B5EF4-FFF2-40B4-BE49-F238E27FC236}">
+                <a16:creationId xmlns:a16="http://schemas.microsoft.com/office/drawing/2014/main" id="{A5300A80-B240-4DAE-BE5B-CF4BFF2B509C}"/>
+              </a:ext>
+            </a:extLst>
+          </p:cNvPr>
+          <p:cNvSpPr>
+            <a:spLocks noGrp="1"/>
+          </p:cNvSpPr>
+          <p:nvPr>
+            <p:ph idx="1"/>
+          </p:nvPr>
+        </p:nvSpPr>
+        <p:spPr>
+          <a:gradFill flip="none" rotWithShape="1">
+            <a:gsLst>
+              <a:gs pos="0">
+                <a:schemeClr val="accent1">
+                  <a:tint val="66000"/>
+                  <a:satMod val="160000"/>
+                </a:schemeClr>
+              </a:gs>
+              <a:gs pos="50000">
+                <a:schemeClr val="accent1">
+                  <a:tint val="44500"/>
+                  <a:satMod val="160000"/>
+                </a:schemeClr>
+              </a:gs>
+              <a:gs pos="100000">
+                <a:schemeClr val="accent1">
+                  <a:tint val="23500"/>
+                  <a:satMod val="160000"/>
+                </a:schemeClr>
+              </a:gs>
+            </a:gsLst>
+            <a:path path="circle">
+              <a:fillToRect l="50000" t="50000" r="50000" b="50000"/>
+            </a:path>
+            <a:tileRect/>
+          </a:gradFill>
+        </p:spPr>
+        <p:txBody>
+          <a:bodyPr/>
+          <a:lstStyle/>
+          <a:p>
+            <a:r>
+              <a:rPr lang="en-IN" dirty="0" err="1"/>
+              <a:t>RandomRule</a:t>
+            </a:r>
+            <a:endParaRPr lang="en-IN" dirty="0"/>
+          </a:p>
+          <a:p>
+            <a:r>
+              <a:rPr lang="en-IN" dirty="0" err="1"/>
+              <a:t>RoundRobinRule</a:t>
+            </a:r>
+            <a:endParaRPr lang="en-IN" dirty="0"/>
+          </a:p>
+          <a:p>
+            <a:r>
+              <a:rPr lang="en-IN" dirty="0" err="1"/>
+              <a:t>ZoneAvoidanceRule</a:t>
+            </a:r>
+            <a:endParaRPr lang="en-IN" dirty="0"/>
+          </a:p>
+        </p:txBody>
+      </p:sp>
+    </p:spTree>
+    <p:extLst>
+      <p:ext uri="{BB962C8B-B14F-4D97-AF65-F5344CB8AC3E}">
+        <p14:creationId xmlns:p14="http://schemas.microsoft.com/office/powerpoint/2010/main" val="3742560853"/>
+      </p:ext>
+    </p:extLst>
+  </p:cSld>
+  <p:clrMapOvr>
+    <a:masterClrMapping/>
+  </p:clrMapOvr>
+  <p:timing>
+    <p:tnLst>
+      <p:par>
+        <p:cTn id="1" dur="indefinite" restart="never" nodeType="tmRoot">
+          <p:childTnLst>
+            <p:seq concurrent="1" nextAc="seek">
+              <p:cTn id="2" dur="indefinite" nodeType="mainSeq">
+                <p:childTnLst>
+                  <p:par>
+                    <p:cTn id="3" fill="hold">
+                      <p:stCondLst>
+                        <p:cond delay="indefinite"/>
+                      </p:stCondLst>
+                      <p:childTnLst>
+                        <p:par>
+                          <p:cTn id="4" fill="hold">
+                            <p:stCondLst>
+                              <p:cond delay="0"/>
+                            </p:stCondLst>
+                            <p:childTnLst>
+                              <p:par>
+                                <p:cTn id="5" presetID="42" presetClass="entr" presetSubtype="0" fill="hold" grpId="0" nodeType="clickEffect">
+                                  <p:stCondLst>
+                                    <p:cond delay="0"/>
+                                  </p:stCondLst>
+                                  <p:childTnLst>
+                                    <p:set>
+                                      <p:cBhvr>
+                                        <p:cTn id="6" dur="1" fill="hold">
+                                          <p:stCondLst>
+                                            <p:cond delay="0"/>
+                                          </p:stCondLst>
+                                        </p:cTn>
+                                        <p:tgtEl>
+                                          <p:spTgt spid="3">
+                                            <p:bg/>
+                                          </p:spTgt>
+                                        </p:tgtEl>
+                                        <p:attrNameLst>
+                                          <p:attrName>style.visibility</p:attrName>
+                                        </p:attrNameLst>
+                                      </p:cBhvr>
+                                      <p:to>
+                                        <p:strVal val="visible"/>
+                                      </p:to>
+                                    </p:set>
+                                    <p:animEffect transition="in" filter="fade">
+                                      <p:cBhvr>
+                                        <p:cTn id="7" dur="1000"/>
+                                        <p:tgtEl>
+                                          <p:spTgt spid="3">
+                                            <p:bg/>
+                                          </p:spTgt>
+                                        </p:tgtEl>
+                                      </p:cBhvr>
+                                    </p:animEffect>
+                                    <p:anim calcmode="lin" valueType="num">
+                                      <p:cBhvr>
+                                        <p:cTn id="8" dur="1000" fill="hold"/>
+                                        <p:tgtEl>
+                                          <p:spTgt spid="3">
+                                            <p:bg/>
+                                          </p:spTgt>
+                                        </p:tgtEl>
+                                        <p:attrNameLst>
+                                          <p:attrName>ppt_x</p:attrName>
+                                        </p:attrNameLst>
+                                      </p:cBhvr>
+                                      <p:tavLst>
+                                        <p:tav tm="0">
+                                          <p:val>
+                                            <p:strVal val="#ppt_x"/>
+                                          </p:val>
+                                        </p:tav>
+                                        <p:tav tm="100000">
+                                          <p:val>
+                                            <p:strVal val="#ppt_x"/>
+                                          </p:val>
+                                        </p:tav>
+                                      </p:tavLst>
+                                    </p:anim>
+                                    <p:anim calcmode="lin" valueType="num">
+                                      <p:cBhvr>
+                                        <p:cTn id="9" dur="1000" fill="hold"/>
+                                        <p:tgtEl>
+                                          <p:spTgt spid="3">
+                                            <p:bg/>
+                                          </p:spTgt>
+                                        </p:tgtEl>
+                                        <p:attrNameLst>
+                                          <p:attrName>ppt_y</p:attrName>
+                                        </p:attrNameLst>
+                                      </p:cBhvr>
+                                      <p:tavLst>
+                                        <p:tav tm="0">
+                                          <p:val>
+                                            <p:strVal val="#ppt_y+.1"/>
+                                          </p:val>
+                                        </p:tav>
+                                        <p:tav tm="100000">
+                                          <p:val>
+                                            <p:strVal val="#ppt_y"/>
+                                          </p:val>
+                                        </p:tav>
+                                      </p:tavLst>
+                                    </p:anim>
+                                  </p:childTnLst>
+                                </p:cTn>
+                              </p:par>
+                            </p:childTnLst>
+                          </p:cTn>
+                        </p:par>
+                      </p:childTnLst>
+                    </p:cTn>
+                  </p:par>
+                  <p:par>
+                    <p:cTn id="10" fill="hold">
+                      <p:stCondLst>
+                        <p:cond delay="indefinite"/>
+                      </p:stCondLst>
+                      <p:childTnLst>
+                        <p:par>
+                          <p:cTn id="11" fill="hold">
+                            <p:stCondLst>
+                              <p:cond delay="0"/>
+                            </p:stCondLst>
+                            <p:childTnLst>
+                              <p:par>
+                                <p:cTn id="12" presetID="42" presetClass="entr" presetSubtype="0" fill="hold" grpId="0" nodeType="clickEffect">
+                                  <p:stCondLst>
+                                    <p:cond delay="0"/>
+                                  </p:stCondLst>
+                                  <p:childTnLst>
+                                    <p:set>
+                                      <p:cBhvr>
+                                        <p:cTn id="13" dur="1" fill="hold">
+                                          <p:stCondLst>
+                                            <p:cond delay="0"/>
+                                          </p:stCondLst>
+                                        </p:cTn>
+                                        <p:tgtEl>
+                                          <p:spTgt spid="3">
+                                            <p:txEl>
+                                              <p:pRg st="0" end="0"/>
+                                            </p:txEl>
+                                          </p:spTgt>
+                                        </p:tgtEl>
+                                        <p:attrNameLst>
+                                          <p:attrName>style.visibility</p:attrName>
+                                        </p:attrNameLst>
+                                      </p:cBhvr>
+                                      <p:to>
+                                        <p:strVal val="visible"/>
+                                      </p:to>
+                                    </p:set>
+                                    <p:animEffect transition="in" filter="fade">
+                                      <p:cBhvr>
+                                        <p:cTn id="14" dur="1000"/>
+                                        <p:tgtEl>
+                                          <p:spTgt spid="3">
+                                            <p:txEl>
+                                              <p:pRg st="0" end="0"/>
+                                            </p:txEl>
+                                          </p:spTgt>
+                                        </p:tgtEl>
+                                      </p:cBhvr>
+                                    </p:animEffect>
+                                    <p:anim calcmode="lin" valueType="num">
+                                      <p:cBhvr>
+                                        <p:cTn id="15" dur="1000" fill="hold"/>
+                                        <p:tgtEl>
+                                          <p:spTgt spid="3">
+                                            <p:txEl>
+                                              <p:pRg st="0" end="0"/>
+                                            </p:txEl>
+                                          </p:spTgt>
+                                        </p:tgtEl>
+                                        <p:attrNameLst>
+                                          <p:attrName>ppt_x</p:attrName>
+                                        </p:attrNameLst>
+                                      </p:cBhvr>
+                                      <p:tavLst>
+                                        <p:tav tm="0">
+                                          <p:val>
+                                            <p:strVal val="#ppt_x"/>
+                                          </p:val>
+                                        </p:tav>
+                                        <p:tav tm="100000">
+                                          <p:val>
+                                            <p:strVal val="#ppt_x"/>
+                                          </p:val>
+                                        </p:tav>
+                                      </p:tavLst>
+                                    </p:anim>
+                                    <p:anim calcmode="lin" valueType="num">
+                                      <p:cBhvr>
+                                        <p:cTn id="16" dur="1000" fill="hold"/>
+                                        <p:tgtEl>
+                                          <p:spTgt spid="3">
+                                            <p:txEl>
+                                              <p:pRg st="0" end="0"/>
+                                            </p:txEl>
+                                          </p:spTgt>
+                                        </p:tgtEl>
+                                        <p:attrNameLst>
+                                          <p:attrName>ppt_y</p:attrName>
+                                        </p:attrNameLst>
+                                      </p:cBhvr>
+                                      <p:tavLst>
+                                        <p:tav tm="0">
+                                          <p:val>
+                                            <p:strVal val="#ppt_y+.1"/>
+                                          </p:val>
+                                        </p:tav>
+                                        <p:tav tm="100000">
+                                          <p:val>
+                                            <p:strVal val="#ppt_y"/>
+                                          </p:val>
+                                        </p:tav>
+                                      </p:tavLst>
+                                    </p:anim>
+                                  </p:childTnLst>
+                                </p:cTn>
+                              </p:par>
+                            </p:childTnLst>
+                          </p:cTn>
+                        </p:par>
+                      </p:childTnLst>
+                    </p:cTn>
+                  </p:par>
+                  <p:par>
+                    <p:cTn id="17" fill="hold">
+                      <p:stCondLst>
+                        <p:cond delay="indefinite"/>
+                      </p:stCondLst>
+                      <p:childTnLst>
+                        <p:par>
+                          <p:cTn id="18" fill="hold">
+                            <p:stCondLst>
+                              <p:cond delay="0"/>
+                            </p:stCondLst>
+                            <p:childTnLst>
+                              <p:par>
+                                <p:cTn id="19" presetID="42" presetClass="entr" presetSubtype="0" fill="hold" grpId="0" nodeType="clickEffect">
+                                  <p:stCondLst>
+                                    <p:cond delay="0"/>
+                                  </p:stCondLst>
+                                  <p:childTnLst>
+                                    <p:set>
+                                      <p:cBhvr>
+                                        <p:cTn id="20" dur="1" fill="hold">
+                                          <p:stCondLst>
+                                            <p:cond delay="0"/>
+                                          </p:stCondLst>
+                                        </p:cTn>
+                                        <p:tgtEl>
+                                          <p:spTgt spid="3">
+                                            <p:txEl>
+                                              <p:pRg st="1" end="1"/>
+                                            </p:txEl>
+                                          </p:spTgt>
+                                        </p:tgtEl>
+                                        <p:attrNameLst>
+                                          <p:attrName>style.visibility</p:attrName>
+                                        </p:attrNameLst>
+                                      </p:cBhvr>
+                                      <p:to>
+                                        <p:strVal val="visible"/>
+                                      </p:to>
+                                    </p:set>
+                                    <p:animEffect transition="in" filter="fade">
+                                      <p:cBhvr>
+                                        <p:cTn id="21" dur="1000"/>
+                                        <p:tgtEl>
+                                          <p:spTgt spid="3">
+                                            <p:txEl>
+                                              <p:pRg st="1" end="1"/>
+                                            </p:txEl>
+                                          </p:spTgt>
+                                        </p:tgtEl>
+                                      </p:cBhvr>
+                                    </p:animEffect>
+                                    <p:anim calcmode="lin" valueType="num">
+                                      <p:cBhvr>
+                                        <p:cTn id="22" dur="1000" fill="hold"/>
+                                        <p:tgtEl>
+                                          <p:spTgt spid="3">
+                                            <p:txEl>
+                                              <p:pRg st="1" end="1"/>
+                                            </p:txEl>
+                                          </p:spTgt>
+                                        </p:tgtEl>
+                                        <p:attrNameLst>
+                                          <p:attrName>ppt_x</p:attrName>
+                                        </p:attrNameLst>
+                                      </p:cBhvr>
+                                      <p:tavLst>
+                                        <p:tav tm="0">
+                                          <p:val>
+                                            <p:strVal val="#ppt_x"/>
+                                          </p:val>
+                                        </p:tav>
+                                        <p:tav tm="100000">
+                                          <p:val>
+                                            <p:strVal val="#ppt_x"/>
+                                          </p:val>
+                                        </p:tav>
+                                      </p:tavLst>
+                                    </p:anim>
+                                    <p:anim calcmode="lin" valueType="num">
+                                      <p:cBhvr>
+                                        <p:cTn id="23" dur="1000" fill="hold"/>
+                                        <p:tgtEl>
+                                          <p:spTgt spid="3">
+                                            <p:txEl>
+                                              <p:pRg st="1" end="1"/>
+                                            </p:txEl>
+                                          </p:spTgt>
+                                        </p:tgtEl>
+                                        <p:attrNameLst>
+                                          <p:attrName>ppt_y</p:attrName>
+                                        </p:attrNameLst>
+                                      </p:cBhvr>
+                                      <p:tavLst>
+                                        <p:tav tm="0">
+                                          <p:val>
+                                            <p:strVal val="#ppt_y+.1"/>
+                                          </p:val>
+                                        </p:tav>
+                                        <p:tav tm="100000">
+                                          <p:val>
+                                            <p:strVal val="#ppt_y"/>
+                                          </p:val>
+                                        </p:tav>
+                                      </p:tavLst>
+                                    </p:anim>
+                                  </p:childTnLst>
+                                </p:cTn>
+                              </p:par>
+                            </p:childTnLst>
+                          </p:cTn>
+                        </p:par>
+                      </p:childTnLst>
+                    </p:cTn>
+                  </p:par>
+                  <p:par>
+                    <p:cTn id="24" fill="hold">
+                      <p:stCondLst>
+                        <p:cond delay="indefinite"/>
+                      </p:stCondLst>
+                      <p:childTnLst>
+                        <p:par>
+                          <p:cTn id="25" fill="hold">
+                            <p:stCondLst>
+                              <p:cond delay="0"/>
+                            </p:stCondLst>
+                            <p:childTnLst>
+                              <p:par>
+                                <p:cTn id="26" presetID="42" presetClass="entr" presetSubtype="0" fill="hold" grpId="0" nodeType="clickEffect">
+                                  <p:stCondLst>
+                                    <p:cond delay="0"/>
+                                  </p:stCondLst>
+                                  <p:childTnLst>
+                                    <p:set>
+                                      <p:cBhvr>
+                                        <p:cTn id="27" dur="1" fill="hold">
+                                          <p:stCondLst>
+                                            <p:cond delay="0"/>
+                                          </p:stCondLst>
+                                        </p:cTn>
+                                        <p:tgtEl>
+                                          <p:spTgt spid="3">
+                                            <p:txEl>
+                                              <p:pRg st="2" end="2"/>
+                                            </p:txEl>
+                                          </p:spTgt>
+                                        </p:tgtEl>
+                                        <p:attrNameLst>
+                                          <p:attrName>style.visibility</p:attrName>
+                                        </p:attrNameLst>
+                                      </p:cBhvr>
+                                      <p:to>
+                                        <p:strVal val="visible"/>
+                                      </p:to>
+                                    </p:set>
+                                    <p:animEffect transition="in" filter="fade">
+                                      <p:cBhvr>
+                                        <p:cTn id="28" dur="1000"/>
+                                        <p:tgtEl>
+                                          <p:spTgt spid="3">
+                                            <p:txEl>
+                                              <p:pRg st="2" end="2"/>
+                                            </p:txEl>
+                                          </p:spTgt>
+                                        </p:tgtEl>
+                                      </p:cBhvr>
+                                    </p:animEffect>
+                                    <p:anim calcmode="lin" valueType="num">
+                                      <p:cBhvr>
+                                        <p:cTn id="29" dur="1000" fill="hold"/>
+                                        <p:tgtEl>
+                                          <p:spTgt spid="3">
+                                            <p:txEl>
+                                              <p:pRg st="2" end="2"/>
+                                            </p:txEl>
+                                          </p:spTgt>
+                                        </p:tgtEl>
+                                        <p:attrNameLst>
+                                          <p:attrName>ppt_x</p:attrName>
+                                        </p:attrNameLst>
+                                      </p:cBhvr>
+                                      <p:tavLst>
+                                        <p:tav tm="0">
+                                          <p:val>
+                                            <p:strVal val="#ppt_x"/>
+                                          </p:val>
+                                        </p:tav>
+                                        <p:tav tm="100000">
+                                          <p:val>
+                                            <p:strVal val="#ppt_x"/>
+                                          </p:val>
+                                        </p:tav>
+                                      </p:tavLst>
+                                    </p:anim>
+                                    <p:anim calcmode="lin" valueType="num">
+                                      <p:cBhvr>
+                                        <p:cTn id="30" dur="1000" fill="hold"/>
+                                        <p:tgtEl>
+                                          <p:spTgt spid="3">
+                                            <p:txEl>
+                                              <p:pRg st="2" end="2"/>
+                                            </p:txEl>
+                                          </p:spTgt>
+                                        </p:tgtEl>
+                                        <p:attrNameLst>
+                                          <p:attrName>ppt_y</p:attrName>
+                                        </p:attrNameLst>
+                                      </p:cBhvr>
+                                      <p:tavLst>
+                                        <p:tav tm="0">
+                                          <p:val>
+                                            <p:strVal val="#ppt_y+.1"/>
+                                          </p:val>
+                                        </p:tav>
+                                        <p:tav tm="100000">
+                                          <p:val>
+                                            <p:strVal val="#ppt_y"/>
+                                          </p:val>
+                                        </p:tav>
+                                      </p:tavLst>
+                                    </p:anim>
+                                  </p:childTnLst>
+                                </p:cTn>
+                              </p:par>
+                            </p:childTnLst>
+                          </p:cTn>
+                        </p:par>
+                      </p:childTnLst>
+                    </p:cTn>
+                  </p:par>
+                </p:childTnLst>
+              </p:cTn>
+              <p:prevCondLst>
+                <p:cond evt="onPrev" delay="0">
+                  <p:tgtEl>
+                    <p:sldTgt/>
+                  </p:tgtEl>
+                </p:cond>
+              </p:prevCondLst>
+              <p:nextCondLst>
+                <p:cond evt="onNext" delay="0">
+                  <p:tgtEl>
+                    <p:sldTgt/>
+                  </p:tgtEl>
+                </p:cond>
+              </p:nextCondLst>
+            </p:seq>
+          </p:childTnLst>
+        </p:cTn>
+      </p:par>
+    </p:tnLst>
+    <p:bldLst>
+      <p:bldP spid="3" grpId="0" build="p" animBg="1"/>
+    </p:bldLst>
+  </p:timing>
+</p:sld>
+</file>
+
+<file path=ppt/slides/slide13.xml><?xml version="1.0" encoding="utf-8"?>
+<p:sld xmlns:a="http://schemas.openxmlformats.org/drawingml/2006/main" xmlns:r="http://schemas.openxmlformats.org/officeDocument/2006/relationships" xmlns:p="http://schemas.openxmlformats.org/presentationml/2006/main">
+  <p:cSld>
+    <p:spTree>
+      <p:nvGrpSpPr>
+        <p:cNvPr id="1" name=""/>
+        <p:cNvGrpSpPr/>
+        <p:nvPr/>
+      </p:nvGrpSpPr>
+      <p:grpSpPr>
+        <a:xfrm>
+          <a:off x="0" y="0"/>
+          <a:ext cx="0" cy="0"/>
+          <a:chOff x="0" y="0"/>
+          <a:chExt cx="0" cy="0"/>
+        </a:xfrm>
+      </p:grpSpPr>
+      <p:sp>
+        <p:nvSpPr>
+          <p:cNvPr id="2" name="Title 1">
+            <a:extLst>
+              <a:ext uri="{FF2B5EF4-FFF2-40B4-BE49-F238E27FC236}">
+                <a16:creationId xmlns:a16="http://schemas.microsoft.com/office/drawing/2014/main" id="{63693524-3940-440C-94DB-8F3808B23F5F}"/>
+              </a:ext>
+            </a:extLst>
+          </p:cNvPr>
+          <p:cNvSpPr>
+            <a:spLocks noGrp="1"/>
+          </p:cNvSpPr>
+          <p:nvPr>
+            <p:ph type="title"/>
+          </p:nvPr>
+        </p:nvSpPr>
+        <p:spPr>
+          <a:solidFill>
+            <a:schemeClr val="accent2">
+              <a:lumMod val="20000"/>
+              <a:lumOff val="80000"/>
+            </a:schemeClr>
+          </a:solidFill>
+        </p:spPr>
+        <p:txBody>
+          <a:bodyPr/>
+          <a:lstStyle/>
+          <a:p>
+            <a:r>
+              <a:rPr lang="en-IN" dirty="0">
+                <a:latin typeface="Algerian" panose="04020705040A02060702" pitchFamily="82" charset="0"/>
+              </a:rPr>
+              <a:t>Application for demo</a:t>
+            </a:r>
+          </a:p>
+        </p:txBody>
+      </p:sp>
+      <p:sp>
+        <p:nvSpPr>
+          <p:cNvPr id="5" name="Rectangle 4">
+            <a:extLst>
+              <a:ext uri="{FF2B5EF4-FFF2-40B4-BE49-F238E27FC236}">
+                <a16:creationId xmlns:a16="http://schemas.microsoft.com/office/drawing/2014/main" id="{FB01FF6E-86BB-452A-BE55-298FC6856EBA}"/>
+              </a:ext>
+            </a:extLst>
+          </p:cNvPr>
+          <p:cNvSpPr/>
+          <p:nvPr/>
+        </p:nvSpPr>
+        <p:spPr>
+          <a:xfrm>
+            <a:off x="0" y="6419850"/>
+            <a:ext cx="12191999" cy="457200"/>
+          </a:xfrm>
+          <a:prstGeom prst="rect">
+            <a:avLst/>
+          </a:prstGeom>
+          <a:solidFill>
+            <a:srgbClr val="4D4D4D"/>
+          </a:solidFill>
+        </p:spPr>
+        <p:style>
+          <a:lnRef idx="2">
+            <a:schemeClr val="dk1">
+              <a:shade val="50000"/>
+            </a:schemeClr>
+          </a:lnRef>
+          <a:fillRef idx="1">
+            <a:schemeClr val="dk1"/>
+          </a:fillRef>
+          <a:effectRef idx="0">
+            <a:schemeClr val="dk1"/>
+          </a:effectRef>
+          <a:fontRef idx="minor">
+            <a:schemeClr val="lt1"/>
+          </a:fontRef>
+        </p:style>
+        <p:txBody>
+          <a:bodyPr rtlCol="0" anchor="ctr"/>
+          <a:lstStyle/>
+          <a:p>
+            <a:pPr algn="ctr"/>
+            <a:endParaRPr lang="en-IN"/>
+          </a:p>
+        </p:txBody>
+      </p:sp>
+      <p:sp>
+        <p:nvSpPr>
+          <p:cNvPr id="6" name="Rectangle 5">
+            <a:extLst>
+              <a:ext uri="{FF2B5EF4-FFF2-40B4-BE49-F238E27FC236}">
+                <a16:creationId xmlns:a16="http://schemas.microsoft.com/office/drawing/2014/main" id="{FD1C823C-6F81-435F-9B13-8F63C7B3B49C}"/>
+              </a:ext>
+            </a:extLst>
+          </p:cNvPr>
+          <p:cNvSpPr/>
+          <p:nvPr/>
+        </p:nvSpPr>
+        <p:spPr>
+          <a:xfrm>
+            <a:off x="1543050" y="3200763"/>
+            <a:ext cx="2662237" cy="1418010"/>
+          </a:xfrm>
+          <a:prstGeom prst="rect">
+            <a:avLst/>
+          </a:prstGeom>
+          <a:gradFill flip="none" rotWithShape="1">
+            <a:gsLst>
+              <a:gs pos="0">
+                <a:srgbClr val="92D050">
+                  <a:shade val="30000"/>
+                  <a:satMod val="115000"/>
+                </a:srgbClr>
+              </a:gs>
+              <a:gs pos="50000">
+                <a:srgbClr val="92D050">
+                  <a:shade val="67500"/>
+                  <a:satMod val="115000"/>
+                </a:srgbClr>
+              </a:gs>
+              <a:gs pos="100000">
+                <a:srgbClr val="92D050">
+                  <a:shade val="100000"/>
+                  <a:satMod val="115000"/>
+                </a:srgbClr>
+              </a:gs>
+            </a:gsLst>
+            <a:lin ang="8100000" scaled="1"/>
+            <a:tileRect/>
+          </a:gradFill>
+        </p:spPr>
+        <p:style>
+          <a:lnRef idx="2">
+            <a:schemeClr val="accent1">
+              <a:shade val="50000"/>
+            </a:schemeClr>
+          </a:lnRef>
+          <a:fillRef idx="1">
+            <a:schemeClr val="accent1"/>
+          </a:fillRef>
+          <a:effectRef idx="0">
+            <a:schemeClr val="accent1"/>
+          </a:effectRef>
+          <a:fontRef idx="minor">
+            <a:schemeClr val="lt1"/>
+          </a:fontRef>
+        </p:style>
+        <p:txBody>
+          <a:bodyPr rtlCol="0" anchor="ctr"/>
+          <a:lstStyle/>
+          <a:p>
+            <a:pPr algn="ctr"/>
+            <a:r>
+              <a:rPr lang="en-IN" sz="3200" dirty="0"/>
+              <a:t>Doctor Portal</a:t>
+            </a:r>
+          </a:p>
+        </p:txBody>
+      </p:sp>
+      <p:sp>
+        <p:nvSpPr>
+          <p:cNvPr id="7" name="Rectangle: Rounded Corners 6">
+            <a:extLst>
+              <a:ext uri="{FF2B5EF4-FFF2-40B4-BE49-F238E27FC236}">
+                <a16:creationId xmlns:a16="http://schemas.microsoft.com/office/drawing/2014/main" id="{815A1B0A-F345-4BF1-9766-DAA67D2E36A4}"/>
+              </a:ext>
+            </a:extLst>
+          </p:cNvPr>
+          <p:cNvSpPr/>
+          <p:nvPr/>
+        </p:nvSpPr>
+        <p:spPr>
+          <a:xfrm>
+            <a:off x="8515349" y="2126765"/>
+            <a:ext cx="1933575" cy="900113"/>
+          </a:xfrm>
+          <a:prstGeom prst="roundRect">
+            <a:avLst/>
+          </a:prstGeom>
+          <a:gradFill flip="none" rotWithShape="1">
+            <a:gsLst>
+              <a:gs pos="0">
+                <a:srgbClr val="92D050">
+                  <a:shade val="30000"/>
+                  <a:satMod val="115000"/>
+                </a:srgbClr>
+              </a:gs>
+              <a:gs pos="50000">
+                <a:srgbClr val="92D050">
+                  <a:shade val="67500"/>
+                  <a:satMod val="115000"/>
+                </a:srgbClr>
+              </a:gs>
+              <a:gs pos="100000">
+                <a:srgbClr val="92D050">
+                  <a:shade val="100000"/>
+                  <a:satMod val="115000"/>
+                </a:srgbClr>
+              </a:gs>
+            </a:gsLst>
+            <a:lin ang="8100000" scaled="1"/>
+            <a:tileRect/>
+          </a:gradFill>
+        </p:spPr>
+        <p:style>
+          <a:lnRef idx="2">
+            <a:schemeClr val="accent1">
+              <a:shade val="50000"/>
+            </a:schemeClr>
+          </a:lnRef>
+          <a:fillRef idx="1">
+            <a:schemeClr val="accent1"/>
+          </a:fillRef>
+          <a:effectRef idx="0">
+            <a:schemeClr val="accent1"/>
+          </a:effectRef>
+          <a:fontRef idx="minor">
+            <a:schemeClr val="lt1"/>
+          </a:fontRef>
+        </p:style>
+        <p:txBody>
+          <a:bodyPr rtlCol="0" anchor="ctr"/>
+          <a:lstStyle/>
+          <a:p>
+            <a:pPr algn="ctr"/>
+            <a:r>
+              <a:rPr lang="en-IN" dirty="0" err="1"/>
+              <a:t>DoctorService</a:t>
+            </a:r>
+            <a:endParaRPr lang="en-IN" dirty="0"/>
+          </a:p>
+        </p:txBody>
+      </p:sp>
+      <p:sp>
+        <p:nvSpPr>
+          <p:cNvPr id="8" name="Rectangle: Rounded Corners 7">
+            <a:extLst>
+              <a:ext uri="{FF2B5EF4-FFF2-40B4-BE49-F238E27FC236}">
+                <a16:creationId xmlns:a16="http://schemas.microsoft.com/office/drawing/2014/main" id="{24CA937F-905F-40AF-90AD-258FD530FA69}"/>
+              </a:ext>
+            </a:extLst>
+          </p:cNvPr>
+          <p:cNvSpPr/>
+          <p:nvPr/>
+        </p:nvSpPr>
+        <p:spPr>
+          <a:xfrm>
+            <a:off x="8515349" y="3474757"/>
+            <a:ext cx="1933575" cy="900113"/>
+          </a:xfrm>
+          <a:prstGeom prst="roundRect">
+            <a:avLst/>
+          </a:prstGeom>
+          <a:gradFill flip="none" rotWithShape="1">
+            <a:gsLst>
+              <a:gs pos="0">
+                <a:srgbClr val="92D050">
+                  <a:shade val="30000"/>
+                  <a:satMod val="115000"/>
+                </a:srgbClr>
+              </a:gs>
+              <a:gs pos="50000">
+                <a:srgbClr val="92D050">
+                  <a:shade val="67500"/>
+                  <a:satMod val="115000"/>
+                </a:srgbClr>
+              </a:gs>
+              <a:gs pos="100000">
+                <a:srgbClr val="92D050">
+                  <a:shade val="100000"/>
+                  <a:satMod val="115000"/>
+                </a:srgbClr>
+              </a:gs>
+            </a:gsLst>
+            <a:lin ang="8100000" scaled="1"/>
+            <a:tileRect/>
+          </a:gradFill>
+        </p:spPr>
+        <p:style>
+          <a:lnRef idx="2">
+            <a:schemeClr val="accent1">
+              <a:shade val="50000"/>
+            </a:schemeClr>
+          </a:lnRef>
+          <a:fillRef idx="1">
+            <a:schemeClr val="accent1"/>
+          </a:fillRef>
+          <a:effectRef idx="0">
+            <a:schemeClr val="accent1"/>
+          </a:effectRef>
+          <a:fontRef idx="minor">
+            <a:schemeClr val="lt1"/>
+          </a:fontRef>
+        </p:style>
+        <p:txBody>
+          <a:bodyPr rtlCol="0" anchor="ctr"/>
+          <a:lstStyle/>
+          <a:p>
+            <a:pPr algn="ctr"/>
+            <a:r>
+              <a:rPr lang="en-IN" dirty="0" err="1"/>
+              <a:t>PatientService</a:t>
+            </a:r>
+            <a:endParaRPr lang="en-IN" dirty="0"/>
+          </a:p>
+        </p:txBody>
+      </p:sp>
+      <p:sp>
+        <p:nvSpPr>
+          <p:cNvPr id="9" name="Rectangle: Rounded Corners 8">
+            <a:extLst>
+              <a:ext uri="{FF2B5EF4-FFF2-40B4-BE49-F238E27FC236}">
+                <a16:creationId xmlns:a16="http://schemas.microsoft.com/office/drawing/2014/main" id="{7514082C-68C3-4BBA-80B8-3AEE4333217D}"/>
+              </a:ext>
+            </a:extLst>
+          </p:cNvPr>
+          <p:cNvSpPr/>
+          <p:nvPr/>
+        </p:nvSpPr>
+        <p:spPr>
+          <a:xfrm>
+            <a:off x="8510236" y="4912341"/>
+            <a:ext cx="2016569" cy="900113"/>
+          </a:xfrm>
+          <a:prstGeom prst="roundRect">
+            <a:avLst/>
+          </a:prstGeom>
+          <a:gradFill flip="none" rotWithShape="1">
+            <a:gsLst>
+              <a:gs pos="0">
+                <a:srgbClr val="92D050">
+                  <a:shade val="30000"/>
+                  <a:satMod val="115000"/>
+                </a:srgbClr>
+              </a:gs>
+              <a:gs pos="50000">
+                <a:srgbClr val="92D050">
+                  <a:shade val="67500"/>
+                  <a:satMod val="115000"/>
+                </a:srgbClr>
+              </a:gs>
+              <a:gs pos="100000">
+                <a:srgbClr val="92D050">
+                  <a:shade val="100000"/>
+                  <a:satMod val="115000"/>
+                </a:srgbClr>
+              </a:gs>
+            </a:gsLst>
+            <a:lin ang="8100000" scaled="1"/>
+            <a:tileRect/>
+          </a:gradFill>
+        </p:spPr>
+        <p:style>
+          <a:lnRef idx="2">
+            <a:schemeClr val="accent1">
+              <a:shade val="50000"/>
+            </a:schemeClr>
+          </a:lnRef>
+          <a:fillRef idx="1">
+            <a:schemeClr val="accent1"/>
+          </a:fillRef>
+          <a:effectRef idx="0">
+            <a:schemeClr val="accent1"/>
+          </a:effectRef>
+          <a:fontRef idx="minor">
+            <a:schemeClr val="lt1"/>
+          </a:fontRef>
+        </p:style>
+        <p:txBody>
+          <a:bodyPr rtlCol="0" anchor="ctr"/>
+          <a:lstStyle/>
+          <a:p>
+            <a:pPr algn="ctr"/>
+            <a:r>
+              <a:rPr lang="en-IN" dirty="0" err="1"/>
+              <a:t>DiseaseService</a:t>
+            </a:r>
+            <a:endParaRPr lang="en-IN" dirty="0"/>
+          </a:p>
+        </p:txBody>
+      </p:sp>
+      <p:cxnSp>
+        <p:nvCxnSpPr>
+          <p:cNvPr id="10" name="Straight Arrow Connector 9">
+            <a:extLst>
+              <a:ext uri="{FF2B5EF4-FFF2-40B4-BE49-F238E27FC236}">
+                <a16:creationId xmlns:a16="http://schemas.microsoft.com/office/drawing/2014/main" id="{25A3D3A2-228F-47A4-9ADF-31AECD20EDA1}"/>
+              </a:ext>
+            </a:extLst>
+          </p:cNvPr>
+          <p:cNvCxnSpPr/>
+          <p:nvPr/>
+        </p:nvCxnSpPr>
+        <p:spPr>
+          <a:xfrm flipV="1">
+            <a:off x="4207668" y="2464690"/>
+            <a:ext cx="4305300" cy="1260000"/>
+          </a:xfrm>
+          <a:prstGeom prst="straightConnector1">
+            <a:avLst/>
+          </a:prstGeom>
+          <a:ln>
+            <a:tailEnd type="triangle"/>
+          </a:ln>
+        </p:spPr>
+        <p:style>
+          <a:lnRef idx="3">
+            <a:schemeClr val="accent6"/>
+          </a:lnRef>
+          <a:fillRef idx="0">
+            <a:schemeClr val="accent6"/>
+          </a:fillRef>
+          <a:effectRef idx="2">
+            <a:schemeClr val="accent6"/>
+          </a:effectRef>
+          <a:fontRef idx="minor">
+            <a:schemeClr val="tx1"/>
+          </a:fontRef>
+        </p:style>
+      </p:cxnSp>
+      <p:cxnSp>
+        <p:nvCxnSpPr>
+          <p:cNvPr id="11" name="Straight Arrow Connector 10">
+            <a:extLst>
+              <a:ext uri="{FF2B5EF4-FFF2-40B4-BE49-F238E27FC236}">
+                <a16:creationId xmlns:a16="http://schemas.microsoft.com/office/drawing/2014/main" id="{8B9730C1-7404-40CE-AB6A-D839CF4EAEE8}"/>
+              </a:ext>
+            </a:extLst>
+          </p:cNvPr>
+          <p:cNvCxnSpPr>
+            <a:cxnSpLocks/>
+          </p:cNvCxnSpPr>
+          <p:nvPr/>
+        </p:nvCxnSpPr>
+        <p:spPr>
+          <a:xfrm>
+            <a:off x="4205287" y="3934407"/>
+            <a:ext cx="4310061" cy="70406"/>
+          </a:xfrm>
+          <a:prstGeom prst="straightConnector1">
+            <a:avLst/>
+          </a:prstGeom>
+          <a:ln>
+            <a:tailEnd type="triangle"/>
+          </a:ln>
+        </p:spPr>
+        <p:style>
+          <a:lnRef idx="3">
+            <a:schemeClr val="accent6"/>
+          </a:lnRef>
+          <a:fillRef idx="0">
+            <a:schemeClr val="accent6"/>
+          </a:fillRef>
+          <a:effectRef idx="2">
+            <a:schemeClr val="accent6"/>
+          </a:effectRef>
+          <a:fontRef idx="minor">
+            <a:schemeClr val="tx1"/>
+          </a:fontRef>
+        </p:style>
+      </p:cxnSp>
+      <p:cxnSp>
+        <p:nvCxnSpPr>
+          <p:cNvPr id="12" name="Straight Arrow Connector 11">
+            <a:extLst>
+              <a:ext uri="{FF2B5EF4-FFF2-40B4-BE49-F238E27FC236}">
+                <a16:creationId xmlns:a16="http://schemas.microsoft.com/office/drawing/2014/main" id="{B6314858-F816-4369-BD26-3E4D660D8540}"/>
+              </a:ext>
+            </a:extLst>
+          </p:cNvPr>
+          <p:cNvCxnSpPr>
+            <a:cxnSpLocks/>
+          </p:cNvCxnSpPr>
+          <p:nvPr/>
+        </p:nvCxnSpPr>
+        <p:spPr>
+          <a:xfrm>
+            <a:off x="4202906" y="4172569"/>
+            <a:ext cx="4432205" cy="1275474"/>
+          </a:xfrm>
+          <a:prstGeom prst="straightConnector1">
+            <a:avLst/>
+          </a:prstGeom>
+          <a:ln>
+            <a:tailEnd type="triangle"/>
+          </a:ln>
+        </p:spPr>
+        <p:style>
+          <a:lnRef idx="3">
+            <a:schemeClr val="accent6"/>
+          </a:lnRef>
+          <a:fillRef idx="0">
+            <a:schemeClr val="accent6"/>
+          </a:fillRef>
+          <a:effectRef idx="2">
+            <a:schemeClr val="accent6"/>
+          </a:effectRef>
+          <a:fontRef idx="minor">
+            <a:schemeClr val="tx1"/>
+          </a:fontRef>
+        </p:style>
+      </p:cxnSp>
+    </p:spTree>
+    <p:extLst>
+      <p:ext uri="{BB962C8B-B14F-4D97-AF65-F5344CB8AC3E}">
+        <p14:creationId xmlns:p14="http://schemas.microsoft.com/office/powerpoint/2010/main" val="3665447396"/>
       </p:ext>
     </p:extLst>
   </p:cSld>
@@ -9822,12 +12348,41 @@
           <a:chExt cx="0" cy="0"/>
         </a:xfrm>
       </p:grpSpPr>
+      <p:pic>
+        <p:nvPicPr>
+          <p:cNvPr id="3" name="Picture 2">
+            <a:extLst>
+              <a:ext uri="{FF2B5EF4-FFF2-40B4-BE49-F238E27FC236}">
+                <a16:creationId xmlns:a16="http://schemas.microsoft.com/office/drawing/2014/main" id="{40E59EFF-EC3F-482B-8E8E-9DCAB878E6F1}"/>
+              </a:ext>
+            </a:extLst>
+          </p:cNvPr>
+          <p:cNvPicPr>
+            <a:picLocks noChangeAspect="1"/>
+          </p:cNvPicPr>
+          <p:nvPr/>
+        </p:nvPicPr>
+        <p:blipFill rotWithShape="1">
+          <a:blip r:embed="rId2"/>
+          <a:srcRect r="5200"/>
+          <a:stretch/>
+        </p:blipFill>
+        <p:spPr>
+          <a:xfrm>
+            <a:off x="3523488" y="10"/>
+            <a:ext cx="8668512" cy="6857990"/>
+          </a:xfrm>
+          <a:prstGeom prst="rect">
+            <a:avLst/>
+          </a:prstGeom>
+        </p:spPr>
+      </p:pic>
       <p:sp>
         <p:nvSpPr>
           <p:cNvPr id="2" name="Title 1">
             <a:extLst>
               <a:ext uri="{FF2B5EF4-FFF2-40B4-BE49-F238E27FC236}">
-                <a16:creationId xmlns:a16="http://schemas.microsoft.com/office/drawing/2014/main" id="{63693524-3940-440C-94DB-8F3808B23F5F}"/>
+                <a16:creationId xmlns:a16="http://schemas.microsoft.com/office/drawing/2014/main" id="{B0DF3F48-E044-4616-A224-24E9E02D48D3}"/>
               </a:ext>
             </a:extLst>
           </p:cNvPr>
@@ -9835,45 +12390,311 @@
             <a:spLocks noGrp="1"/>
           </p:cNvSpPr>
           <p:nvPr>
-            <p:ph type="title"/>
+            <p:ph type="ctrTitle"/>
           </p:nvPr>
         </p:nvSpPr>
         <p:spPr>
-          <a:solidFill>
-            <a:schemeClr val="accent2">
-              <a:lumMod val="20000"/>
-              <a:lumOff val="80000"/>
-            </a:schemeClr>
-          </a:solidFill>
+          <a:xfrm>
+            <a:off x="477980" y="662260"/>
+            <a:ext cx="11616992" cy="3758103"/>
+          </a:xfrm>
         </p:spPr>
         <p:txBody>
-          <a:bodyPr/>
+          <a:bodyPr anchor="b">
+            <a:normAutofit fontScale="90000"/>
+          </a:bodyPr>
           <a:lstStyle/>
           <a:p>
-            <a:r>
-              <a:rPr lang="en-IN" dirty="0">
+            <a:pPr algn="ctr"/>
+            <a:r>
+              <a:rPr lang="en-IN" sz="6000" dirty="0">
+                <a:solidFill>
+                  <a:schemeClr val="accent1"/>
+                </a:solidFill>
                 <a:latin typeface="Algerian" panose="04020705040A02060702" pitchFamily="82" charset="0"/>
               </a:rPr>
-              <a:t>Application </a:t>
-            </a:r>
-            <a:r>
-              <a:rPr lang="en-IN">
+              <a:t>LOAD BALANCING </a:t>
+            </a:r>
+            <a:br>
+              <a:rPr lang="en-IN" sz="6000" dirty="0">
+                <a:solidFill>
+                  <a:schemeClr val="accent1"/>
+                </a:solidFill>
                 <a:latin typeface="Algerian" panose="04020705040A02060702" pitchFamily="82" charset="0"/>
               </a:rPr>
-              <a:t>for demo</a:t>
-            </a:r>
-            <a:endParaRPr lang="en-IN" dirty="0">
+            </a:br>
+            <a:r>
+              <a:rPr lang="en-IN" sz="6000" dirty="0">
+                <a:solidFill>
+                  <a:schemeClr val="accent1"/>
+                </a:solidFill>
+                <a:latin typeface="Algerian" panose="04020705040A02060702" pitchFamily="82" charset="0"/>
+              </a:rPr>
+              <a:t>IN</a:t>
+            </a:r>
+            <a:br>
+              <a:rPr lang="en-IN" sz="6000" dirty="0">
+                <a:solidFill>
+                  <a:schemeClr val="accent1"/>
+                </a:solidFill>
+                <a:latin typeface="Algerian" panose="04020705040A02060702" pitchFamily="82" charset="0"/>
+              </a:rPr>
+            </a:br>
+            <a:r>
+              <a:rPr lang="en-IN" sz="6000" dirty="0">
+                <a:solidFill>
+                  <a:schemeClr val="accent1"/>
+                </a:solidFill>
+                <a:latin typeface="Algerian" panose="04020705040A02060702" pitchFamily="82" charset="0"/>
+              </a:rPr>
+              <a:t>MICROSERVICES</a:t>
+            </a:r>
+            <a:br>
+              <a:rPr lang="en-IN" sz="6600" dirty="0">
+                <a:solidFill>
+                  <a:schemeClr val="accent1"/>
+                </a:solidFill>
+                <a:latin typeface="Algerian" panose="04020705040A02060702" pitchFamily="82" charset="0"/>
+              </a:rPr>
+            </a:br>
+            <a:r>
+              <a:rPr lang="en-IN" sz="6000" b="1" dirty="0">
+                <a:solidFill>
+                  <a:srgbClr val="FF0000"/>
+                </a:solidFill>
+                <a:latin typeface="Algerian" panose="04020705040A02060702" pitchFamily="82" charset="0"/>
+              </a:rPr>
+              <a:t>Demo –</a:t>
+            </a:r>
+            <a:br>
+              <a:rPr lang="en-IN" sz="6000" b="1" dirty="0">
+                <a:solidFill>
+                  <a:srgbClr val="FF0000"/>
+                </a:solidFill>
+                <a:latin typeface="Algerian" panose="04020705040A02060702" pitchFamily="82" charset="0"/>
+              </a:rPr>
+            </a:br>
+            <a:r>
+              <a:rPr lang="en-IN" sz="6000" b="1" dirty="0">
+                <a:solidFill>
+                  <a:srgbClr val="FF0000"/>
+                </a:solidFill>
+                <a:latin typeface="Algerian" panose="04020705040A02060702" pitchFamily="82" charset="0"/>
+              </a:rPr>
+              <a:t>with service discovery</a:t>
+            </a:r>
+            <a:endParaRPr lang="en-IN" sz="6600" b="1" dirty="0">
+              <a:solidFill>
+                <a:srgbClr val="FF0000"/>
+              </a:solidFill>
               <a:latin typeface="Algerian" panose="04020705040A02060702" pitchFamily="82" charset="0"/>
             </a:endParaRPr>
           </a:p>
         </p:txBody>
       </p:sp>
+      <p:pic>
+        <p:nvPicPr>
+          <p:cNvPr id="1026" name="Picture 2" descr="Image result for netflix ribbon">
+            <a:extLst>
+              <a:ext uri="{FF2B5EF4-FFF2-40B4-BE49-F238E27FC236}">
+                <a16:creationId xmlns:a16="http://schemas.microsoft.com/office/drawing/2014/main" id="{6A34D2C0-7C9E-49C2-91CF-3AD4500142E6}"/>
+              </a:ext>
+            </a:extLst>
+          </p:cNvPr>
+          <p:cNvPicPr>
+            <a:picLocks noChangeAspect="1" noChangeArrowheads="1"/>
+          </p:cNvPicPr>
+          <p:nvPr/>
+        </p:nvPicPr>
+        <p:blipFill>
+          <a:blip r:embed="rId3">
+            <a:extLst>
+              <a:ext uri="{28A0092B-C50C-407E-A947-70E740481C1C}">
+                <a14:useLocalDpi xmlns:a14="http://schemas.microsoft.com/office/drawing/2010/main" val="0"/>
+              </a:ext>
+            </a:extLst>
+          </a:blip>
+          <a:srcRect/>
+          <a:stretch>
+            <a:fillRect/>
+          </a:stretch>
+        </p:blipFill>
+        <p:spPr bwMode="auto">
+          <a:xfrm>
+            <a:off x="9768499" y="5082613"/>
+            <a:ext cx="2314575" cy="1703950"/>
+          </a:xfrm>
+          <a:prstGeom prst="rect">
+            <a:avLst/>
+          </a:prstGeom>
+          <a:ln>
+            <a:noFill/>
+          </a:ln>
+          <a:effectLst>
+            <a:outerShdw blurRad="292100" dist="139700" dir="2700000" algn="tl" rotWithShape="0">
+              <a:srgbClr val="333333">
+                <a:alpha val="65000"/>
+              </a:srgbClr>
+            </a:outerShdw>
+          </a:effectLst>
+          <a:extLst>
+            <a:ext uri="{909E8E84-426E-40DD-AFC4-6F175D3DCCD1}">
+              <a14:hiddenFill xmlns:a14="http://schemas.microsoft.com/office/drawing/2010/main">
+                <a:solidFill>
+                  <a:srgbClr val="FFFFFF"/>
+                </a:solidFill>
+              </a14:hiddenFill>
+            </a:ext>
+          </a:extLst>
+        </p:spPr>
+      </p:pic>
+      <p:pic>
+        <p:nvPicPr>
+          <p:cNvPr id="1028" name="Picture 4" descr="Image result for netflix ribbon">
+            <a:extLst>
+              <a:ext uri="{FF2B5EF4-FFF2-40B4-BE49-F238E27FC236}">
+                <a16:creationId xmlns:a16="http://schemas.microsoft.com/office/drawing/2014/main" id="{683EB1E0-7A2D-4BBE-9B64-F9410D61C78D}"/>
+              </a:ext>
+            </a:extLst>
+          </p:cNvPr>
+          <p:cNvPicPr>
+            <a:picLocks noChangeAspect="1" noChangeArrowheads="1"/>
+          </p:cNvPicPr>
+          <p:nvPr/>
+        </p:nvPicPr>
+        <p:blipFill>
+          <a:blip r:embed="rId4">
+            <a:extLst>
+              <a:ext uri="{28A0092B-C50C-407E-A947-70E740481C1C}">
+                <a14:useLocalDpi xmlns:a14="http://schemas.microsoft.com/office/drawing/2010/main" val="0"/>
+              </a:ext>
+            </a:extLst>
+          </a:blip>
+          <a:srcRect/>
+          <a:stretch>
+            <a:fillRect/>
+          </a:stretch>
+        </p:blipFill>
+        <p:spPr bwMode="auto">
+          <a:xfrm>
+            <a:off x="6643306" y="5082613"/>
+            <a:ext cx="2428875" cy="1703950"/>
+          </a:xfrm>
+          <a:prstGeom prst="rect">
+            <a:avLst/>
+          </a:prstGeom>
+          <a:noFill/>
+          <a:extLst>
+            <a:ext uri="{909E8E84-426E-40DD-AFC4-6F175D3DCCD1}">
+              <a14:hiddenFill xmlns:a14="http://schemas.microsoft.com/office/drawing/2010/main">
+                <a:solidFill>
+                  <a:srgbClr val="FFFFFF"/>
+                </a:solidFill>
+              </a14:hiddenFill>
+            </a:ext>
+          </a:extLst>
+        </p:spPr>
+      </p:pic>
+      <p:pic>
+        <p:nvPicPr>
+          <p:cNvPr id="1030" name="Picture 6" descr="Image result for spring boot">
+            <a:extLst>
+              <a:ext uri="{FF2B5EF4-FFF2-40B4-BE49-F238E27FC236}">
+                <a16:creationId xmlns:a16="http://schemas.microsoft.com/office/drawing/2014/main" id="{5E3CE5C6-425F-4D3A-9BA9-E27CA277FAD2}"/>
+              </a:ext>
+            </a:extLst>
+          </p:cNvPr>
+          <p:cNvPicPr>
+            <a:picLocks noChangeAspect="1" noChangeArrowheads="1"/>
+          </p:cNvPicPr>
+          <p:nvPr/>
+        </p:nvPicPr>
+        <p:blipFill>
+          <a:blip r:embed="rId5">
+            <a:extLst>
+              <a:ext uri="{28A0092B-C50C-407E-A947-70E740481C1C}">
+                <a14:useLocalDpi xmlns:a14="http://schemas.microsoft.com/office/drawing/2010/main" val="0"/>
+              </a:ext>
+            </a:extLst>
+          </a:blip>
+          <a:srcRect/>
+          <a:stretch>
+            <a:fillRect/>
+          </a:stretch>
+        </p:blipFill>
+        <p:spPr bwMode="auto">
+          <a:xfrm>
+            <a:off x="90845" y="5100901"/>
+            <a:ext cx="3095625" cy="1685662"/>
+          </a:xfrm>
+          <a:prstGeom prst="rect">
+            <a:avLst/>
+          </a:prstGeom>
+          <a:noFill/>
+          <a:extLst>
+            <a:ext uri="{909E8E84-426E-40DD-AFC4-6F175D3DCCD1}">
+              <a14:hiddenFill xmlns:a14="http://schemas.microsoft.com/office/drawing/2010/main">
+                <a:solidFill>
+                  <a:srgbClr val="FFFFFF"/>
+                </a:solidFill>
+              </a14:hiddenFill>
+            </a:ext>
+          </a:extLst>
+        </p:spPr>
+      </p:pic>
+      <p:pic>
+        <p:nvPicPr>
+          <p:cNvPr id="1032" name="Picture 8" descr="Image result for spring cloud">
+            <a:extLst>
+              <a:ext uri="{FF2B5EF4-FFF2-40B4-BE49-F238E27FC236}">
+                <a16:creationId xmlns:a16="http://schemas.microsoft.com/office/drawing/2014/main" id="{E69F9046-35F4-489B-8D0B-D72B1635878B}"/>
+              </a:ext>
+            </a:extLst>
+          </p:cNvPr>
+          <p:cNvPicPr>
+            <a:picLocks noChangeAspect="1" noChangeArrowheads="1"/>
+          </p:cNvPicPr>
+          <p:nvPr/>
+        </p:nvPicPr>
+        <p:blipFill>
+          <a:blip r:embed="rId6">
+            <a:extLst>
+              <a:ext uri="{28A0092B-C50C-407E-A947-70E740481C1C}">
+                <a14:useLocalDpi xmlns:a14="http://schemas.microsoft.com/office/drawing/2010/main" val="0"/>
+              </a:ext>
+            </a:extLst>
+          </a:blip>
+          <a:srcRect/>
+          <a:stretch>
+            <a:fillRect/>
+          </a:stretch>
+        </p:blipFill>
+        <p:spPr bwMode="auto">
+          <a:xfrm>
+            <a:off x="3648075" y="5135341"/>
+            <a:ext cx="2811481" cy="1541684"/>
+          </a:xfrm>
+          <a:prstGeom prst="rect">
+            <a:avLst/>
+          </a:prstGeom>
+          <a:noFill/>
+          <a:extLst>
+            <a:ext uri="{909E8E84-426E-40DD-AFC4-6F175D3DCCD1}">
+              <a14:hiddenFill xmlns:a14="http://schemas.microsoft.com/office/drawing/2010/main">
+                <a:solidFill>
+                  <a:srgbClr val="FFFFFF"/>
+                </a:solidFill>
+              </a14:hiddenFill>
+            </a:ext>
+          </a:extLst>
+        </p:spPr>
+      </p:pic>
       <p:sp>
         <p:nvSpPr>
-          <p:cNvPr id="5" name="Rectangle 4">
-            <a:extLst>
-              <a:ext uri="{FF2B5EF4-FFF2-40B4-BE49-F238E27FC236}">
-                <a16:creationId xmlns:a16="http://schemas.microsoft.com/office/drawing/2014/main" id="{FB01FF6E-86BB-452A-BE55-298FC6856EBA}"/>
+          <p:cNvPr id="4" name="Rectangle 3">
+            <a:extLst>
+              <a:ext uri="{FF2B5EF4-FFF2-40B4-BE49-F238E27FC236}">
+                <a16:creationId xmlns:a16="http://schemas.microsoft.com/office/drawing/2014/main" id="{3BBAF007-8316-46E5-BEC8-422C95D60DED}"/>
               </a:ext>
             </a:extLst>
           </p:cNvPr>
@@ -9882,30 +12703,95 @@
         </p:nvSpPr>
         <p:spPr>
           <a:xfrm>
-            <a:off x="0" y="6419850"/>
-            <a:ext cx="12191999" cy="457200"/>
+            <a:off x="90845" y="859983"/>
+            <a:ext cx="1604605" cy="3705225"/>
+          </a:xfrm>
+          <a:prstGeom prst="rect">
+            <a:avLst/>
+          </a:prstGeom>
+        </p:spPr>
+        <p:style>
+          <a:lnRef idx="1">
+            <a:schemeClr val="accent6"/>
+          </a:lnRef>
+          <a:fillRef idx="2">
+            <a:schemeClr val="accent6"/>
+          </a:fillRef>
+          <a:effectRef idx="1">
+            <a:schemeClr val="accent6"/>
+          </a:effectRef>
+          <a:fontRef idx="minor">
+            <a:schemeClr val="dk1"/>
+          </a:fontRef>
+        </p:style>
+        <p:txBody>
+          <a:bodyPr rtlCol="0" anchor="ctr"/>
+          <a:lstStyle/>
+          <a:p>
+            <a:pPr algn="ctr"/>
+            <a:r>
+              <a:rPr lang="en-IN" sz="2800" dirty="0">
+                <a:latin typeface="Algerian" panose="04020705040A02060702" pitchFamily="82" charset="0"/>
+              </a:rPr>
+              <a:t>Netflix Ribbon </a:t>
+            </a:r>
+          </a:p>
+          <a:p>
+            <a:pPr algn="ctr"/>
+            <a:r>
+              <a:rPr lang="en-IN" sz="2800" dirty="0">
+                <a:latin typeface="Algerian" panose="04020705040A02060702" pitchFamily="82" charset="0"/>
+              </a:rPr>
+              <a:t>+</a:t>
+            </a:r>
+          </a:p>
+          <a:p>
+            <a:pPr algn="ctr"/>
+            <a:r>
+              <a:rPr lang="en-IN" sz="2800" dirty="0">
+                <a:latin typeface="Algerian" panose="04020705040A02060702" pitchFamily="82" charset="0"/>
+              </a:rPr>
+              <a:t>Spring Boot</a:t>
+            </a:r>
+          </a:p>
+        </p:txBody>
+      </p:sp>
+      <p:sp>
+        <p:nvSpPr>
+          <p:cNvPr id="13" name="Rectangle 12">
+            <a:extLst>
+              <a:ext uri="{FF2B5EF4-FFF2-40B4-BE49-F238E27FC236}">
+                <a16:creationId xmlns:a16="http://schemas.microsoft.com/office/drawing/2014/main" id="{11E39328-AF4E-4F58-A7FF-23D350CED64F}"/>
+              </a:ext>
+            </a:extLst>
+          </p:cNvPr>
+          <p:cNvSpPr/>
+          <p:nvPr/>
+        </p:nvSpPr>
+        <p:spPr>
+          <a:xfrm>
+            <a:off x="11515725" y="-9759"/>
+            <a:ext cx="676274" cy="428859"/>
           </a:xfrm>
           <a:prstGeom prst="rect">
             <a:avLst/>
           </a:prstGeom>
           <a:solidFill>
-            <a:srgbClr val="4D4D4D"/>
+            <a:srgbClr val="92D050"/>
           </a:solidFill>
         </p:spPr>
         <p:style>
-          <a:lnRef idx="2">
-            <a:schemeClr val="dk1">
-              <a:shade val="50000"/>
-            </a:schemeClr>
+          <a:lnRef idx="1">
+            <a:schemeClr val="accent6"/>
           </a:lnRef>
-          <a:fillRef idx="1">
-            <a:schemeClr val="dk1"/>
+          <a:fillRef idx="2">
+            <a:schemeClr val="accent6"/>
           </a:fillRef>
-          <a:effectRef idx="0">
-            <a:schemeClr val="dk1"/>
+          <a:effectRef idx="1">
+            <a:schemeClr val="accent6"/>
           </a:effectRef>
           <a:fontRef idx="minor">
-            <a:schemeClr val="lt1"/>
+            <a:schemeClr val="dk1"/>
           </a:fontRef>
         </p:style>
         <p:txBody>
@@ -9913,16 +12799,21 @@
           <a:lstStyle/>
           <a:p>
             <a:pPr algn="ctr"/>
-            <a:endParaRPr lang="en-IN"/>
+            <a:r>
+              <a:rPr lang="en-IN" sz="3200" dirty="0">
+                <a:latin typeface="Algerian" panose="04020705040A02060702" pitchFamily="82" charset="0"/>
+              </a:rPr>
+              <a:t>#3</a:t>
+            </a:r>
           </a:p>
         </p:txBody>
       </p:sp>
       <p:sp>
         <p:nvSpPr>
-          <p:cNvPr id="6" name="Rectangle 5">
-            <a:extLst>
-              <a:ext uri="{FF2B5EF4-FFF2-40B4-BE49-F238E27FC236}">
-                <a16:creationId xmlns:a16="http://schemas.microsoft.com/office/drawing/2014/main" id="{FD1C823C-6F81-435F-9B13-8F63C7B3B49C}"/>
+          <p:cNvPr id="15" name="Rectangle 14">
+            <a:extLst>
+              <a:ext uri="{FF2B5EF4-FFF2-40B4-BE49-F238E27FC236}">
+                <a16:creationId xmlns:a16="http://schemas.microsoft.com/office/drawing/2014/main" id="{713E4C67-78C6-4DE6-9902-E547F39FFDD0}"/>
               </a:ext>
             </a:extLst>
           </p:cNvPr>
@@ -9931,51 +12822,28 @@
         </p:nvSpPr>
         <p:spPr>
           <a:xfrm>
-            <a:off x="1543050" y="3200763"/>
-            <a:ext cx="2662237" cy="1418010"/>
+            <a:off x="0" y="1"/>
+            <a:ext cx="1088089" cy="324290"/>
           </a:xfrm>
           <a:prstGeom prst="rect">
             <a:avLst/>
           </a:prstGeom>
-          <a:gradFill flip="none" rotWithShape="1">
-            <a:gsLst>
-              <a:gs pos="0">
-                <a:srgbClr val="92D050">
-                  <a:shade val="30000"/>
-                  <a:satMod val="115000"/>
-                </a:srgbClr>
-              </a:gs>
-              <a:gs pos="50000">
-                <a:srgbClr val="92D050">
-                  <a:shade val="67500"/>
-                  <a:satMod val="115000"/>
-                </a:srgbClr>
-              </a:gs>
-              <a:gs pos="100000">
-                <a:srgbClr val="92D050">
-                  <a:shade val="100000"/>
-                  <a:satMod val="115000"/>
-                </a:srgbClr>
-              </a:gs>
-            </a:gsLst>
-            <a:lin ang="8100000" scaled="1"/>
-            <a:tileRect/>
-          </a:gradFill>
+          <a:solidFill>
+            <a:srgbClr val="92D050"/>
+          </a:solidFill>
         </p:spPr>
         <p:style>
-          <a:lnRef idx="2">
-            <a:schemeClr val="accent1">
-              <a:shade val="50000"/>
-            </a:schemeClr>
+          <a:lnRef idx="1">
+            <a:schemeClr val="accent6"/>
           </a:lnRef>
-          <a:fillRef idx="1">
-            <a:schemeClr val="accent1"/>
+          <a:fillRef idx="2">
+            <a:schemeClr val="accent6"/>
           </a:fillRef>
-          <a:effectRef idx="0">
-            <a:schemeClr val="accent1"/>
+          <a:effectRef idx="1">
+            <a:schemeClr val="accent6"/>
           </a:effectRef>
           <a:fontRef idx="minor">
-            <a:schemeClr val="lt1"/>
+            <a:schemeClr val="dk1"/>
           </a:fontRef>
         </p:style>
         <p:txBody>
@@ -9984,18 +12852,391 @@
           <a:p>
             <a:pPr algn="ctr"/>
             <a:r>
-              <a:rPr lang="en-IN" sz="3200" dirty="0"/>
-              <a:t>Doctor Portal</a:t>
+              <a:rPr lang="en-IN" sz="2000" dirty="0">
+                <a:latin typeface="Algerian" panose="04020705040A02060702" pitchFamily="82" charset="0"/>
+              </a:rPr>
+              <a:t>Arvind</a:t>
             </a:r>
           </a:p>
         </p:txBody>
       </p:sp>
+    </p:spTree>
+    <p:extLst>
+      <p:ext uri="{BB962C8B-B14F-4D97-AF65-F5344CB8AC3E}">
+        <p14:creationId xmlns:p14="http://schemas.microsoft.com/office/powerpoint/2010/main" val="3598896262"/>
+      </p:ext>
+    </p:extLst>
+  </p:cSld>
+  <p:clrMapOvr>
+    <a:masterClrMapping/>
+  </p:clrMapOvr>
+</p:sld>
+</file>
+
+<file path=ppt/slides/slide9.xml><?xml version="1.0" encoding="utf-8"?>
+<p:sld xmlns:a="http://schemas.openxmlformats.org/drawingml/2006/main" xmlns:r="http://schemas.openxmlformats.org/officeDocument/2006/relationships" xmlns:p="http://schemas.openxmlformats.org/presentationml/2006/main">
+  <p:cSld>
+    <p:spTree>
+      <p:nvGrpSpPr>
+        <p:cNvPr id="1" name=""/>
+        <p:cNvGrpSpPr/>
+        <p:nvPr/>
+      </p:nvGrpSpPr>
+      <p:grpSpPr>
+        <a:xfrm>
+          <a:off x="0" y="0"/>
+          <a:ext cx="0" cy="0"/>
+          <a:chOff x="0" y="0"/>
+          <a:chExt cx="0" cy="0"/>
+        </a:xfrm>
+      </p:grpSpPr>
+      <p:pic>
+        <p:nvPicPr>
+          <p:cNvPr id="3" name="Picture 2">
+            <a:extLst>
+              <a:ext uri="{FF2B5EF4-FFF2-40B4-BE49-F238E27FC236}">
+                <a16:creationId xmlns:a16="http://schemas.microsoft.com/office/drawing/2014/main" id="{40E59EFF-EC3F-482B-8E8E-9DCAB878E6F1}"/>
+              </a:ext>
+            </a:extLst>
+          </p:cNvPr>
+          <p:cNvPicPr>
+            <a:picLocks noChangeAspect="1"/>
+          </p:cNvPicPr>
+          <p:nvPr/>
+        </p:nvPicPr>
+        <p:blipFill rotWithShape="1">
+          <a:blip r:embed="rId2"/>
+          <a:srcRect r="5200"/>
+          <a:stretch/>
+        </p:blipFill>
+        <p:spPr>
+          <a:xfrm>
+            <a:off x="3523488" y="10"/>
+            <a:ext cx="8668512" cy="6857990"/>
+          </a:xfrm>
+          <a:prstGeom prst="rect">
+            <a:avLst/>
+          </a:prstGeom>
+        </p:spPr>
+      </p:pic>
       <p:sp>
         <p:nvSpPr>
-          <p:cNvPr id="7" name="Rectangle: Rounded Corners 6">
-            <a:extLst>
-              <a:ext uri="{FF2B5EF4-FFF2-40B4-BE49-F238E27FC236}">
-                <a16:creationId xmlns:a16="http://schemas.microsoft.com/office/drawing/2014/main" id="{815A1B0A-F345-4BF1-9766-DAA67D2E36A4}"/>
+          <p:cNvPr id="2" name="Title 1">
+            <a:extLst>
+              <a:ext uri="{FF2B5EF4-FFF2-40B4-BE49-F238E27FC236}">
+                <a16:creationId xmlns:a16="http://schemas.microsoft.com/office/drawing/2014/main" id="{B0DF3F48-E044-4616-A224-24E9E02D48D3}"/>
+              </a:ext>
+            </a:extLst>
+          </p:cNvPr>
+          <p:cNvSpPr>
+            <a:spLocks noGrp="1"/>
+          </p:cNvSpPr>
+          <p:nvPr>
+            <p:ph type="ctrTitle"/>
+          </p:nvPr>
+        </p:nvSpPr>
+        <p:spPr>
+          <a:xfrm>
+            <a:off x="477980" y="662260"/>
+            <a:ext cx="11616992" cy="3758103"/>
+          </a:xfrm>
+        </p:spPr>
+        <p:txBody>
+          <a:bodyPr anchor="b">
+            <a:normAutofit fontScale="90000"/>
+          </a:bodyPr>
+          <a:lstStyle/>
+          <a:p>
+            <a:pPr algn="ctr"/>
+            <a:r>
+              <a:rPr lang="en-IN" sz="6000" dirty="0">
+                <a:solidFill>
+                  <a:schemeClr val="accent1"/>
+                </a:solidFill>
+                <a:latin typeface="Algerian" panose="04020705040A02060702" pitchFamily="82" charset="0"/>
+              </a:rPr>
+              <a:t>LOAD BALANCING </a:t>
+            </a:r>
+            <a:br>
+              <a:rPr lang="en-IN" sz="6000" dirty="0">
+                <a:solidFill>
+                  <a:schemeClr val="accent1"/>
+                </a:solidFill>
+                <a:latin typeface="Algerian" panose="04020705040A02060702" pitchFamily="82" charset="0"/>
+              </a:rPr>
+            </a:br>
+            <a:r>
+              <a:rPr lang="en-IN" sz="6000" dirty="0">
+                <a:solidFill>
+                  <a:schemeClr val="accent1"/>
+                </a:solidFill>
+                <a:latin typeface="Algerian" panose="04020705040A02060702" pitchFamily="82" charset="0"/>
+              </a:rPr>
+              <a:t>IN</a:t>
+            </a:r>
+            <a:br>
+              <a:rPr lang="en-IN" sz="6000" dirty="0">
+                <a:solidFill>
+                  <a:schemeClr val="accent1"/>
+                </a:solidFill>
+                <a:latin typeface="Algerian" panose="04020705040A02060702" pitchFamily="82" charset="0"/>
+              </a:rPr>
+            </a:br>
+            <a:r>
+              <a:rPr lang="en-IN" sz="6000" dirty="0">
+                <a:solidFill>
+                  <a:schemeClr val="accent1"/>
+                </a:solidFill>
+                <a:latin typeface="Algerian" panose="04020705040A02060702" pitchFamily="82" charset="0"/>
+              </a:rPr>
+              <a:t>MICROSERVICES</a:t>
+            </a:r>
+            <a:br>
+              <a:rPr lang="en-IN" sz="6600" dirty="0">
+                <a:solidFill>
+                  <a:schemeClr val="accent1"/>
+                </a:solidFill>
+                <a:latin typeface="Algerian" panose="04020705040A02060702" pitchFamily="82" charset="0"/>
+              </a:rPr>
+            </a:br>
+            <a:r>
+              <a:rPr lang="en-IN" sz="6000" b="1" dirty="0">
+                <a:solidFill>
+                  <a:srgbClr val="FF0000"/>
+                </a:solidFill>
+                <a:latin typeface="Algerian" panose="04020705040A02060702" pitchFamily="82" charset="0"/>
+              </a:rPr>
+              <a:t>Demo –</a:t>
+            </a:r>
+            <a:br>
+              <a:rPr lang="en-IN" sz="6000" b="1" dirty="0">
+                <a:solidFill>
+                  <a:srgbClr val="FF0000"/>
+                </a:solidFill>
+                <a:latin typeface="Algerian" panose="04020705040A02060702" pitchFamily="82" charset="0"/>
+              </a:rPr>
+            </a:br>
+            <a:r>
+              <a:rPr lang="en-IN" sz="6000" b="1" dirty="0">
+                <a:solidFill>
+                  <a:srgbClr val="FF0000"/>
+                </a:solidFill>
+                <a:latin typeface="Algerian" panose="04020705040A02060702" pitchFamily="82" charset="0"/>
+              </a:rPr>
+              <a:t>ribbon customization</a:t>
+            </a:r>
+            <a:endParaRPr lang="en-IN" sz="6600" b="1" dirty="0">
+              <a:solidFill>
+                <a:srgbClr val="FF0000"/>
+              </a:solidFill>
+              <a:latin typeface="Algerian" panose="04020705040A02060702" pitchFamily="82" charset="0"/>
+            </a:endParaRPr>
+          </a:p>
+        </p:txBody>
+      </p:sp>
+      <p:pic>
+        <p:nvPicPr>
+          <p:cNvPr id="1026" name="Picture 2" descr="Image result for netflix ribbon">
+            <a:extLst>
+              <a:ext uri="{FF2B5EF4-FFF2-40B4-BE49-F238E27FC236}">
+                <a16:creationId xmlns:a16="http://schemas.microsoft.com/office/drawing/2014/main" id="{6A34D2C0-7C9E-49C2-91CF-3AD4500142E6}"/>
+              </a:ext>
+            </a:extLst>
+          </p:cNvPr>
+          <p:cNvPicPr>
+            <a:picLocks noChangeAspect="1" noChangeArrowheads="1"/>
+          </p:cNvPicPr>
+          <p:nvPr/>
+        </p:nvPicPr>
+        <p:blipFill>
+          <a:blip r:embed="rId3">
+            <a:extLst>
+              <a:ext uri="{28A0092B-C50C-407E-A947-70E740481C1C}">
+                <a14:useLocalDpi xmlns:a14="http://schemas.microsoft.com/office/drawing/2010/main" val="0"/>
+              </a:ext>
+            </a:extLst>
+          </a:blip>
+          <a:srcRect/>
+          <a:stretch>
+            <a:fillRect/>
+          </a:stretch>
+        </p:blipFill>
+        <p:spPr bwMode="auto">
+          <a:xfrm>
+            <a:off x="9768499" y="5082613"/>
+            <a:ext cx="2314575" cy="1703950"/>
+          </a:xfrm>
+          <a:prstGeom prst="rect">
+            <a:avLst/>
+          </a:prstGeom>
+          <a:ln>
+            <a:noFill/>
+          </a:ln>
+          <a:effectLst>
+            <a:outerShdw blurRad="292100" dist="139700" dir="2700000" algn="tl" rotWithShape="0">
+              <a:srgbClr val="333333">
+                <a:alpha val="65000"/>
+              </a:srgbClr>
+            </a:outerShdw>
+          </a:effectLst>
+          <a:extLst>
+            <a:ext uri="{909E8E84-426E-40DD-AFC4-6F175D3DCCD1}">
+              <a14:hiddenFill xmlns:a14="http://schemas.microsoft.com/office/drawing/2010/main">
+                <a:solidFill>
+                  <a:srgbClr val="FFFFFF"/>
+                </a:solidFill>
+              </a14:hiddenFill>
+            </a:ext>
+          </a:extLst>
+        </p:spPr>
+      </p:pic>
+      <p:pic>
+        <p:nvPicPr>
+          <p:cNvPr id="1028" name="Picture 4" descr="Image result for netflix ribbon">
+            <a:extLst>
+              <a:ext uri="{FF2B5EF4-FFF2-40B4-BE49-F238E27FC236}">
+                <a16:creationId xmlns:a16="http://schemas.microsoft.com/office/drawing/2014/main" id="{683EB1E0-7A2D-4BBE-9B64-F9410D61C78D}"/>
+              </a:ext>
+            </a:extLst>
+          </p:cNvPr>
+          <p:cNvPicPr>
+            <a:picLocks noChangeAspect="1" noChangeArrowheads="1"/>
+          </p:cNvPicPr>
+          <p:nvPr/>
+        </p:nvPicPr>
+        <p:blipFill>
+          <a:blip r:embed="rId4">
+            <a:extLst>
+              <a:ext uri="{28A0092B-C50C-407E-A947-70E740481C1C}">
+                <a14:useLocalDpi xmlns:a14="http://schemas.microsoft.com/office/drawing/2010/main" val="0"/>
+              </a:ext>
+            </a:extLst>
+          </a:blip>
+          <a:srcRect/>
+          <a:stretch>
+            <a:fillRect/>
+          </a:stretch>
+        </p:blipFill>
+        <p:spPr bwMode="auto">
+          <a:xfrm>
+            <a:off x="6643306" y="5082613"/>
+            <a:ext cx="2428875" cy="1703950"/>
+          </a:xfrm>
+          <a:prstGeom prst="rect">
+            <a:avLst/>
+          </a:prstGeom>
+          <a:noFill/>
+          <a:extLst>
+            <a:ext uri="{909E8E84-426E-40DD-AFC4-6F175D3DCCD1}">
+              <a14:hiddenFill xmlns:a14="http://schemas.microsoft.com/office/drawing/2010/main">
+                <a:solidFill>
+                  <a:srgbClr val="FFFFFF"/>
+                </a:solidFill>
+              </a14:hiddenFill>
+            </a:ext>
+          </a:extLst>
+        </p:spPr>
+      </p:pic>
+      <p:pic>
+        <p:nvPicPr>
+          <p:cNvPr id="1030" name="Picture 6" descr="Image result for spring boot">
+            <a:extLst>
+              <a:ext uri="{FF2B5EF4-FFF2-40B4-BE49-F238E27FC236}">
+                <a16:creationId xmlns:a16="http://schemas.microsoft.com/office/drawing/2014/main" id="{5E3CE5C6-425F-4D3A-9BA9-E27CA277FAD2}"/>
+              </a:ext>
+            </a:extLst>
+          </p:cNvPr>
+          <p:cNvPicPr>
+            <a:picLocks noChangeAspect="1" noChangeArrowheads="1"/>
+          </p:cNvPicPr>
+          <p:nvPr/>
+        </p:nvPicPr>
+        <p:blipFill>
+          <a:blip r:embed="rId5">
+            <a:extLst>
+              <a:ext uri="{28A0092B-C50C-407E-A947-70E740481C1C}">
+                <a14:useLocalDpi xmlns:a14="http://schemas.microsoft.com/office/drawing/2010/main" val="0"/>
+              </a:ext>
+            </a:extLst>
+          </a:blip>
+          <a:srcRect/>
+          <a:stretch>
+            <a:fillRect/>
+          </a:stretch>
+        </p:blipFill>
+        <p:spPr bwMode="auto">
+          <a:xfrm>
+            <a:off x="90845" y="5100901"/>
+            <a:ext cx="3095625" cy="1685662"/>
+          </a:xfrm>
+          <a:prstGeom prst="rect">
+            <a:avLst/>
+          </a:prstGeom>
+          <a:noFill/>
+          <a:extLst>
+            <a:ext uri="{909E8E84-426E-40DD-AFC4-6F175D3DCCD1}">
+              <a14:hiddenFill xmlns:a14="http://schemas.microsoft.com/office/drawing/2010/main">
+                <a:solidFill>
+                  <a:srgbClr val="FFFFFF"/>
+                </a:solidFill>
+              </a14:hiddenFill>
+            </a:ext>
+          </a:extLst>
+        </p:spPr>
+      </p:pic>
+      <p:pic>
+        <p:nvPicPr>
+          <p:cNvPr id="1032" name="Picture 8" descr="Image result for spring cloud">
+            <a:extLst>
+              <a:ext uri="{FF2B5EF4-FFF2-40B4-BE49-F238E27FC236}">
+                <a16:creationId xmlns:a16="http://schemas.microsoft.com/office/drawing/2014/main" id="{E69F9046-35F4-489B-8D0B-D72B1635878B}"/>
+              </a:ext>
+            </a:extLst>
+          </p:cNvPr>
+          <p:cNvPicPr>
+            <a:picLocks noChangeAspect="1" noChangeArrowheads="1"/>
+          </p:cNvPicPr>
+          <p:nvPr/>
+        </p:nvPicPr>
+        <p:blipFill>
+          <a:blip r:embed="rId6">
+            <a:extLst>
+              <a:ext uri="{28A0092B-C50C-407E-A947-70E740481C1C}">
+                <a14:useLocalDpi xmlns:a14="http://schemas.microsoft.com/office/drawing/2010/main" val="0"/>
+              </a:ext>
+            </a:extLst>
+          </a:blip>
+          <a:srcRect/>
+          <a:stretch>
+            <a:fillRect/>
+          </a:stretch>
+        </p:blipFill>
+        <p:spPr bwMode="auto">
+          <a:xfrm>
+            <a:off x="3648075" y="5135341"/>
+            <a:ext cx="2811481" cy="1541684"/>
+          </a:xfrm>
+          <a:prstGeom prst="rect">
+            <a:avLst/>
+          </a:prstGeom>
+          <a:noFill/>
+          <a:extLst>
+            <a:ext uri="{909E8E84-426E-40DD-AFC4-6F175D3DCCD1}">
+              <a14:hiddenFill xmlns:a14="http://schemas.microsoft.com/office/drawing/2010/main">
+                <a:solidFill>
+                  <a:srgbClr val="FFFFFF"/>
+                </a:solidFill>
+              </a14:hiddenFill>
+            </a:ext>
+          </a:extLst>
+        </p:spPr>
+      </p:pic>
+      <p:sp>
+        <p:nvSpPr>
+          <p:cNvPr id="4" name="Rectangle 3">
+            <a:extLst>
+              <a:ext uri="{FF2B5EF4-FFF2-40B4-BE49-F238E27FC236}">
+                <a16:creationId xmlns:a16="http://schemas.microsoft.com/office/drawing/2014/main" id="{3BBAF007-8316-46E5-BEC8-422C95D60DED}"/>
               </a:ext>
             </a:extLst>
           </p:cNvPr>
@@ -10004,51 +13245,25 @@
         </p:nvSpPr>
         <p:spPr>
           <a:xfrm>
-            <a:off x="8515349" y="2126765"/>
-            <a:ext cx="1933575" cy="900113"/>
+            <a:off x="90845" y="859983"/>
+            <a:ext cx="1604605" cy="3705225"/>
           </a:xfrm>
-          <a:prstGeom prst="roundRect">
+          <a:prstGeom prst="rect">
             <a:avLst/>
           </a:prstGeom>
-          <a:gradFill flip="none" rotWithShape="1">
-            <a:gsLst>
-              <a:gs pos="0">
-                <a:srgbClr val="92D050">
-                  <a:shade val="30000"/>
-                  <a:satMod val="115000"/>
-                </a:srgbClr>
-              </a:gs>
-              <a:gs pos="50000">
-                <a:srgbClr val="92D050">
-                  <a:shade val="67500"/>
-                  <a:satMod val="115000"/>
-                </a:srgbClr>
-              </a:gs>
-              <a:gs pos="100000">
-                <a:srgbClr val="92D050">
-                  <a:shade val="100000"/>
-                  <a:satMod val="115000"/>
-                </a:srgbClr>
-              </a:gs>
-            </a:gsLst>
-            <a:lin ang="8100000" scaled="1"/>
-            <a:tileRect/>
-          </a:gradFill>
         </p:spPr>
         <p:style>
-          <a:lnRef idx="2">
-            <a:schemeClr val="accent1">
-              <a:shade val="50000"/>
-            </a:schemeClr>
+          <a:lnRef idx="1">
+            <a:schemeClr val="accent6"/>
           </a:lnRef>
-          <a:fillRef idx="1">
-            <a:schemeClr val="accent1"/>
+          <a:fillRef idx="2">
+            <a:schemeClr val="accent6"/>
           </a:fillRef>
-          <a:effectRef idx="0">
-            <a:schemeClr val="accent1"/>
+          <a:effectRef idx="1">
+            <a:schemeClr val="accent6"/>
           </a:effectRef>
           <a:fontRef idx="minor">
-            <a:schemeClr val="lt1"/>
+            <a:schemeClr val="dk1"/>
           </a:fontRef>
         </p:style>
         <p:txBody>
@@ -10057,19 +13272,38 @@
           <a:p>
             <a:pPr algn="ctr"/>
             <a:r>
-              <a:rPr lang="en-IN" dirty="0" err="1"/>
-              <a:t>DoctorService</a:t>
-            </a:r>
-            <a:endParaRPr lang="en-IN" dirty="0"/>
+              <a:rPr lang="en-IN" sz="2800" dirty="0">
+                <a:latin typeface="Algerian" panose="04020705040A02060702" pitchFamily="82" charset="0"/>
+              </a:rPr>
+              <a:t>Netflix Ribbon </a:t>
+            </a:r>
+          </a:p>
+          <a:p>
+            <a:pPr algn="ctr"/>
+            <a:r>
+              <a:rPr lang="en-IN" sz="2800" dirty="0">
+                <a:latin typeface="Algerian" panose="04020705040A02060702" pitchFamily="82" charset="0"/>
+              </a:rPr>
+              <a:t>+</a:t>
+            </a:r>
+          </a:p>
+          <a:p>
+            <a:pPr algn="ctr"/>
+            <a:r>
+              <a:rPr lang="en-IN" sz="2800" dirty="0">
+                <a:latin typeface="Algerian" panose="04020705040A02060702" pitchFamily="82" charset="0"/>
+              </a:rPr>
+              <a:t>Spring Boot</a:t>
+            </a:r>
           </a:p>
         </p:txBody>
       </p:sp>
       <p:sp>
         <p:nvSpPr>
-          <p:cNvPr id="8" name="Rectangle: Rounded Corners 7">
-            <a:extLst>
-              <a:ext uri="{FF2B5EF4-FFF2-40B4-BE49-F238E27FC236}">
-                <a16:creationId xmlns:a16="http://schemas.microsoft.com/office/drawing/2014/main" id="{24CA937F-905F-40AF-90AD-258FD530FA69}"/>
+          <p:cNvPr id="13" name="Rectangle 12">
+            <a:extLst>
+              <a:ext uri="{FF2B5EF4-FFF2-40B4-BE49-F238E27FC236}">
+                <a16:creationId xmlns:a16="http://schemas.microsoft.com/office/drawing/2014/main" id="{11E39328-AF4E-4F58-A7FF-23D350CED64F}"/>
               </a:ext>
             </a:extLst>
           </p:cNvPr>
@@ -10078,51 +13312,28 @@
         </p:nvSpPr>
         <p:spPr>
           <a:xfrm>
-            <a:off x="8515349" y="3474757"/>
-            <a:ext cx="1933575" cy="900113"/>
+            <a:off x="11515725" y="-9759"/>
+            <a:ext cx="676274" cy="428859"/>
           </a:xfrm>
-          <a:prstGeom prst="roundRect">
+          <a:prstGeom prst="rect">
             <a:avLst/>
           </a:prstGeom>
-          <a:gradFill flip="none" rotWithShape="1">
-            <a:gsLst>
-              <a:gs pos="0">
-                <a:srgbClr val="92D050">
-                  <a:shade val="30000"/>
-                  <a:satMod val="115000"/>
-                </a:srgbClr>
-              </a:gs>
-              <a:gs pos="50000">
-                <a:srgbClr val="92D050">
-                  <a:shade val="67500"/>
-                  <a:satMod val="115000"/>
-                </a:srgbClr>
-              </a:gs>
-              <a:gs pos="100000">
-                <a:srgbClr val="92D050">
-                  <a:shade val="100000"/>
-                  <a:satMod val="115000"/>
-                </a:srgbClr>
-              </a:gs>
-            </a:gsLst>
-            <a:lin ang="8100000" scaled="1"/>
-            <a:tileRect/>
-          </a:gradFill>
+          <a:solidFill>
+            <a:srgbClr val="92D050"/>
+          </a:solidFill>
         </p:spPr>
         <p:style>
-          <a:lnRef idx="2">
-            <a:schemeClr val="accent1">
-              <a:shade val="50000"/>
-            </a:schemeClr>
+          <a:lnRef idx="1">
+            <a:schemeClr val="accent6"/>
           </a:lnRef>
-          <a:fillRef idx="1">
-            <a:schemeClr val="accent1"/>
+          <a:fillRef idx="2">
+            <a:schemeClr val="accent6"/>
           </a:fillRef>
-          <a:effectRef idx="0">
-            <a:schemeClr val="accent1"/>
+          <a:effectRef idx="1">
+            <a:schemeClr val="accent6"/>
           </a:effectRef>
           <a:fontRef idx="minor">
-            <a:schemeClr val="lt1"/>
+            <a:schemeClr val="dk1"/>
           </a:fontRef>
         </p:style>
         <p:txBody>
@@ -10131,19 +13342,20 @@
           <a:p>
             <a:pPr algn="ctr"/>
             <a:r>
-              <a:rPr lang="en-IN" dirty="0" err="1"/>
-              <a:t>PatientService</a:t>
-            </a:r>
-            <a:endParaRPr lang="en-IN" dirty="0"/>
+              <a:rPr lang="en-IN" sz="3200" dirty="0">
+                <a:latin typeface="Algerian" panose="04020705040A02060702" pitchFamily="82" charset="0"/>
+              </a:rPr>
+              <a:t>#4</a:t>
+            </a:r>
           </a:p>
         </p:txBody>
       </p:sp>
       <p:sp>
         <p:nvSpPr>
-          <p:cNvPr id="9" name="Rectangle: Rounded Corners 8">
-            <a:extLst>
-              <a:ext uri="{FF2B5EF4-FFF2-40B4-BE49-F238E27FC236}">
-                <a16:creationId xmlns:a16="http://schemas.microsoft.com/office/drawing/2014/main" id="{7514082C-68C3-4BBA-80B8-3AEE4333217D}"/>
+          <p:cNvPr id="15" name="Rectangle 14">
+            <a:extLst>
+              <a:ext uri="{FF2B5EF4-FFF2-40B4-BE49-F238E27FC236}">
+                <a16:creationId xmlns:a16="http://schemas.microsoft.com/office/drawing/2014/main" id="{713E4C67-78C6-4DE6-9902-E547F39FFDD0}"/>
               </a:ext>
             </a:extLst>
           </p:cNvPr>
@@ -10152,51 +13364,28 @@
         </p:nvSpPr>
         <p:spPr>
           <a:xfrm>
-            <a:off x="8510236" y="4912341"/>
-            <a:ext cx="2016569" cy="900113"/>
+            <a:off x="0" y="1"/>
+            <a:ext cx="1088089" cy="324290"/>
           </a:xfrm>
-          <a:prstGeom prst="roundRect">
+          <a:prstGeom prst="rect">
             <a:avLst/>
           </a:prstGeom>
-          <a:gradFill flip="none" rotWithShape="1">
-            <a:gsLst>
-              <a:gs pos="0">
-                <a:srgbClr val="92D050">
-                  <a:shade val="30000"/>
-                  <a:satMod val="115000"/>
-                </a:srgbClr>
-              </a:gs>
-              <a:gs pos="50000">
-                <a:srgbClr val="92D050">
-                  <a:shade val="67500"/>
-                  <a:satMod val="115000"/>
-                </a:srgbClr>
-              </a:gs>
-              <a:gs pos="100000">
-                <a:srgbClr val="92D050">
-                  <a:shade val="100000"/>
-                  <a:satMod val="115000"/>
-                </a:srgbClr>
-              </a:gs>
-            </a:gsLst>
-            <a:lin ang="8100000" scaled="1"/>
-            <a:tileRect/>
-          </a:gradFill>
+          <a:solidFill>
+            <a:srgbClr val="92D050"/>
+          </a:solidFill>
         </p:spPr>
         <p:style>
-          <a:lnRef idx="2">
-            <a:schemeClr val="accent1">
-              <a:shade val="50000"/>
-            </a:schemeClr>
+          <a:lnRef idx="1">
+            <a:schemeClr val="accent6"/>
           </a:lnRef>
-          <a:fillRef idx="1">
-            <a:schemeClr val="accent1"/>
+          <a:fillRef idx="2">
+            <a:schemeClr val="accent6"/>
           </a:fillRef>
-          <a:effectRef idx="0">
-            <a:schemeClr val="accent1"/>
+          <a:effectRef idx="1">
+            <a:schemeClr val="accent6"/>
           </a:effectRef>
           <a:fontRef idx="minor">
-            <a:schemeClr val="lt1"/>
+            <a:schemeClr val="dk1"/>
           </a:fontRef>
         </p:style>
         <p:txBody>
@@ -10205,138 +13394,18 @@
           <a:p>
             <a:pPr algn="ctr"/>
             <a:r>
-              <a:rPr lang="en-IN" dirty="0" err="1"/>
-              <a:t>DiseaseService</a:t>
-            </a:r>
-            <a:endParaRPr lang="en-IN" dirty="0"/>
+              <a:rPr lang="en-IN" sz="2000" dirty="0">
+                <a:latin typeface="Algerian" panose="04020705040A02060702" pitchFamily="82" charset="0"/>
+              </a:rPr>
+              <a:t>Arvind</a:t>
+            </a:r>
           </a:p>
         </p:txBody>
       </p:sp>
-      <p:cxnSp>
-        <p:nvCxnSpPr>
-          <p:cNvPr id="10" name="Straight Arrow Connector 9">
-            <a:extLst>
-              <a:ext uri="{FF2B5EF4-FFF2-40B4-BE49-F238E27FC236}">
-                <a16:creationId xmlns:a16="http://schemas.microsoft.com/office/drawing/2014/main" id="{25A3D3A2-228F-47A4-9ADF-31AECD20EDA1}"/>
-              </a:ext>
-            </a:extLst>
-          </p:cNvPr>
-          <p:cNvCxnSpPr/>
-          <p:nvPr/>
-        </p:nvCxnSpPr>
-        <p:spPr>
-          <a:xfrm flipV="1">
-            <a:off x="4207668" y="2464690"/>
-            <a:ext cx="4305300" cy="1260000"/>
-          </a:xfrm>
-          <a:prstGeom prst="straightConnector1">
-            <a:avLst/>
-          </a:prstGeom>
-          <a:ln>
-            <a:tailEnd type="triangle"/>
-          </a:ln>
-        </p:spPr>
-        <p:style>
-          <a:lnRef idx="3">
-            <a:schemeClr val="accent6"/>
-          </a:lnRef>
-          <a:fillRef idx="0">
-            <a:schemeClr val="accent6"/>
-          </a:fillRef>
-          <a:effectRef idx="2">
-            <a:schemeClr val="accent6"/>
-          </a:effectRef>
-          <a:fontRef idx="minor">
-            <a:schemeClr val="tx1"/>
-          </a:fontRef>
-        </p:style>
-      </p:cxnSp>
-      <p:cxnSp>
-        <p:nvCxnSpPr>
-          <p:cNvPr id="11" name="Straight Arrow Connector 10">
-            <a:extLst>
-              <a:ext uri="{FF2B5EF4-FFF2-40B4-BE49-F238E27FC236}">
-                <a16:creationId xmlns:a16="http://schemas.microsoft.com/office/drawing/2014/main" id="{8B9730C1-7404-40CE-AB6A-D839CF4EAEE8}"/>
-              </a:ext>
-            </a:extLst>
-          </p:cNvPr>
-          <p:cNvCxnSpPr>
-            <a:cxnSpLocks/>
-          </p:cNvCxnSpPr>
-          <p:nvPr/>
-        </p:nvCxnSpPr>
-        <p:spPr>
-          <a:xfrm>
-            <a:off x="4205287" y="3934407"/>
-            <a:ext cx="4310061" cy="70406"/>
-          </a:xfrm>
-          <a:prstGeom prst="straightConnector1">
-            <a:avLst/>
-          </a:prstGeom>
-          <a:ln>
-            <a:tailEnd type="triangle"/>
-          </a:ln>
-        </p:spPr>
-        <p:style>
-          <a:lnRef idx="3">
-            <a:schemeClr val="accent6"/>
-          </a:lnRef>
-          <a:fillRef idx="0">
-            <a:schemeClr val="accent6"/>
-          </a:fillRef>
-          <a:effectRef idx="2">
-            <a:schemeClr val="accent6"/>
-          </a:effectRef>
-          <a:fontRef idx="minor">
-            <a:schemeClr val="tx1"/>
-          </a:fontRef>
-        </p:style>
-      </p:cxnSp>
-      <p:cxnSp>
-        <p:nvCxnSpPr>
-          <p:cNvPr id="12" name="Straight Arrow Connector 11">
-            <a:extLst>
-              <a:ext uri="{FF2B5EF4-FFF2-40B4-BE49-F238E27FC236}">
-                <a16:creationId xmlns:a16="http://schemas.microsoft.com/office/drawing/2014/main" id="{B6314858-F816-4369-BD26-3E4D660D8540}"/>
-              </a:ext>
-            </a:extLst>
-          </p:cNvPr>
-          <p:cNvCxnSpPr>
-            <a:cxnSpLocks/>
-          </p:cNvCxnSpPr>
-          <p:nvPr/>
-        </p:nvCxnSpPr>
-        <p:spPr>
-          <a:xfrm>
-            <a:off x="4202906" y="4172569"/>
-            <a:ext cx="4432205" cy="1275474"/>
-          </a:xfrm>
-          <a:prstGeom prst="straightConnector1">
-            <a:avLst/>
-          </a:prstGeom>
-          <a:ln>
-            <a:tailEnd type="triangle"/>
-          </a:ln>
-        </p:spPr>
-        <p:style>
-          <a:lnRef idx="3">
-            <a:schemeClr val="accent6"/>
-          </a:lnRef>
-          <a:fillRef idx="0">
-            <a:schemeClr val="accent6"/>
-          </a:fillRef>
-          <a:effectRef idx="2">
-            <a:schemeClr val="accent6"/>
-          </a:effectRef>
-          <a:fontRef idx="minor">
-            <a:schemeClr val="tx1"/>
-          </a:fontRef>
-        </p:style>
-      </p:cxnSp>
     </p:spTree>
     <p:extLst>
       <p:ext uri="{BB962C8B-B14F-4D97-AF65-F5344CB8AC3E}">
-        <p14:creationId xmlns:p14="http://schemas.microsoft.com/office/powerpoint/2010/main" val="3665447396"/>
+        <p14:creationId xmlns:p14="http://schemas.microsoft.com/office/powerpoint/2010/main" val="770834698"/>
       </p:ext>
     </p:extLst>
   </p:cSld>

</xml_diff>